<commit_message>
First four slides added!!!
</commit_message>
<xml_diff>
--- a/active.pptx
+++ b/active.pptx
@@ -5,8 +5,14 @@
     <p:sldMasterId id="2147483648" r:id="rId1"/>
   </p:sldMasterIdLst>
   <p:notesMasterIdLst>
-    <p:notesMasterId r:id="rId2"/>
+    <p:notesMasterId r:id="rId6"/>
   </p:notesMasterIdLst>
+  <p:sldIdLst>
+    <p:sldId id="256" r:id="rId2"/>
+    <p:sldId id="257" r:id="rId3"/>
+    <p:sldId id="258" r:id="rId4"/>
+    <p:sldId id="259" r:id="rId5"/>
+  </p:sldIdLst>
   <p:sldSz cx="9144000" cy="5143500" type="screen16x9"/>
   <p:notesSz cx="6858000" cy="9144000"/>
   <p:defaultTextStyle>
@@ -3991,6 +3997,458 @@
     </p:otherStyle>
   </p:txStyles>
 </p:sldMaster>
+</file>
+
+<file path=ppt/slides/slide1.xml><?xml version="1.0" encoding="utf-8"?>
+<p:sld xmlns:a="http://schemas.openxmlformats.org/drawingml/2006/main" xmlns:r="http://schemas.openxmlformats.org/officeDocument/2006/relationships" xmlns:p="http://schemas.openxmlformats.org/presentationml/2006/main">
+  <p:cSld>
+    <p:spTree>
+      <p:nvGrpSpPr>
+        <p:cNvPr id="1" name=""/>
+        <p:cNvGrpSpPr/>
+        <p:nvPr/>
+      </p:nvGrpSpPr>
+      <p:grpSpPr>
+        <a:xfrm>
+          <a:off x="0" y="0"/>
+          <a:ext cx="0" cy="0"/>
+          <a:chOff x="0" y="0"/>
+          <a:chExt cx="0" cy="0"/>
+        </a:xfrm>
+      </p:grpSpPr>
+      <p:sp>
+        <p:nvSpPr>
+          <p:cNvPr id="2" name="Title 1"/>
+          <p:cNvSpPr>
+            <a:spLocks noGrp="1"/>
+          </p:cNvSpPr>
+          <p:nvPr>
+            <p:ph type="ctrTitle"/>
+          </p:nvPr>
+        </p:nvSpPr>
+        <p:spPr>
+          <a:xfrm>
+            <a:off x="754375" y="2877160"/>
+            <a:ext cx="7329840" cy="1844578"/>
+          </a:xfrm>
+        </p:spPr>
+        <p:txBody>
+          <a:bodyPr>
+            <a:normAutofit/>
+          </a:bodyPr>
+          <a:lstStyle/>
+          <a:p>
+            <a:pPr algn="ctr"/>
+            <a:r>
+              <a:rPr lang="en-US" sz="4000" dirty="0" smtClean="0">
+                <a:solidFill>
+                  <a:srgbClr val="7030A0"/>
+                </a:solidFill>
+              </a:rPr>
+              <a:t>Active Directory</a:t>
+            </a:r>
+            <a:br>
+              <a:rPr lang="en-US" sz="4000" dirty="0" smtClean="0">
+                <a:solidFill>
+                  <a:srgbClr val="7030A0"/>
+                </a:solidFill>
+              </a:rPr>
+            </a:br>
+            <a:r>
+              <a:rPr lang="en-US" sz="4000" dirty="0" smtClean="0">
+                <a:solidFill>
+                  <a:srgbClr val="7030A0"/>
+                </a:solidFill>
+              </a:rPr>
+              <a:t>Installation &amp; Configuration</a:t>
+            </a:r>
+            <a:endParaRPr lang="en-US" sz="4000" dirty="0">
+              <a:solidFill>
+                <a:srgbClr val="7030A0"/>
+              </a:solidFill>
+            </a:endParaRPr>
+          </a:p>
+        </p:txBody>
+      </p:sp>
+    </p:spTree>
+    <p:extLst>
+      <p:ext uri="{BB962C8B-B14F-4D97-AF65-F5344CB8AC3E}">
+        <p14:creationId xmlns:p14="http://schemas.microsoft.com/office/powerpoint/2010/main" val="2461079020"/>
+      </p:ext>
+    </p:extLst>
+  </p:cSld>
+  <p:clrMapOvr>
+    <a:masterClrMapping/>
+  </p:clrMapOvr>
+  <p:timing>
+    <p:tnLst>
+      <p:par>
+        <p:cTn id="1" dur="indefinite" restart="never" nodeType="tmRoot"/>
+      </p:par>
+    </p:tnLst>
+  </p:timing>
+</p:sld>
+</file>
+
+<file path=ppt/slides/slide2.xml><?xml version="1.0" encoding="utf-8"?>
+<p:sld xmlns:a="http://schemas.openxmlformats.org/drawingml/2006/main" xmlns:r="http://schemas.openxmlformats.org/officeDocument/2006/relationships" xmlns:p="http://schemas.openxmlformats.org/presentationml/2006/main">
+  <p:cSld>
+    <p:spTree>
+      <p:nvGrpSpPr>
+        <p:cNvPr id="1" name=""/>
+        <p:cNvGrpSpPr/>
+        <p:nvPr/>
+      </p:nvGrpSpPr>
+      <p:grpSpPr>
+        <a:xfrm>
+          <a:off x="0" y="0"/>
+          <a:ext cx="0" cy="0"/>
+          <a:chOff x="0" y="0"/>
+          <a:chExt cx="0" cy="0"/>
+        </a:xfrm>
+      </p:grpSpPr>
+      <p:sp>
+        <p:nvSpPr>
+          <p:cNvPr id="4" name="Title 3"/>
+          <p:cNvSpPr>
+            <a:spLocks noGrp="1"/>
+          </p:cNvSpPr>
+          <p:nvPr>
+            <p:ph type="title"/>
+          </p:nvPr>
+        </p:nvSpPr>
+        <p:spPr>
+          <a:xfrm>
+            <a:off x="2586835" y="128470"/>
+            <a:ext cx="6108200" cy="725349"/>
+          </a:xfrm>
+        </p:spPr>
+        <p:txBody>
+          <a:bodyPr>
+            <a:normAutofit/>
+          </a:bodyPr>
+          <a:lstStyle/>
+          <a:p>
+            <a:r>
+              <a:rPr lang="en-US" dirty="0"/>
+              <a:t>Group members</a:t>
+            </a:r>
+          </a:p>
+        </p:txBody>
+      </p:sp>
+      <p:sp>
+        <p:nvSpPr>
+          <p:cNvPr id="5" name="Content Placeholder 4"/>
+          <p:cNvSpPr>
+            <a:spLocks noGrp="1"/>
+          </p:cNvSpPr>
+          <p:nvPr>
+            <p:ph idx="1"/>
+          </p:nvPr>
+        </p:nvSpPr>
+        <p:spPr>
+          <a:xfrm>
+            <a:off x="2434130" y="1502815"/>
+            <a:ext cx="6260905" cy="3206805"/>
+          </a:xfrm>
+        </p:spPr>
+        <p:txBody>
+          <a:bodyPr>
+            <a:normAutofit/>
+          </a:bodyPr>
+          <a:lstStyle/>
+          <a:p>
+            <a:r>
+              <a:rPr lang="en-US" dirty="0" smtClean="0"/>
+              <a:t>Mahdi </a:t>
+            </a:r>
+          </a:p>
+          <a:p>
+            <a:r>
+              <a:rPr lang="en-US" dirty="0" smtClean="0"/>
+              <a:t>Samiullah </a:t>
+            </a:r>
+            <a:r>
+              <a:rPr lang="en-US" dirty="0"/>
+              <a:t>Wardak</a:t>
+            </a:r>
+          </a:p>
+          <a:p>
+            <a:r>
+              <a:rPr lang="en-US" dirty="0"/>
+              <a:t>Atiqullah Hamraz</a:t>
+            </a:r>
+          </a:p>
+          <a:p>
+            <a:r>
+              <a:rPr lang="en-US" dirty="0"/>
+              <a:t>Baha-ul-haq </a:t>
+            </a:r>
+          </a:p>
+          <a:p>
+            <a:r>
+              <a:rPr lang="en-US" dirty="0"/>
+              <a:t>Hedayatullah </a:t>
+            </a:r>
+          </a:p>
+          <a:p>
+            <a:endParaRPr lang="en-US" dirty="0"/>
+          </a:p>
+          <a:p>
+            <a:endParaRPr lang="en-US" dirty="0"/>
+          </a:p>
+          <a:p>
+            <a:endParaRPr lang="en-US" dirty="0"/>
+          </a:p>
+        </p:txBody>
+      </p:sp>
+    </p:spTree>
+    <p:extLst>
+      <p:ext uri="{BB962C8B-B14F-4D97-AF65-F5344CB8AC3E}">
+        <p14:creationId xmlns:p14="http://schemas.microsoft.com/office/powerpoint/2010/main" val="1884520432"/>
+      </p:ext>
+    </p:extLst>
+  </p:cSld>
+  <p:clrMapOvr>
+    <a:masterClrMapping/>
+  </p:clrMapOvr>
+  <p:timing>
+    <p:tnLst>
+      <p:par>
+        <p:cTn id="1" dur="indefinite" restart="never" nodeType="tmRoot"/>
+      </p:par>
+    </p:tnLst>
+  </p:timing>
+</p:sld>
+</file>
+
+<file path=ppt/slides/slide3.xml><?xml version="1.0" encoding="utf-8"?>
+<p:sld xmlns:a="http://schemas.openxmlformats.org/drawingml/2006/main" xmlns:r="http://schemas.openxmlformats.org/officeDocument/2006/relationships" xmlns:p="http://schemas.openxmlformats.org/presentationml/2006/main">
+  <p:cSld>
+    <p:spTree>
+      <p:nvGrpSpPr>
+        <p:cNvPr id="1" name=""/>
+        <p:cNvGrpSpPr/>
+        <p:nvPr/>
+      </p:nvGrpSpPr>
+      <p:grpSpPr>
+        <a:xfrm>
+          <a:off x="0" y="0"/>
+          <a:ext cx="0" cy="0"/>
+          <a:chOff x="0" y="0"/>
+          <a:chExt cx="0" cy="0"/>
+        </a:xfrm>
+      </p:grpSpPr>
+      <p:sp>
+        <p:nvSpPr>
+          <p:cNvPr id="2" name="Title 1"/>
+          <p:cNvSpPr>
+            <a:spLocks noGrp="1"/>
+          </p:cNvSpPr>
+          <p:nvPr>
+            <p:ph type="title"/>
+          </p:nvPr>
+        </p:nvSpPr>
+        <p:spPr/>
+        <p:txBody>
+          <a:bodyPr>
+            <a:normAutofit/>
+          </a:bodyPr>
+          <a:lstStyle/>
+          <a:p>
+            <a:r>
+              <a:rPr lang="en-US" dirty="0" smtClean="0">
+                <a:effectLst/>
+              </a:rPr>
+              <a:t>History of Active Directory</a:t>
+            </a:r>
+            <a:endParaRPr lang="en-US" dirty="0"/>
+          </a:p>
+        </p:txBody>
+      </p:sp>
+      <p:sp>
+        <p:nvSpPr>
+          <p:cNvPr id="3" name="Content Placeholder 2"/>
+          <p:cNvSpPr>
+            <a:spLocks noGrp="1"/>
+          </p:cNvSpPr>
+          <p:nvPr>
+            <p:ph idx="1"/>
+          </p:nvPr>
+        </p:nvSpPr>
+        <p:spPr/>
+        <p:txBody>
+          <a:bodyPr/>
+          <a:lstStyle/>
+          <a:p>
+            <a:r>
+              <a:rPr lang="en-US" dirty="0"/>
+              <a:t>Microsoft previewed Active Directory in 1999, released it first with Windows 2000 </a:t>
+            </a:r>
+            <a:r>
+              <a:rPr lang="en-US" dirty="0" smtClean="0"/>
+              <a:t>Server.</a:t>
+            </a:r>
+          </a:p>
+          <a:p>
+            <a:r>
+              <a:rPr lang="en-US" dirty="0"/>
+              <a:t>Active Directory support was also added to </a:t>
+            </a:r>
+            <a:r>
+              <a:rPr lang="en-US" b="1" dirty="0"/>
+              <a:t>Windows 95</a:t>
+            </a:r>
+            <a:r>
+              <a:rPr lang="en-US" dirty="0"/>
+              <a:t>, </a:t>
+            </a:r>
+            <a:r>
+              <a:rPr lang="en-US" b="1" dirty="0"/>
+              <a:t>Windows 98 </a:t>
+            </a:r>
+            <a:r>
+              <a:rPr lang="en-US" dirty="0"/>
+              <a:t>and </a:t>
+            </a:r>
+            <a:r>
+              <a:rPr lang="en-US" b="1" dirty="0"/>
+              <a:t>Windows NT </a:t>
+            </a:r>
+            <a:r>
+              <a:rPr lang="en-US" b="1" dirty="0" smtClean="0"/>
+              <a:t>4.0</a:t>
+            </a:r>
+            <a:r>
+              <a:rPr lang="en-US" dirty="0" smtClean="0"/>
+              <a:t>, </a:t>
+            </a:r>
+            <a:r>
+              <a:rPr lang="en-US" dirty="0"/>
+              <a:t>with some features being </a:t>
+            </a:r>
+            <a:r>
+              <a:rPr lang="en-US" b="1" i="1" dirty="0" smtClean="0"/>
+              <a:t>unsupported.</a:t>
+            </a:r>
+            <a:endParaRPr lang="en-US" b="1" i="1" dirty="0"/>
+          </a:p>
+        </p:txBody>
+      </p:sp>
+    </p:spTree>
+    <p:extLst>
+      <p:ext uri="{BB962C8B-B14F-4D97-AF65-F5344CB8AC3E}">
+        <p14:creationId xmlns:p14="http://schemas.microsoft.com/office/powerpoint/2010/main" val="3032306861"/>
+      </p:ext>
+    </p:extLst>
+  </p:cSld>
+  <p:clrMapOvr>
+    <a:masterClrMapping/>
+  </p:clrMapOvr>
+  <p:timing>
+    <p:tnLst>
+      <p:par>
+        <p:cTn id="1" dur="indefinite" restart="never" nodeType="tmRoot"/>
+      </p:par>
+    </p:tnLst>
+  </p:timing>
+</p:sld>
+</file>
+
+<file path=ppt/slides/slide4.xml><?xml version="1.0" encoding="utf-8"?>
+<p:sld xmlns:a="http://schemas.openxmlformats.org/drawingml/2006/main" xmlns:r="http://schemas.openxmlformats.org/officeDocument/2006/relationships" xmlns:p="http://schemas.openxmlformats.org/presentationml/2006/main">
+  <p:cSld>
+    <p:spTree>
+      <p:nvGrpSpPr>
+        <p:cNvPr id="1" name=""/>
+        <p:cNvGrpSpPr/>
+        <p:nvPr/>
+      </p:nvGrpSpPr>
+      <p:grpSpPr>
+        <a:xfrm>
+          <a:off x="0" y="0"/>
+          <a:ext cx="0" cy="0"/>
+          <a:chOff x="0" y="0"/>
+          <a:chExt cx="0" cy="0"/>
+        </a:xfrm>
+      </p:grpSpPr>
+      <p:sp>
+        <p:nvSpPr>
+          <p:cNvPr id="2" name="Title 1"/>
+          <p:cNvSpPr>
+            <a:spLocks noGrp="1"/>
+          </p:cNvSpPr>
+          <p:nvPr>
+            <p:ph type="title"/>
+          </p:nvPr>
+        </p:nvSpPr>
+        <p:spPr/>
+        <p:txBody>
+          <a:bodyPr/>
+          <a:lstStyle/>
+          <a:p>
+            <a:r>
+              <a:rPr lang="en-US" dirty="0"/>
+              <a:t>Active Directory (AD)</a:t>
+            </a:r>
+          </a:p>
+        </p:txBody>
+      </p:sp>
+      <p:sp>
+        <p:nvSpPr>
+          <p:cNvPr id="3" name="Content Placeholder 2"/>
+          <p:cNvSpPr>
+            <a:spLocks noGrp="1"/>
+          </p:cNvSpPr>
+          <p:nvPr>
+            <p:ph idx="1"/>
+          </p:nvPr>
+        </p:nvSpPr>
+        <p:spPr/>
+        <p:txBody>
+          <a:bodyPr/>
+          <a:lstStyle/>
+          <a:p>
+            <a:r>
+              <a:rPr lang="en-US" dirty="0"/>
+              <a:t>AD is a directory service that runs on MS Windows Server</a:t>
+            </a:r>
+          </a:p>
+          <a:p>
+            <a:r>
+              <a:rPr lang="en-US" dirty="0"/>
+              <a:t>It enables administrators to manage permissions and control access to network resources</a:t>
+            </a:r>
+          </a:p>
+          <a:p>
+            <a:r>
+              <a:rPr lang="en-US" dirty="0"/>
+              <a:t>In AD data is stored in objects</a:t>
+            </a:r>
+          </a:p>
+          <a:p>
+            <a:endParaRPr lang="en-US" dirty="0"/>
+          </a:p>
+        </p:txBody>
+      </p:sp>
+    </p:spTree>
+    <p:extLst>
+      <p:ext uri="{BB962C8B-B14F-4D97-AF65-F5344CB8AC3E}">
+        <p14:creationId xmlns:p14="http://schemas.microsoft.com/office/powerpoint/2010/main" val="1944833241"/>
+      </p:ext>
+    </p:extLst>
+  </p:cSld>
+  <p:clrMapOvr>
+    <a:masterClrMapping/>
+  </p:clrMapOvr>
+  <p:timing>
+    <p:tnLst>
+      <p:par>
+        <p:cTn id="1" dur="indefinite" restart="never" nodeType="tmRoot"/>
+      </p:par>
+    </p:tnLst>
+  </p:timing>
+</p:sld>
 </file>
 
 <file path=ppt/theme/theme1.xml><?xml version="1.0" encoding="utf-8"?>

</xml_diff>

<commit_message>
Some last names modified in the second slide
</commit_message>
<xml_diff>
--- a/active.pptx
+++ b/active.pptx
@@ -215,7 +215,7 @@
           <a:p>
             <a:fld id="{C8D18E60-4300-4729-A0D7-6AB984C3922D}" type="datetimeFigureOut">
               <a:rPr lang="en-US" smtClean="0"/>
-              <a:t>6/5/2022</a:t>
+              <a:t>6/6/2022</a:t>
             </a:fld>
             <a:endParaRPr lang="en-US"/>
           </a:p>
@@ -717,7 +717,7 @@
             <a:fld id="{53074F12-AA26-4AC8-9962-C36BB8F32554}" type="datetimeFigureOut">
               <a:rPr lang="en-US" smtClean="0"/>
               <a:pPr/>
-              <a:t>6/5/2022</a:t>
+              <a:t>6/6/2022</a:t>
             </a:fld>
             <a:endParaRPr lang="en-US"/>
           </a:p>
@@ -971,7 +971,7 @@
             <a:fld id="{53074F12-AA26-4AC8-9962-C36BB8F32554}" type="datetimeFigureOut">
               <a:rPr lang="en-US" smtClean="0"/>
               <a:pPr/>
-              <a:t>6/5/2022</a:t>
+              <a:t>6/6/2022</a:t>
             </a:fld>
             <a:endParaRPr lang="en-US"/>
           </a:p>
@@ -1141,7 +1141,7 @@
             <a:fld id="{53074F12-AA26-4AC8-9962-C36BB8F32554}" type="datetimeFigureOut">
               <a:rPr lang="en-US" smtClean="0"/>
               <a:pPr/>
-              <a:t>6/5/2022</a:t>
+              <a:t>6/6/2022</a:t>
             </a:fld>
             <a:endParaRPr lang="en-US"/>
           </a:p>
@@ -1321,7 +1321,7 @@
             <a:fld id="{53074F12-AA26-4AC8-9962-C36BB8F32554}" type="datetimeFigureOut">
               <a:rPr lang="en-US" smtClean="0"/>
               <a:pPr/>
-              <a:t>6/5/2022</a:t>
+              <a:t>6/6/2022</a:t>
             </a:fld>
             <a:endParaRPr lang="en-US"/>
           </a:p>
@@ -1603,7 +1603,7 @@
             <a:fld id="{53074F12-AA26-4AC8-9962-C36BB8F32554}" type="datetimeFigureOut">
               <a:rPr lang="en-US" smtClean="0"/>
               <a:pPr/>
-              <a:t>6/5/2022</a:t>
+              <a:t>6/6/2022</a:t>
             </a:fld>
             <a:endParaRPr lang="en-US"/>
           </a:p>
@@ -1850,7 +1850,7 @@
             <a:fld id="{53074F12-AA26-4AC8-9962-C36BB8F32554}" type="datetimeFigureOut">
               <a:rPr lang="en-US" smtClean="0"/>
               <a:pPr/>
-              <a:t>6/5/2022</a:t>
+              <a:t>6/6/2022</a:t>
             </a:fld>
             <a:endParaRPr lang="en-US"/>
           </a:p>
@@ -2097,7 +2097,7 @@
             <a:fld id="{53074F12-AA26-4AC8-9962-C36BB8F32554}" type="datetimeFigureOut">
               <a:rPr lang="en-US" smtClean="0"/>
               <a:pPr/>
-              <a:t>6/5/2022</a:t>
+              <a:t>6/6/2022</a:t>
             </a:fld>
             <a:endParaRPr lang="en-US"/>
           </a:p>
@@ -2384,7 +2384,7 @@
             <a:fld id="{53074F12-AA26-4AC8-9962-C36BB8F32554}" type="datetimeFigureOut">
               <a:rPr lang="en-US" smtClean="0"/>
               <a:pPr/>
-              <a:t>6/5/2022</a:t>
+              <a:t>6/6/2022</a:t>
             </a:fld>
             <a:endParaRPr lang="en-US"/>
           </a:p>
@@ -2871,7 +2871,7 @@
             <a:fld id="{53074F12-AA26-4AC8-9962-C36BB8F32554}" type="datetimeFigureOut">
               <a:rPr lang="en-US" smtClean="0"/>
               <a:pPr/>
-              <a:t>6/5/2022</a:t>
+              <a:t>6/6/2022</a:t>
             </a:fld>
             <a:endParaRPr lang="en-US"/>
           </a:p>
@@ -2990,7 +2990,7 @@
             <a:fld id="{53074F12-AA26-4AC8-9962-C36BB8F32554}" type="datetimeFigureOut">
               <a:rPr lang="en-US" smtClean="0"/>
               <a:pPr/>
-              <a:t>6/5/2022</a:t>
+              <a:t>6/6/2022</a:t>
             </a:fld>
             <a:endParaRPr lang="en-US"/>
           </a:p>
@@ -3087,7 +3087,7 @@
             <a:fld id="{53074F12-AA26-4AC8-9962-C36BB8F32554}" type="datetimeFigureOut">
               <a:rPr lang="en-US" smtClean="0"/>
               <a:pPr/>
-              <a:t>6/5/2022</a:t>
+              <a:t>6/6/2022</a:t>
             </a:fld>
             <a:endParaRPr lang="en-US"/>
           </a:p>
@@ -3364,7 +3364,7 @@
             <a:fld id="{53074F12-AA26-4AC8-9962-C36BB8F32554}" type="datetimeFigureOut">
               <a:rPr lang="en-US" smtClean="0"/>
               <a:pPr/>
-              <a:t>6/5/2022</a:t>
+              <a:t>6/6/2022</a:t>
             </a:fld>
             <a:endParaRPr lang="en-US"/>
           </a:p>
@@ -3586,7 +3586,7 @@
             <a:fld id="{53074F12-AA26-4AC8-9962-C36BB8F32554}" type="datetimeFigureOut">
               <a:rPr lang="en-US" smtClean="0"/>
               <a:pPr/>
-              <a:t>6/5/2022</a:t>
+              <a:t>6/6/2022</a:t>
             </a:fld>
             <a:endParaRPr lang="en-US"/>
           </a:p>
@@ -4182,14 +4182,44 @@
           <a:p>
             <a:r>
               <a:rPr lang="en-US" dirty="0"/>
-              <a:t>Baha-ul-haq </a:t>
-            </a:r>
-          </a:p>
-          <a:p>
+              <a:t>Baha-</a:t>
+            </a:r>
+            <a:r>
+              <a:rPr lang="en-US" dirty="0" err="1"/>
+              <a:t>ul</a:t>
+            </a:r>
             <a:r>
               <a:rPr lang="en-US" dirty="0"/>
-              <a:t>Hedayatullah </a:t>
-            </a:r>
+              <a:t>-</a:t>
+            </a:r>
+            <a:r>
+              <a:rPr lang="en-US" dirty="0" err="1"/>
+              <a:t>haq</a:t>
+            </a:r>
+            <a:r>
+              <a:rPr lang="en-US" dirty="0"/>
+              <a:t> </a:t>
+            </a:r>
+            <a:r>
+              <a:rPr lang="en-US" dirty="0" err="1" smtClean="0"/>
+              <a:t>Sharifi</a:t>
+            </a:r>
+            <a:endParaRPr lang="en-US" dirty="0"/>
+          </a:p>
+          <a:p>
+            <a:r>
+              <a:rPr lang="en-US" dirty="0" err="1"/>
+              <a:t>Hedayatullah</a:t>
+            </a:r>
+            <a:r>
+              <a:rPr lang="en-US" dirty="0"/>
+              <a:t> </a:t>
+            </a:r>
+            <a:r>
+              <a:rPr lang="en-US" dirty="0" err="1" smtClean="0"/>
+              <a:t>Nekzad</a:t>
+            </a:r>
+            <a:endParaRPr lang="en-US" dirty="0"/>
           </a:p>
           <a:p>
             <a:endParaRPr lang="en-US" dirty="0"/>

</xml_diff>

<commit_message>
this is my second file
</commit_message>
<xml_diff>
--- a/active.pptx
+++ b/active.pptx
@@ -13,6 +13,7 @@
     <p:sldId id="258" r:id="rId8"/>
     <p:sldId id="259" r:id="rId9"/>
     <p:sldId id="260" r:id="rId10"/>
+    <p:sldId id="261" r:id="rId11"/>
   </p:sldIdLst>
   <p:sldSz cx="9144000" cy="5143500"/>
   <p:notesSz cx="7772400" cy="10058400"/>
@@ -5625,7 +5626,7 @@
                 <a:spcPct val="100000"/>
               </a:lnSpc>
             </a:pPr>
-            <a:fld id="{102FD655-21A7-4B06-A039-CB680BF41E1C}" type="datetime">
+            <a:fld id="{3BC6EDB1-C675-4D82-8A1E-B7036DA8D3B7}" type="datetime">
               <a:rPr b="0" lang="en-US" sz="1200" spc="-1" strike="noStrike">
                 <a:solidFill>
                   <a:srgbClr val="8b8b8b"/>
@@ -5699,7 +5700,7 @@
                 <a:spcPct val="100000"/>
               </a:lnSpc>
             </a:pPr>
-            <a:fld id="{A3261A8C-63C8-465C-8161-F8B3C49A249D}" type="slidenum">
+            <a:fld id="{D2577B28-85D0-48E6-A072-B4C72ED89E3E}" type="slidenum">
               <a:rPr b="0" lang="en-US" sz="1200" spc="-1" strike="noStrike">
                 <a:solidFill>
                   <a:srgbClr val="8b8b8b"/>
@@ -6302,7 +6303,7 @@
                 <a:spcPct val="100000"/>
               </a:lnSpc>
             </a:pPr>
-            <a:fld id="{EE9183AD-515A-4AE9-BE54-29584C760691}" type="datetime">
+            <a:fld id="{995C099C-1641-4102-99B6-485C65AF1D25}" type="datetime">
               <a:rPr b="0" lang="en-US" sz="1200" spc="-1" strike="noStrike">
                 <a:solidFill>
                   <a:srgbClr val="8b8b8b"/>
@@ -6376,7 +6377,7 @@
                 <a:spcPct val="100000"/>
               </a:lnSpc>
             </a:pPr>
-            <a:fld id="{6C28421F-9F1F-4907-943F-4899B332E720}" type="slidenum">
+            <a:fld id="{9746EA99-B3AA-403A-901C-0430F71FE070}" type="slidenum">
               <a:rPr b="0" lang="en-US" sz="1200" spc="-1" strike="noStrike">
                 <a:solidFill>
                   <a:srgbClr val="8b8b8b"/>
@@ -6758,7 +6759,7 @@
                 <a:spcPct val="100000"/>
               </a:lnSpc>
             </a:pPr>
-            <a:fld id="{175D37EA-C5BC-4880-BD1E-568E25F62D91}" type="datetime">
+            <a:fld id="{2FC2CEF4-E8A3-4DF9-9DD1-C7D7846E48F8}" type="datetime">
               <a:rPr b="0" lang="en-US" sz="1200" spc="-1" strike="noStrike">
                 <a:solidFill>
                   <a:srgbClr val="8b8b8b"/>
@@ -6832,7 +6833,7 @@
                 <a:spcPct val="100000"/>
               </a:lnSpc>
             </a:pPr>
-            <a:fld id="{26496942-2A2F-45D6-831B-FABDB66DF97E}" type="slidenum">
+            <a:fld id="{A9B2D34F-7BAD-43D4-B940-BFB886D9F2FD}" type="slidenum">
               <a:rPr b="0" lang="en-US" sz="1200" spc="-1" strike="noStrike">
                 <a:solidFill>
                   <a:srgbClr val="8b8b8b"/>
@@ -8184,6 +8185,292 @@
               </a:rPr>
               <a:t>Which categorized according to their name add attributes</a:t>
             </a:r>
+            <a:endParaRPr b="0" lang="en-US" sz="2800" spc="-1" strike="noStrike">
+              <a:latin typeface="Arial"/>
+            </a:endParaRPr>
+          </a:p>
+        </p:txBody>
+      </p:sp>
+    </p:spTree>
+  </p:cSld>
+  <mc:AlternateContent>
+    <mc:Choice Requires="p14">
+      <p:transition spd="slow" p14:dur="2000"/>
+    </mc:Choice>
+    <mc:Fallback>
+      <p:transition spd="slow"/>
+    </mc:Fallback>
+  </mc:AlternateContent>
+</p:sld>
+</file>
+
+<file path=ppt/slides/slide6.xml><?xml version="1.0" encoding="utf-8"?>
+<p:sld xmlns:a="http://schemas.openxmlformats.org/drawingml/2006/main" xmlns:p="http://schemas.openxmlformats.org/presentationml/2006/main" xmlns:r="http://schemas.openxmlformats.org/officeDocument/2006/relationships" xmlns:p14="http://schemas.microsoft.com/office/powerpoint/2010/main" xmlns:p15="http://schemas.microsoft.com/office/powerpoint/2012/main" xmlns:mc="http://schemas.openxmlformats.org/markup-compatibility/2006">
+  <p:cSld>
+    <p:spTree>
+      <p:nvGrpSpPr>
+        <p:cNvPr id="1" name=""/>
+        <p:cNvGrpSpPr/>
+        <p:nvPr/>
+      </p:nvGrpSpPr>
+      <p:grpSpPr>
+        <a:xfrm>
+          <a:off x="0" y="0"/>
+          <a:ext cx="0" cy="0"/>
+          <a:chOff x="0" y="0"/>
+          <a:chExt cx="0" cy="0"/>
+        </a:xfrm>
+      </p:grpSpPr>
+      <p:sp>
+        <p:nvSpPr>
+          <p:cNvPr id="173" name="CustomShape 1"/>
+          <p:cNvSpPr/>
+          <p:nvPr/>
+        </p:nvSpPr>
+        <p:spPr>
+          <a:xfrm>
+            <a:off x="448920" y="586440"/>
+            <a:ext cx="8245440" cy="762840"/>
+          </a:xfrm>
+          <a:prstGeom prst="rect">
+            <a:avLst/>
+          </a:prstGeom>
+          <a:noFill/>
+          <a:ln>
+            <a:noFill/>
+          </a:ln>
+        </p:spPr>
+        <p:style>
+          <a:lnRef idx="0"/>
+          <a:fillRef idx="0"/>
+          <a:effectRef idx="0"/>
+          <a:fontRef idx="minor"/>
+        </p:style>
+        <p:txBody>
+          <a:bodyPr lIns="90000" rIns="90000" tIns="45000" bIns="45000" anchor="ctr">
+            <a:noAutofit/>
+          </a:bodyPr>
+          <a:p>
+            <a:pPr>
+              <a:lnSpc>
+                <a:spcPct val="100000"/>
+              </a:lnSpc>
+            </a:pPr>
+            <a:r>
+              <a:rPr b="0" lang="en-US" sz="3600" spc="-1" strike="noStrike">
+                <a:solidFill>
+                  <a:srgbClr val="7030a0"/>
+                </a:solidFill>
+                <a:latin typeface="Calibri"/>
+              </a:rPr>
+              <a:t>Domain Controller</a:t>
+            </a:r>
+            <a:endParaRPr b="0" lang="en-US" sz="3600" spc="-1" strike="noStrike">
+              <a:latin typeface="Arial"/>
+            </a:endParaRPr>
+          </a:p>
+        </p:txBody>
+      </p:sp>
+      <p:sp>
+        <p:nvSpPr>
+          <p:cNvPr id="174" name="CustomShape 2"/>
+          <p:cNvSpPr/>
+          <p:nvPr/>
+        </p:nvSpPr>
+        <p:spPr>
+          <a:xfrm>
+            <a:off x="448920" y="1502640"/>
+            <a:ext cx="8245440" cy="3206160"/>
+          </a:xfrm>
+          <a:prstGeom prst="rect">
+            <a:avLst/>
+          </a:prstGeom>
+          <a:noFill/>
+          <a:ln>
+            <a:noFill/>
+          </a:ln>
+        </p:spPr>
+        <p:style>
+          <a:lnRef idx="0"/>
+          <a:fillRef idx="0"/>
+          <a:effectRef idx="0"/>
+          <a:fontRef idx="minor"/>
+        </p:style>
+        <p:txBody>
+          <a:bodyPr lIns="90000" rIns="90000" tIns="45000" bIns="45000">
+            <a:normAutofit fontScale="70000"/>
+          </a:bodyPr>
+          <a:p>
+            <a:pPr marL="343080" indent="-342360">
+              <a:lnSpc>
+                <a:spcPct val="100000"/>
+              </a:lnSpc>
+              <a:spcBef>
+                <a:spcPts val="561"/>
+              </a:spcBef>
+              <a:buClr>
+                <a:srgbClr val="002060"/>
+              </a:buClr>
+              <a:buFont typeface="Arial"/>
+              <a:buChar char="•"/>
+            </a:pPr>
+            <a:r>
+              <a:rPr b="0" lang="en-US" sz="2800" spc="-1" strike="noStrike">
+                <a:solidFill>
+                  <a:srgbClr val="002060"/>
+                </a:solidFill>
+                <a:latin typeface="Calibri"/>
+              </a:rPr>
+              <a:t>A server running the AD </a:t>
+            </a:r>
+            <a:r>
+              <a:rPr b="1" lang="en-US" sz="2800" spc="-1" strike="noStrike">
+                <a:solidFill>
+                  <a:srgbClr val="002060"/>
+                </a:solidFill>
+                <a:latin typeface="Calibri"/>
+              </a:rPr>
+              <a:t>Domain Service</a:t>
+            </a:r>
+            <a:r>
+              <a:rPr b="0" lang="en-US" sz="2800" spc="-1" strike="noStrike">
+                <a:solidFill>
+                  <a:srgbClr val="002060"/>
+                </a:solidFill>
+                <a:latin typeface="Calibri"/>
+              </a:rPr>
+              <a:t> (</a:t>
+            </a:r>
+            <a:r>
+              <a:rPr b="1" lang="en-US" sz="2800" spc="-1" strike="noStrike">
+                <a:solidFill>
+                  <a:srgbClr val="002060"/>
+                </a:solidFill>
+                <a:latin typeface="Calibri"/>
+              </a:rPr>
+              <a:t>AD DS</a:t>
+            </a:r>
+            <a:r>
+              <a:rPr b="0" lang="en-US" sz="2800" spc="-1" strike="noStrike">
+                <a:solidFill>
+                  <a:srgbClr val="002060"/>
+                </a:solidFill>
+                <a:latin typeface="Calibri"/>
+              </a:rPr>
+              <a:t>) role is called a </a:t>
+            </a:r>
+            <a:r>
+              <a:rPr b="1" lang="en-US" sz="2800" spc="-1" strike="noStrike">
+                <a:solidFill>
+                  <a:srgbClr val="002060"/>
+                </a:solidFill>
+                <a:latin typeface="Calibri"/>
+              </a:rPr>
+              <a:t>domain controller</a:t>
+            </a:r>
+            <a:r>
+              <a:rPr b="0" lang="en-US" sz="2800" spc="-1" strike="noStrike">
+                <a:solidFill>
+                  <a:srgbClr val="002060"/>
+                </a:solidFill>
+                <a:latin typeface="Calibri"/>
+              </a:rPr>
+              <a:t>.</a:t>
+            </a:r>
+            <a:endParaRPr b="0" lang="en-US" sz="2800" spc="-1" strike="noStrike">
+              <a:latin typeface="Arial"/>
+            </a:endParaRPr>
+          </a:p>
+          <a:p>
+            <a:pPr marL="343080" indent="-342360">
+              <a:lnSpc>
+                <a:spcPct val="100000"/>
+              </a:lnSpc>
+              <a:spcBef>
+                <a:spcPts val="561"/>
+              </a:spcBef>
+              <a:buClr>
+                <a:srgbClr val="002060"/>
+              </a:buClr>
+              <a:buFont typeface="Arial"/>
+              <a:buChar char="•"/>
+            </a:pPr>
+            <a:r>
+              <a:rPr b="0" lang="en-US" sz="2800" spc="-1" strike="noStrike">
+                <a:solidFill>
+                  <a:srgbClr val="002060"/>
+                </a:solidFill>
+                <a:latin typeface="Calibri"/>
+              </a:rPr>
+              <a:t>It authenticates and authorizes all users and computers.</a:t>
+            </a:r>
+            <a:endParaRPr b="0" lang="en-US" sz="2800" spc="-1" strike="noStrike">
+              <a:latin typeface="Arial"/>
+            </a:endParaRPr>
+          </a:p>
+          <a:p>
+            <a:pPr marL="343080" indent="-342360">
+              <a:lnSpc>
+                <a:spcPct val="100000"/>
+              </a:lnSpc>
+              <a:spcBef>
+                <a:spcPts val="561"/>
+              </a:spcBef>
+              <a:buClr>
+                <a:srgbClr val="002060"/>
+              </a:buClr>
+              <a:buFont typeface="Arial"/>
+              <a:buChar char="•"/>
+            </a:pPr>
+            <a:r>
+              <a:rPr b="0" lang="en-US" sz="2800" spc="-1" strike="noStrike">
+                <a:solidFill>
+                  <a:srgbClr val="002060"/>
+                </a:solidFill>
+                <a:latin typeface="Calibri"/>
+              </a:rPr>
+              <a:t>A domain controller is contacted when a user logs into a device.</a:t>
+            </a:r>
+            <a:endParaRPr b="0" lang="en-US" sz="2800" spc="-1" strike="noStrike">
+              <a:latin typeface="Arial"/>
+            </a:endParaRPr>
+          </a:p>
+          <a:p>
+            <a:pPr marL="343080" indent="-342360">
+              <a:lnSpc>
+                <a:spcPct val="100000"/>
+              </a:lnSpc>
+              <a:spcBef>
+                <a:spcPts val="561"/>
+              </a:spcBef>
+              <a:buClr>
+                <a:srgbClr val="002060"/>
+              </a:buClr>
+              <a:buFont typeface="Arial"/>
+              <a:buChar char="•"/>
+            </a:pPr>
+            <a:r>
+              <a:rPr b="0" lang="en-US" sz="2800" spc="-1" strike="noStrike">
+                <a:solidFill>
+                  <a:srgbClr val="002060"/>
+                </a:solidFill>
+                <a:latin typeface="Calibri"/>
+              </a:rPr>
+              <a:t>OR accesses another device across the network.</a:t>
+            </a:r>
+            <a:endParaRPr b="0" lang="en-US" sz="2800" spc="-1" strike="noStrike">
+              <a:latin typeface="Arial"/>
+            </a:endParaRPr>
+          </a:p>
+          <a:p>
+            <a:pPr>
+              <a:lnSpc>
+                <a:spcPct val="100000"/>
+              </a:lnSpc>
+              <a:spcBef>
+                <a:spcPts val="561"/>
+              </a:spcBef>
+            </a:pPr>
             <a:endParaRPr b="0" lang="en-US" sz="2800" spc="-1" strike="noStrike">
               <a:latin typeface="Arial"/>
             </a:endParaRPr>

</xml_diff>

<commit_message>
this is my third file
</commit_message>
<xml_diff>
--- a/active.pptx
+++ b/active.pptx
@@ -14,6 +14,7 @@
     <p:sldId id="259" r:id="rId9"/>
     <p:sldId id="260" r:id="rId10"/>
     <p:sldId id="261" r:id="rId11"/>
+    <p:sldId id="262" r:id="rId12"/>
   </p:sldIdLst>
   <p:sldSz cx="9144000" cy="5143500"/>
   <p:notesSz cx="7772400" cy="10058400"/>
@@ -5626,7 +5627,7 @@
                 <a:spcPct val="100000"/>
               </a:lnSpc>
             </a:pPr>
-            <a:fld id="{3BC6EDB1-C675-4D82-8A1E-B7036DA8D3B7}" type="datetime">
+            <a:fld id="{BB727AB9-4C1D-4941-AD3E-3FAA8CF7C53E}" type="datetime">
               <a:rPr b="0" lang="en-US" sz="1200" spc="-1" strike="noStrike">
                 <a:solidFill>
                   <a:srgbClr val="8b8b8b"/>
@@ -5700,7 +5701,7 @@
                 <a:spcPct val="100000"/>
               </a:lnSpc>
             </a:pPr>
-            <a:fld id="{D2577B28-85D0-48E6-A072-B4C72ED89E3E}" type="slidenum">
+            <a:fld id="{BFFA3FD0-F61D-4B3A-9029-FCBE6418A716}" type="slidenum">
               <a:rPr b="0" lang="en-US" sz="1200" spc="-1" strike="noStrike">
                 <a:solidFill>
                   <a:srgbClr val="8b8b8b"/>
@@ -6303,7 +6304,7 @@
                 <a:spcPct val="100000"/>
               </a:lnSpc>
             </a:pPr>
-            <a:fld id="{995C099C-1641-4102-99B6-485C65AF1D25}" type="datetime">
+            <a:fld id="{AB314100-46B5-4CAA-86ED-3E455E15307C}" type="datetime">
               <a:rPr b="0" lang="en-US" sz="1200" spc="-1" strike="noStrike">
                 <a:solidFill>
                   <a:srgbClr val="8b8b8b"/>
@@ -6377,7 +6378,7 @@
                 <a:spcPct val="100000"/>
               </a:lnSpc>
             </a:pPr>
-            <a:fld id="{9746EA99-B3AA-403A-901C-0430F71FE070}" type="slidenum">
+            <a:fld id="{2C09B0DD-1FD0-409D-AE4A-7246399319AE}" type="slidenum">
               <a:rPr b="0" lang="en-US" sz="1200" spc="-1" strike="noStrike">
                 <a:solidFill>
                   <a:srgbClr val="8b8b8b"/>
@@ -6759,7 +6760,7 @@
                 <a:spcPct val="100000"/>
               </a:lnSpc>
             </a:pPr>
-            <a:fld id="{2FC2CEF4-E8A3-4DF9-9DD1-C7D7846E48F8}" type="datetime">
+            <a:fld id="{FBDF09EF-0FB2-4AF5-AE78-B79AAD609F24}" type="datetime">
               <a:rPr b="0" lang="en-US" sz="1200" spc="-1" strike="noStrike">
                 <a:solidFill>
                   <a:srgbClr val="8b8b8b"/>
@@ -6833,7 +6834,7 @@
                 <a:spcPct val="100000"/>
               </a:lnSpc>
             </a:pPr>
-            <a:fld id="{A9B2D34F-7BAD-43D4-B940-BFB886D9F2FD}" type="slidenum">
+            <a:fld id="{9DC7770E-76C9-445F-A72F-080AB554EBAD}" type="slidenum">
               <a:rPr b="0" lang="en-US" sz="1200" spc="-1" strike="noStrike">
                 <a:solidFill>
                   <a:srgbClr val="8b8b8b"/>
@@ -8457,6 +8458,256 @@
                 <a:latin typeface="Calibri"/>
               </a:rPr>
               <a:t>OR accesses another device across the network.</a:t>
+            </a:r>
+            <a:endParaRPr b="0" lang="en-US" sz="2800" spc="-1" strike="noStrike">
+              <a:latin typeface="Arial"/>
+            </a:endParaRPr>
+          </a:p>
+          <a:p>
+            <a:pPr>
+              <a:lnSpc>
+                <a:spcPct val="100000"/>
+              </a:lnSpc>
+              <a:spcBef>
+                <a:spcPts val="561"/>
+              </a:spcBef>
+            </a:pPr>
+            <a:endParaRPr b="0" lang="en-US" sz="2800" spc="-1" strike="noStrike">
+              <a:latin typeface="Arial"/>
+            </a:endParaRPr>
+          </a:p>
+        </p:txBody>
+      </p:sp>
+    </p:spTree>
+  </p:cSld>
+  <mc:AlternateContent>
+    <mc:Choice Requires="p14">
+      <p:transition spd="slow" p14:dur="2000"/>
+    </mc:Choice>
+    <mc:Fallback>
+      <p:transition spd="slow"/>
+    </mc:Fallback>
+  </mc:AlternateContent>
+</p:sld>
+</file>
+
+<file path=ppt/slides/slide7.xml><?xml version="1.0" encoding="utf-8"?>
+<p:sld xmlns:a="http://schemas.openxmlformats.org/drawingml/2006/main" xmlns:p="http://schemas.openxmlformats.org/presentationml/2006/main" xmlns:r="http://schemas.openxmlformats.org/officeDocument/2006/relationships" xmlns:p14="http://schemas.microsoft.com/office/powerpoint/2010/main" xmlns:p15="http://schemas.microsoft.com/office/powerpoint/2012/main" xmlns:mc="http://schemas.openxmlformats.org/markup-compatibility/2006">
+  <p:cSld>
+    <p:spTree>
+      <p:nvGrpSpPr>
+        <p:cNvPr id="1" name=""/>
+        <p:cNvGrpSpPr/>
+        <p:nvPr/>
+      </p:nvGrpSpPr>
+      <p:grpSpPr>
+        <a:xfrm>
+          <a:off x="0" y="0"/>
+          <a:ext cx="0" cy="0"/>
+          <a:chOff x="0" y="0"/>
+          <a:chExt cx="0" cy="0"/>
+        </a:xfrm>
+      </p:grpSpPr>
+      <p:sp>
+        <p:nvSpPr>
+          <p:cNvPr id="175" name="CustomShape 1"/>
+          <p:cNvSpPr/>
+          <p:nvPr/>
+        </p:nvSpPr>
+        <p:spPr>
+          <a:xfrm>
+            <a:off x="448920" y="586440"/>
+            <a:ext cx="8245440" cy="762840"/>
+          </a:xfrm>
+          <a:prstGeom prst="rect">
+            <a:avLst/>
+          </a:prstGeom>
+          <a:noFill/>
+          <a:ln>
+            <a:noFill/>
+          </a:ln>
+        </p:spPr>
+        <p:style>
+          <a:lnRef idx="0"/>
+          <a:fillRef idx="0"/>
+          <a:effectRef idx="0"/>
+          <a:fontRef idx="minor"/>
+        </p:style>
+        <p:txBody>
+          <a:bodyPr lIns="90000" rIns="90000" tIns="45000" bIns="45000" anchor="ctr">
+            <a:noAutofit/>
+          </a:bodyPr>
+          <a:p>
+            <a:pPr>
+              <a:lnSpc>
+                <a:spcPct val="100000"/>
+              </a:lnSpc>
+            </a:pPr>
+            <a:r>
+              <a:rPr b="0" lang="en-US" sz="3600" spc="-1" strike="noStrike">
+                <a:solidFill>
+                  <a:srgbClr val="7030a0"/>
+                </a:solidFill>
+                <a:latin typeface="Calibri"/>
+              </a:rPr>
+              <a:t>Domain Services</a:t>
+            </a:r>
+            <a:endParaRPr b="0" lang="en-US" sz="3600" spc="-1" strike="noStrike">
+              <a:latin typeface="Arial"/>
+            </a:endParaRPr>
+          </a:p>
+        </p:txBody>
+      </p:sp>
+      <p:sp>
+        <p:nvSpPr>
+          <p:cNvPr id="176" name="CustomShape 2"/>
+          <p:cNvSpPr/>
+          <p:nvPr/>
+        </p:nvSpPr>
+        <p:spPr>
+          <a:xfrm>
+            <a:off x="448920" y="1502640"/>
+            <a:ext cx="8245440" cy="3206160"/>
+          </a:xfrm>
+          <a:prstGeom prst="rect">
+            <a:avLst/>
+          </a:prstGeom>
+          <a:noFill/>
+          <a:ln>
+            <a:noFill/>
+          </a:ln>
+        </p:spPr>
+        <p:style>
+          <a:lnRef idx="0"/>
+          <a:fillRef idx="0"/>
+          <a:effectRef idx="0"/>
+          <a:fontRef idx="minor"/>
+        </p:style>
+        <p:txBody>
+          <a:bodyPr lIns="90000" rIns="90000" tIns="45000" bIns="45000">
+            <a:noAutofit/>
+          </a:bodyPr>
+          <a:p>
+            <a:pPr marL="343080" indent="-342360">
+              <a:lnSpc>
+                <a:spcPct val="100000"/>
+              </a:lnSpc>
+              <a:spcBef>
+                <a:spcPts val="561"/>
+              </a:spcBef>
+              <a:buClr>
+                <a:srgbClr val="002060"/>
+              </a:buClr>
+              <a:buFont typeface="Arial"/>
+              <a:buChar char="•"/>
+            </a:pPr>
+            <a:r>
+              <a:rPr b="0" lang="en-US" sz="2800" spc="-1" strike="noStrike">
+                <a:solidFill>
+                  <a:srgbClr val="002060"/>
+                </a:solidFill>
+                <a:latin typeface="Calibri"/>
+              </a:rPr>
+              <a:t>Active Directory Domain Services (AD DS) is the foundation stone of every Windows domain network.</a:t>
+            </a:r>
+            <a:endParaRPr b="0" lang="en-US" sz="2800" spc="-1" strike="noStrike">
+              <a:latin typeface="Arial"/>
+            </a:endParaRPr>
+          </a:p>
+          <a:p>
+            <a:pPr marL="343080" indent="-342360">
+              <a:lnSpc>
+                <a:spcPct val="100000"/>
+              </a:lnSpc>
+              <a:spcBef>
+                <a:spcPts val="561"/>
+              </a:spcBef>
+              <a:buClr>
+                <a:srgbClr val="002060"/>
+              </a:buClr>
+              <a:buFont typeface="Arial"/>
+              <a:buChar char="•"/>
+            </a:pPr>
+            <a:r>
+              <a:rPr b="0" lang="en-US" sz="2800" spc="-1" strike="noStrike">
+                <a:solidFill>
+                  <a:srgbClr val="002060"/>
+                </a:solidFill>
+                <a:latin typeface="Calibri"/>
+              </a:rPr>
+              <a:t>It stores information about members of the domain.</a:t>
+            </a:r>
+            <a:endParaRPr b="0" lang="en-US" sz="2800" spc="-1" strike="noStrike">
+              <a:latin typeface="Arial"/>
+            </a:endParaRPr>
+          </a:p>
+          <a:p>
+            <a:pPr marL="343080" indent="-342360">
+              <a:lnSpc>
+                <a:spcPct val="100000"/>
+              </a:lnSpc>
+              <a:spcBef>
+                <a:spcPts val="561"/>
+              </a:spcBef>
+              <a:buClr>
+                <a:srgbClr val="002060"/>
+              </a:buClr>
+              <a:buFont typeface="Arial"/>
+              <a:buChar char="•"/>
+            </a:pPr>
+            <a:r>
+              <a:rPr b="0" lang="en-US" sz="2800" spc="-1" strike="noStrike">
+                <a:solidFill>
+                  <a:srgbClr val="002060"/>
+                </a:solidFill>
+                <a:latin typeface="Calibri"/>
+              </a:rPr>
+              <a:t>Defines their access rights.</a:t>
+            </a:r>
+            <a:endParaRPr b="0" lang="en-US" sz="2800" spc="-1" strike="noStrike">
+              <a:latin typeface="Arial"/>
+            </a:endParaRPr>
+          </a:p>
+          <a:p>
+            <a:pPr marL="343080" indent="-342360">
+              <a:lnSpc>
+                <a:spcPct val="100000"/>
+              </a:lnSpc>
+              <a:spcBef>
+                <a:spcPts val="561"/>
+              </a:spcBef>
+              <a:buClr>
+                <a:srgbClr val="002060"/>
+              </a:buClr>
+              <a:buFont typeface="Arial"/>
+              <a:buChar char="•"/>
+            </a:pPr>
+            <a:r>
+              <a:rPr b="0" lang="en-US" sz="2800" spc="-1" strike="noStrike">
+                <a:solidFill>
+                  <a:srgbClr val="002060"/>
+                </a:solidFill>
+                <a:latin typeface="Calibri"/>
+              </a:rPr>
+              <a:t>The server running this service is called a </a:t>
+            </a:r>
+            <a:r>
+              <a:rPr b="1" lang="en-US" sz="2800" spc="-1" strike="noStrike">
+                <a:solidFill>
+                  <a:srgbClr val="002060"/>
+                </a:solidFill>
+                <a:latin typeface="Calibri"/>
+              </a:rPr>
+              <a:t>domain controller</a:t>
+            </a:r>
+            <a:r>
+              <a:rPr b="0" lang="en-US" sz="2800" spc="-1" strike="noStrike">
+                <a:solidFill>
+                  <a:srgbClr val="002060"/>
+                </a:solidFill>
+                <a:latin typeface="Calibri"/>
+              </a:rPr>
+              <a:t>. </a:t>
             </a:r>
             <a:endParaRPr b="0" lang="en-US" sz="2800" spc="-1" strike="noStrike">
               <a:latin typeface="Arial"/>

</xml_diff>

<commit_message>
and this is fourth file
</commit_message>
<xml_diff>
--- a/active.pptx
+++ b/active.pptx
@@ -15,6 +15,7 @@
     <p:sldId id="260" r:id="rId10"/>
     <p:sldId id="261" r:id="rId11"/>
     <p:sldId id="262" r:id="rId12"/>
+    <p:sldId id="263" r:id="rId13"/>
   </p:sldIdLst>
   <p:sldSz cx="9144000" cy="5143500"/>
   <p:notesSz cx="7772400" cy="10058400"/>
@@ -5627,7 +5628,7 @@
                 <a:spcPct val="100000"/>
               </a:lnSpc>
             </a:pPr>
-            <a:fld id="{BB727AB9-4C1D-4941-AD3E-3FAA8CF7C53E}" type="datetime">
+            <a:fld id="{66FA940B-24D4-4C2B-8C54-7F042080A0A7}" type="datetime">
               <a:rPr b="0" lang="en-US" sz="1200" spc="-1" strike="noStrike">
                 <a:solidFill>
                   <a:srgbClr val="8b8b8b"/>
@@ -5701,7 +5702,7 @@
                 <a:spcPct val="100000"/>
               </a:lnSpc>
             </a:pPr>
-            <a:fld id="{BFFA3FD0-F61D-4B3A-9029-FCBE6418A716}" type="slidenum">
+            <a:fld id="{51BD6916-EC80-4ECC-8570-0C5896C2CA02}" type="slidenum">
               <a:rPr b="0" lang="en-US" sz="1200" spc="-1" strike="noStrike">
                 <a:solidFill>
                   <a:srgbClr val="8b8b8b"/>
@@ -6304,7 +6305,7 @@
                 <a:spcPct val="100000"/>
               </a:lnSpc>
             </a:pPr>
-            <a:fld id="{AB314100-46B5-4CAA-86ED-3E455E15307C}" type="datetime">
+            <a:fld id="{C08CAEFB-D9DE-4160-8AEE-BC9AA13692E8}" type="datetime">
               <a:rPr b="0" lang="en-US" sz="1200" spc="-1" strike="noStrike">
                 <a:solidFill>
                   <a:srgbClr val="8b8b8b"/>
@@ -6378,7 +6379,7 @@
                 <a:spcPct val="100000"/>
               </a:lnSpc>
             </a:pPr>
-            <a:fld id="{2C09B0DD-1FD0-409D-AE4A-7246399319AE}" type="slidenum">
+            <a:fld id="{6C5041EC-A7AD-4E29-84CD-9C9AD51B8572}" type="slidenum">
               <a:rPr b="0" lang="en-US" sz="1200" spc="-1" strike="noStrike">
                 <a:solidFill>
                   <a:srgbClr val="8b8b8b"/>
@@ -6760,7 +6761,7 @@
                 <a:spcPct val="100000"/>
               </a:lnSpc>
             </a:pPr>
-            <a:fld id="{FBDF09EF-0FB2-4AF5-AE78-B79AAD609F24}" type="datetime">
+            <a:fld id="{638A839C-E90E-4516-B32F-1F7FB70BA933}" type="datetime">
               <a:rPr b="0" lang="en-US" sz="1200" spc="-1" strike="noStrike">
                 <a:solidFill>
                   <a:srgbClr val="8b8b8b"/>
@@ -6834,7 +6835,7 @@
                 <a:spcPct val="100000"/>
               </a:lnSpc>
             </a:pPr>
-            <a:fld id="{9DC7770E-76C9-445F-A72F-080AB554EBAD}" type="slidenum">
+            <a:fld id="{143BD2A4-96E7-43C4-B98C-D0A263AE53D2}" type="slidenum">
               <a:rPr b="0" lang="en-US" sz="1200" spc="-1" strike="noStrike">
                 <a:solidFill>
                   <a:srgbClr val="8b8b8b"/>
@@ -8708,6 +8709,265 @@
                 <a:latin typeface="Calibri"/>
               </a:rPr>
               <a:t>. </a:t>
+            </a:r>
+            <a:endParaRPr b="0" lang="en-US" sz="2800" spc="-1" strike="noStrike">
+              <a:latin typeface="Arial"/>
+            </a:endParaRPr>
+          </a:p>
+          <a:p>
+            <a:pPr>
+              <a:lnSpc>
+                <a:spcPct val="100000"/>
+              </a:lnSpc>
+              <a:spcBef>
+                <a:spcPts val="561"/>
+              </a:spcBef>
+            </a:pPr>
+            <a:endParaRPr b="0" lang="en-US" sz="2800" spc="-1" strike="noStrike">
+              <a:latin typeface="Arial"/>
+            </a:endParaRPr>
+          </a:p>
+        </p:txBody>
+      </p:sp>
+    </p:spTree>
+  </p:cSld>
+  <mc:AlternateContent>
+    <mc:Choice Requires="p14">
+      <p:transition spd="slow" p14:dur="2000"/>
+    </mc:Choice>
+    <mc:Fallback>
+      <p:transition spd="slow"/>
+    </mc:Fallback>
+  </mc:AlternateContent>
+</p:sld>
+</file>
+
+<file path=ppt/slides/slide8.xml><?xml version="1.0" encoding="utf-8"?>
+<p:sld xmlns:a="http://schemas.openxmlformats.org/drawingml/2006/main" xmlns:p="http://schemas.openxmlformats.org/presentationml/2006/main" xmlns:r="http://schemas.openxmlformats.org/officeDocument/2006/relationships" xmlns:p14="http://schemas.microsoft.com/office/powerpoint/2010/main" xmlns:p15="http://schemas.microsoft.com/office/powerpoint/2012/main" xmlns:mc="http://schemas.openxmlformats.org/markup-compatibility/2006">
+  <p:cSld>
+    <p:spTree>
+      <p:nvGrpSpPr>
+        <p:cNvPr id="1" name=""/>
+        <p:cNvGrpSpPr/>
+        <p:nvPr/>
+      </p:nvGrpSpPr>
+      <p:grpSpPr>
+        <a:xfrm>
+          <a:off x="0" y="0"/>
+          <a:ext cx="0" cy="0"/>
+          <a:chOff x="0" y="0"/>
+          <a:chExt cx="0" cy="0"/>
+        </a:xfrm>
+      </p:grpSpPr>
+      <p:sp>
+        <p:nvSpPr>
+          <p:cNvPr id="177" name="CustomShape 1"/>
+          <p:cNvSpPr/>
+          <p:nvPr/>
+        </p:nvSpPr>
+        <p:spPr>
+          <a:xfrm>
+            <a:off x="448920" y="586440"/>
+            <a:ext cx="8245440" cy="762840"/>
+          </a:xfrm>
+          <a:prstGeom prst="rect">
+            <a:avLst/>
+          </a:prstGeom>
+          <a:noFill/>
+          <a:ln>
+            <a:noFill/>
+          </a:ln>
+        </p:spPr>
+        <p:style>
+          <a:lnRef idx="0"/>
+          <a:fillRef idx="0"/>
+          <a:effectRef idx="0"/>
+          <a:fontRef idx="minor"/>
+        </p:style>
+        <p:txBody>
+          <a:bodyPr lIns="90000" rIns="90000" tIns="45000" bIns="45000" anchor="ctr">
+            <a:noAutofit/>
+          </a:bodyPr>
+          <a:p>
+            <a:pPr>
+              <a:lnSpc>
+                <a:spcPct val="100000"/>
+              </a:lnSpc>
+            </a:pPr>
+            <a:r>
+              <a:rPr b="0" lang="en-US" sz="3600" spc="-1" strike="noStrike">
+                <a:solidFill>
+                  <a:srgbClr val="7030a0"/>
+                </a:solidFill>
+                <a:latin typeface="Calibri"/>
+              </a:rPr>
+              <a:t>Domain Services Examples</a:t>
+            </a:r>
+            <a:endParaRPr b="0" lang="en-US" sz="3600" spc="-1" strike="noStrike">
+              <a:latin typeface="Arial"/>
+            </a:endParaRPr>
+          </a:p>
+        </p:txBody>
+      </p:sp>
+      <p:sp>
+        <p:nvSpPr>
+          <p:cNvPr id="178" name="CustomShape 2"/>
+          <p:cNvSpPr/>
+          <p:nvPr/>
+        </p:nvSpPr>
+        <p:spPr>
+          <a:xfrm>
+            <a:off x="448920" y="1502640"/>
+            <a:ext cx="8245440" cy="3206160"/>
+          </a:xfrm>
+          <a:prstGeom prst="rect">
+            <a:avLst/>
+          </a:prstGeom>
+          <a:noFill/>
+          <a:ln>
+            <a:noFill/>
+          </a:ln>
+        </p:spPr>
+        <p:style>
+          <a:lnRef idx="0"/>
+          <a:fillRef idx="0"/>
+          <a:effectRef idx="0"/>
+          <a:fontRef idx="minor"/>
+        </p:style>
+        <p:txBody>
+          <a:bodyPr lIns="90000" rIns="90000" tIns="45000" bIns="45000">
+            <a:noAutofit/>
+          </a:bodyPr>
+          <a:p>
+            <a:pPr marL="343080" indent="-342360">
+              <a:lnSpc>
+                <a:spcPct val="100000"/>
+              </a:lnSpc>
+              <a:spcBef>
+                <a:spcPts val="561"/>
+              </a:spcBef>
+              <a:buClr>
+                <a:srgbClr val="002060"/>
+              </a:buClr>
+              <a:buFont typeface="Arial"/>
+              <a:buChar char="•"/>
+            </a:pPr>
+            <a:r>
+              <a:rPr b="0" lang="en-US" sz="2800" spc="-1" strike="noStrike">
+                <a:solidFill>
+                  <a:srgbClr val="002060"/>
+                </a:solidFill>
+                <a:latin typeface="Calibri"/>
+              </a:rPr>
+              <a:t>Group Policy</a:t>
+            </a:r>
+            <a:endParaRPr b="0" lang="en-US" sz="2800" spc="-1" strike="noStrike">
+              <a:latin typeface="Arial"/>
+            </a:endParaRPr>
+          </a:p>
+          <a:p>
+            <a:pPr marL="343080" indent="-342360">
+              <a:lnSpc>
+                <a:spcPct val="100000"/>
+              </a:lnSpc>
+              <a:spcBef>
+                <a:spcPts val="561"/>
+              </a:spcBef>
+              <a:buClr>
+                <a:srgbClr val="002060"/>
+              </a:buClr>
+              <a:buFont typeface="Arial"/>
+              <a:buChar char="•"/>
+            </a:pPr>
+            <a:r>
+              <a:rPr b="0" lang="en-US" sz="2800" spc="-1" strike="noStrike">
+                <a:solidFill>
+                  <a:srgbClr val="002060"/>
+                </a:solidFill>
+                <a:latin typeface="Calibri"/>
+              </a:rPr>
+              <a:t>Encrypting File System</a:t>
+            </a:r>
+            <a:endParaRPr b="0" lang="en-US" sz="2800" spc="-1" strike="noStrike">
+              <a:latin typeface="Arial"/>
+            </a:endParaRPr>
+          </a:p>
+          <a:p>
+            <a:pPr marL="343080" indent="-342360">
+              <a:lnSpc>
+                <a:spcPct val="100000"/>
+              </a:lnSpc>
+              <a:spcBef>
+                <a:spcPts val="561"/>
+              </a:spcBef>
+              <a:buClr>
+                <a:srgbClr val="002060"/>
+              </a:buClr>
+              <a:buFont typeface="Arial"/>
+              <a:buChar char="•"/>
+            </a:pPr>
+            <a:r>
+              <a:rPr b="0" lang="en-US" sz="2800" spc="-1" strike="noStrike">
+                <a:solidFill>
+                  <a:srgbClr val="002060"/>
+                </a:solidFill>
+                <a:latin typeface="Calibri"/>
+              </a:rPr>
+              <a:t>BitLocker</a:t>
+            </a:r>
+            <a:endParaRPr b="0" lang="en-US" sz="2800" spc="-1" strike="noStrike">
+              <a:latin typeface="Arial"/>
+            </a:endParaRPr>
+          </a:p>
+          <a:p>
+            <a:pPr marL="343080" indent="-342360">
+              <a:lnSpc>
+                <a:spcPct val="100000"/>
+              </a:lnSpc>
+              <a:spcBef>
+                <a:spcPts val="561"/>
+              </a:spcBef>
+              <a:buClr>
+                <a:srgbClr val="002060"/>
+              </a:buClr>
+              <a:buFont typeface="Arial"/>
+              <a:buChar char="•"/>
+            </a:pPr>
+            <a:r>
+              <a:rPr b="0" lang="en-US" sz="2800" spc="-1" strike="noStrike">
+                <a:solidFill>
+                  <a:srgbClr val="002060"/>
+                </a:solidFill>
+                <a:latin typeface="Calibri"/>
+              </a:rPr>
+              <a:t>Domain Name Services</a:t>
+            </a:r>
+            <a:endParaRPr b="0" lang="en-US" sz="2800" spc="-1" strike="noStrike">
+              <a:latin typeface="Arial"/>
+            </a:endParaRPr>
+          </a:p>
+          <a:p>
+            <a:pPr marL="343080" indent="-342360">
+              <a:lnSpc>
+                <a:spcPct val="100000"/>
+              </a:lnSpc>
+              <a:spcBef>
+                <a:spcPts val="561"/>
+              </a:spcBef>
+              <a:buClr>
+                <a:srgbClr val="002060"/>
+              </a:buClr>
+              <a:buFont typeface="Arial"/>
+              <a:buChar char="•"/>
+            </a:pPr>
+            <a:r>
+              <a:rPr b="0" lang="en-US" sz="2800" spc="-1" strike="noStrike">
+                <a:solidFill>
+                  <a:srgbClr val="002060"/>
+                </a:solidFill>
+                <a:latin typeface="Calibri"/>
+              </a:rPr>
+              <a:t>Remote Desktop Services</a:t>
             </a:r>
             <a:endParaRPr b="0" lang="en-US" sz="2800" spc="-1" strike="noStrike">
               <a:latin typeface="Arial"/>

</xml_diff>

<commit_message>
this is fourth file
</commit_message>
<xml_diff>
--- a/active.pptx
+++ b/active.pptx
@@ -5628,7 +5628,7 @@
                 <a:spcPct val="100000"/>
               </a:lnSpc>
             </a:pPr>
-            <a:fld id="{66FA940B-24D4-4C2B-8C54-7F042080A0A7}" type="datetime">
+            <a:fld id="{300D9417-F325-4760-983C-DFA8FF593B91}" type="datetime">
               <a:rPr b="0" lang="en-US" sz="1200" spc="-1" strike="noStrike">
                 <a:solidFill>
                   <a:srgbClr val="8b8b8b"/>
@@ -5702,7 +5702,7 @@
                 <a:spcPct val="100000"/>
               </a:lnSpc>
             </a:pPr>
-            <a:fld id="{51BD6916-EC80-4ECC-8570-0C5896C2CA02}" type="slidenum">
+            <a:fld id="{23C30007-CA9E-47A5-8169-5CB135F287D2}" type="slidenum">
               <a:rPr b="0" lang="en-US" sz="1200" spc="-1" strike="noStrike">
                 <a:solidFill>
                   <a:srgbClr val="8b8b8b"/>
@@ -6305,7 +6305,7 @@
                 <a:spcPct val="100000"/>
               </a:lnSpc>
             </a:pPr>
-            <a:fld id="{C08CAEFB-D9DE-4160-8AEE-BC9AA13692E8}" type="datetime">
+            <a:fld id="{33E426FF-B49F-46EB-97F5-DAF779AE7795}" type="datetime">
               <a:rPr b="0" lang="en-US" sz="1200" spc="-1" strike="noStrike">
                 <a:solidFill>
                   <a:srgbClr val="8b8b8b"/>
@@ -6379,7 +6379,7 @@
                 <a:spcPct val="100000"/>
               </a:lnSpc>
             </a:pPr>
-            <a:fld id="{6C5041EC-A7AD-4E29-84CD-9C9AD51B8572}" type="slidenum">
+            <a:fld id="{A4EFC3E1-D9FC-474F-B2D3-A46242A7579D}" type="slidenum">
               <a:rPr b="0" lang="en-US" sz="1200" spc="-1" strike="noStrike">
                 <a:solidFill>
                   <a:srgbClr val="8b8b8b"/>
@@ -6761,7 +6761,7 @@
                 <a:spcPct val="100000"/>
               </a:lnSpc>
             </a:pPr>
-            <a:fld id="{638A839C-E90E-4516-B32F-1F7FB70BA933}" type="datetime">
+            <a:fld id="{1B5A2E96-9B0C-4BE8-A66A-5A4201F12DF4}" type="datetime">
               <a:rPr b="0" lang="en-US" sz="1200" spc="-1" strike="noStrike">
                 <a:solidFill>
                   <a:srgbClr val="8b8b8b"/>
@@ -6835,7 +6835,7 @@
                 <a:spcPct val="100000"/>
               </a:lnSpc>
             </a:pPr>
-            <a:fld id="{143BD2A4-96E7-43C4-B98C-D0A263AE53D2}" type="slidenum">
+            <a:fld id="{4B9D80BA-2FA2-442E-B7D4-E157B1E45553}" type="slidenum">
               <a:rPr b="0" lang="en-US" sz="1200" spc="-1" strike="noStrike">
                 <a:solidFill>
                   <a:srgbClr val="8b8b8b"/>

</xml_diff>

<commit_message>
i remove the groups
</commit_message>
<xml_diff>
--- a/active.pptx
+++ b/active.pptx
@@ -63,7 +63,7 @@
       </p:grpSpPr>
       <p:sp>
         <p:nvSpPr>
-          <p:cNvPr id="27" name="PlaceHolder 1"/>
+          <p:cNvPr id="24" name="PlaceHolder 1"/>
           <p:cNvSpPr>
             <a:spLocks noGrp="1"/>
           </p:cNvSpPr>
@@ -94,7 +94,7 @@
       </p:sp>
       <p:sp>
         <p:nvSpPr>
-          <p:cNvPr id="28" name="PlaceHolder 2"/>
+          <p:cNvPr id="25" name="PlaceHolder 2"/>
           <p:cNvSpPr>
             <a:spLocks noGrp="1"/>
           </p:cNvSpPr>
@@ -124,7 +124,7 @@
       </p:sp>
       <p:sp>
         <p:nvSpPr>
-          <p:cNvPr id="29" name="PlaceHolder 3"/>
+          <p:cNvPr id="26" name="PlaceHolder 3"/>
           <p:cNvSpPr>
             <a:spLocks noGrp="1"/>
           </p:cNvSpPr>
@@ -176,7 +176,7 @@
       </p:grpSpPr>
       <p:sp>
         <p:nvSpPr>
-          <p:cNvPr id="30" name="PlaceHolder 1"/>
+          <p:cNvPr id="27" name="PlaceHolder 1"/>
           <p:cNvSpPr>
             <a:spLocks noGrp="1"/>
           </p:cNvSpPr>
@@ -207,7 +207,7 @@
       </p:sp>
       <p:sp>
         <p:nvSpPr>
-          <p:cNvPr id="31" name="PlaceHolder 2"/>
+          <p:cNvPr id="28" name="PlaceHolder 2"/>
           <p:cNvSpPr>
             <a:spLocks noGrp="1"/>
           </p:cNvSpPr>
@@ -237,7 +237,7 @@
       </p:sp>
       <p:sp>
         <p:nvSpPr>
-          <p:cNvPr id="32" name="PlaceHolder 3"/>
+          <p:cNvPr id="29" name="PlaceHolder 3"/>
           <p:cNvSpPr>
             <a:spLocks noGrp="1"/>
           </p:cNvSpPr>
@@ -267,7 +267,7 @@
       </p:sp>
       <p:sp>
         <p:nvSpPr>
-          <p:cNvPr id="33" name="PlaceHolder 4"/>
+          <p:cNvPr id="30" name="PlaceHolder 4"/>
           <p:cNvSpPr>
             <a:spLocks noGrp="1"/>
           </p:cNvSpPr>
@@ -297,7 +297,7 @@
       </p:sp>
       <p:sp>
         <p:nvSpPr>
-          <p:cNvPr id="34" name="PlaceHolder 5"/>
+          <p:cNvPr id="31" name="PlaceHolder 5"/>
           <p:cNvSpPr>
             <a:spLocks noGrp="1"/>
           </p:cNvSpPr>
@@ -349,7 +349,7 @@
       </p:grpSpPr>
       <p:sp>
         <p:nvSpPr>
-          <p:cNvPr id="35" name="PlaceHolder 1"/>
+          <p:cNvPr id="32" name="PlaceHolder 1"/>
           <p:cNvSpPr>
             <a:spLocks noGrp="1"/>
           </p:cNvSpPr>
@@ -380,7 +380,7 @@
       </p:sp>
       <p:sp>
         <p:nvSpPr>
-          <p:cNvPr id="36" name="PlaceHolder 2"/>
+          <p:cNvPr id="33" name="PlaceHolder 2"/>
           <p:cNvSpPr>
             <a:spLocks noGrp="1"/>
           </p:cNvSpPr>
@@ -410,7 +410,7 @@
       </p:sp>
       <p:sp>
         <p:nvSpPr>
-          <p:cNvPr id="37" name="PlaceHolder 3"/>
+          <p:cNvPr id="34" name="PlaceHolder 3"/>
           <p:cNvSpPr>
             <a:spLocks noGrp="1"/>
           </p:cNvSpPr>
@@ -440,7 +440,7 @@
       </p:sp>
       <p:sp>
         <p:nvSpPr>
-          <p:cNvPr id="38" name="PlaceHolder 4"/>
+          <p:cNvPr id="35" name="PlaceHolder 4"/>
           <p:cNvSpPr>
             <a:spLocks noGrp="1"/>
           </p:cNvSpPr>
@@ -470,7 +470,7 @@
       </p:sp>
       <p:sp>
         <p:nvSpPr>
-          <p:cNvPr id="39" name="PlaceHolder 5"/>
+          <p:cNvPr id="36" name="PlaceHolder 5"/>
           <p:cNvSpPr>
             <a:spLocks noGrp="1"/>
           </p:cNvSpPr>
@@ -500,7 +500,7 @@
       </p:sp>
       <p:sp>
         <p:nvSpPr>
-          <p:cNvPr id="40" name="PlaceHolder 6"/>
+          <p:cNvPr id="37" name="PlaceHolder 6"/>
           <p:cNvSpPr>
             <a:spLocks noGrp="1"/>
           </p:cNvSpPr>
@@ -530,7 +530,7 @@
       </p:sp>
       <p:sp>
         <p:nvSpPr>
-          <p:cNvPr id="41" name="PlaceHolder 7"/>
+          <p:cNvPr id="38" name="PlaceHolder 7"/>
           <p:cNvSpPr>
             <a:spLocks noGrp="1"/>
           </p:cNvSpPr>
@@ -604,7 +604,7 @@
       </p:grpSpPr>
       <p:sp>
         <p:nvSpPr>
-          <p:cNvPr id="48" name="PlaceHolder 1"/>
+          <p:cNvPr id="42" name="PlaceHolder 1"/>
           <p:cNvSpPr>
             <a:spLocks noGrp="1"/>
           </p:cNvSpPr>
@@ -635,7 +635,7 @@
       </p:sp>
       <p:sp>
         <p:nvSpPr>
-          <p:cNvPr id="49" name="PlaceHolder 2"/>
+          <p:cNvPr id="43" name="PlaceHolder 2"/>
           <p:cNvSpPr>
             <a:spLocks noGrp="1"/>
           </p:cNvSpPr>
@@ -688,7 +688,7 @@
       </p:grpSpPr>
       <p:sp>
         <p:nvSpPr>
-          <p:cNvPr id="50" name="PlaceHolder 1"/>
+          <p:cNvPr id="44" name="PlaceHolder 1"/>
           <p:cNvSpPr>
             <a:spLocks noGrp="1"/>
           </p:cNvSpPr>
@@ -719,7 +719,7 @@
       </p:sp>
       <p:sp>
         <p:nvSpPr>
-          <p:cNvPr id="51" name="PlaceHolder 2"/>
+          <p:cNvPr id="45" name="PlaceHolder 2"/>
           <p:cNvSpPr>
             <a:spLocks noGrp="1"/>
           </p:cNvSpPr>
@@ -771,7 +771,7 @@
       </p:grpSpPr>
       <p:sp>
         <p:nvSpPr>
-          <p:cNvPr id="52" name="PlaceHolder 1"/>
+          <p:cNvPr id="46" name="PlaceHolder 1"/>
           <p:cNvSpPr>
             <a:spLocks noGrp="1"/>
           </p:cNvSpPr>
@@ -802,7 +802,7 @@
       </p:sp>
       <p:sp>
         <p:nvSpPr>
-          <p:cNvPr id="53" name="PlaceHolder 2"/>
+          <p:cNvPr id="47" name="PlaceHolder 2"/>
           <p:cNvSpPr>
             <a:spLocks noGrp="1"/>
           </p:cNvSpPr>
@@ -832,7 +832,7 @@
       </p:sp>
       <p:sp>
         <p:nvSpPr>
-          <p:cNvPr id="54" name="PlaceHolder 3"/>
+          <p:cNvPr id="48" name="PlaceHolder 3"/>
           <p:cNvSpPr>
             <a:spLocks noGrp="1"/>
           </p:cNvSpPr>
@@ -884,7 +884,7 @@
       </p:grpSpPr>
       <p:sp>
         <p:nvSpPr>
-          <p:cNvPr id="55" name="PlaceHolder 1"/>
+          <p:cNvPr id="49" name="PlaceHolder 1"/>
           <p:cNvSpPr>
             <a:spLocks noGrp="1"/>
           </p:cNvSpPr>
@@ -937,7 +937,7 @@
       </p:grpSpPr>
       <p:sp>
         <p:nvSpPr>
-          <p:cNvPr id="56" name="PlaceHolder 1"/>
+          <p:cNvPr id="50" name="PlaceHolder 1"/>
           <p:cNvSpPr>
             <a:spLocks noGrp="1"/>
           </p:cNvSpPr>
@@ -990,7 +990,7 @@
       </p:grpSpPr>
       <p:sp>
         <p:nvSpPr>
-          <p:cNvPr id="57" name="PlaceHolder 1"/>
+          <p:cNvPr id="51" name="PlaceHolder 1"/>
           <p:cNvSpPr>
             <a:spLocks noGrp="1"/>
           </p:cNvSpPr>
@@ -1021,7 +1021,7 @@
       </p:sp>
       <p:sp>
         <p:nvSpPr>
-          <p:cNvPr id="58" name="PlaceHolder 2"/>
+          <p:cNvPr id="52" name="PlaceHolder 2"/>
           <p:cNvSpPr>
             <a:spLocks noGrp="1"/>
           </p:cNvSpPr>
@@ -1051,7 +1051,7 @@
       </p:sp>
       <p:sp>
         <p:nvSpPr>
-          <p:cNvPr id="59" name="PlaceHolder 3"/>
+          <p:cNvPr id="53" name="PlaceHolder 3"/>
           <p:cNvSpPr>
             <a:spLocks noGrp="1"/>
           </p:cNvSpPr>
@@ -1081,7 +1081,7 @@
       </p:sp>
       <p:sp>
         <p:nvSpPr>
-          <p:cNvPr id="60" name="PlaceHolder 4"/>
+          <p:cNvPr id="54" name="PlaceHolder 4"/>
           <p:cNvSpPr>
             <a:spLocks noGrp="1"/>
           </p:cNvSpPr>
@@ -1133,7 +1133,7 @@
       </p:grpSpPr>
       <p:sp>
         <p:nvSpPr>
-          <p:cNvPr id="6" name="PlaceHolder 1"/>
+          <p:cNvPr id="3" name="PlaceHolder 1"/>
           <p:cNvSpPr>
             <a:spLocks noGrp="1"/>
           </p:cNvSpPr>
@@ -1164,7 +1164,7 @@
       </p:sp>
       <p:sp>
         <p:nvSpPr>
-          <p:cNvPr id="7" name="PlaceHolder 2"/>
+          <p:cNvPr id="4" name="PlaceHolder 2"/>
           <p:cNvSpPr>
             <a:spLocks noGrp="1"/>
           </p:cNvSpPr>
@@ -1217,7 +1217,7 @@
       </p:grpSpPr>
       <p:sp>
         <p:nvSpPr>
-          <p:cNvPr id="61" name="PlaceHolder 1"/>
+          <p:cNvPr id="55" name="PlaceHolder 1"/>
           <p:cNvSpPr>
             <a:spLocks noGrp="1"/>
           </p:cNvSpPr>
@@ -1248,7 +1248,7 @@
       </p:sp>
       <p:sp>
         <p:nvSpPr>
-          <p:cNvPr id="62" name="PlaceHolder 2"/>
+          <p:cNvPr id="56" name="PlaceHolder 2"/>
           <p:cNvSpPr>
             <a:spLocks noGrp="1"/>
           </p:cNvSpPr>
@@ -1278,7 +1278,7 @@
       </p:sp>
       <p:sp>
         <p:nvSpPr>
-          <p:cNvPr id="63" name="PlaceHolder 3"/>
+          <p:cNvPr id="57" name="PlaceHolder 3"/>
           <p:cNvSpPr>
             <a:spLocks noGrp="1"/>
           </p:cNvSpPr>
@@ -1308,7 +1308,7 @@
       </p:sp>
       <p:sp>
         <p:nvSpPr>
-          <p:cNvPr id="64" name="PlaceHolder 4"/>
+          <p:cNvPr id="58" name="PlaceHolder 4"/>
           <p:cNvSpPr>
             <a:spLocks noGrp="1"/>
           </p:cNvSpPr>
@@ -1360,7 +1360,7 @@
       </p:grpSpPr>
       <p:sp>
         <p:nvSpPr>
-          <p:cNvPr id="65" name="PlaceHolder 1"/>
+          <p:cNvPr id="59" name="PlaceHolder 1"/>
           <p:cNvSpPr>
             <a:spLocks noGrp="1"/>
           </p:cNvSpPr>
@@ -1391,7 +1391,7 @@
       </p:sp>
       <p:sp>
         <p:nvSpPr>
-          <p:cNvPr id="66" name="PlaceHolder 2"/>
+          <p:cNvPr id="60" name="PlaceHolder 2"/>
           <p:cNvSpPr>
             <a:spLocks noGrp="1"/>
           </p:cNvSpPr>
@@ -1421,7 +1421,7 @@
       </p:sp>
       <p:sp>
         <p:nvSpPr>
-          <p:cNvPr id="67" name="PlaceHolder 3"/>
+          <p:cNvPr id="61" name="PlaceHolder 3"/>
           <p:cNvSpPr>
             <a:spLocks noGrp="1"/>
           </p:cNvSpPr>
@@ -1451,7 +1451,7 @@
       </p:sp>
       <p:sp>
         <p:nvSpPr>
-          <p:cNvPr id="68" name="PlaceHolder 4"/>
+          <p:cNvPr id="62" name="PlaceHolder 4"/>
           <p:cNvSpPr>
             <a:spLocks noGrp="1"/>
           </p:cNvSpPr>
@@ -1503,7 +1503,7 @@
       </p:grpSpPr>
       <p:sp>
         <p:nvSpPr>
-          <p:cNvPr id="69" name="PlaceHolder 1"/>
+          <p:cNvPr id="63" name="PlaceHolder 1"/>
           <p:cNvSpPr>
             <a:spLocks noGrp="1"/>
           </p:cNvSpPr>
@@ -1534,7 +1534,7 @@
       </p:sp>
       <p:sp>
         <p:nvSpPr>
-          <p:cNvPr id="70" name="PlaceHolder 2"/>
+          <p:cNvPr id="64" name="PlaceHolder 2"/>
           <p:cNvSpPr>
             <a:spLocks noGrp="1"/>
           </p:cNvSpPr>
@@ -1564,7 +1564,7 @@
       </p:sp>
       <p:sp>
         <p:nvSpPr>
-          <p:cNvPr id="71" name="PlaceHolder 3"/>
+          <p:cNvPr id="65" name="PlaceHolder 3"/>
           <p:cNvSpPr>
             <a:spLocks noGrp="1"/>
           </p:cNvSpPr>
@@ -1616,7 +1616,7 @@
       </p:grpSpPr>
       <p:sp>
         <p:nvSpPr>
-          <p:cNvPr id="72" name="PlaceHolder 1"/>
+          <p:cNvPr id="66" name="PlaceHolder 1"/>
           <p:cNvSpPr>
             <a:spLocks noGrp="1"/>
           </p:cNvSpPr>
@@ -1647,7 +1647,7 @@
       </p:sp>
       <p:sp>
         <p:nvSpPr>
-          <p:cNvPr id="73" name="PlaceHolder 2"/>
+          <p:cNvPr id="67" name="PlaceHolder 2"/>
           <p:cNvSpPr>
             <a:spLocks noGrp="1"/>
           </p:cNvSpPr>
@@ -1677,7 +1677,7 @@
       </p:sp>
       <p:sp>
         <p:nvSpPr>
-          <p:cNvPr id="74" name="PlaceHolder 3"/>
+          <p:cNvPr id="68" name="PlaceHolder 3"/>
           <p:cNvSpPr>
             <a:spLocks noGrp="1"/>
           </p:cNvSpPr>
@@ -1707,7 +1707,7 @@
       </p:sp>
       <p:sp>
         <p:nvSpPr>
-          <p:cNvPr id="75" name="PlaceHolder 4"/>
+          <p:cNvPr id="69" name="PlaceHolder 4"/>
           <p:cNvSpPr>
             <a:spLocks noGrp="1"/>
           </p:cNvSpPr>
@@ -1737,7 +1737,7 @@
       </p:sp>
       <p:sp>
         <p:nvSpPr>
-          <p:cNvPr id="76" name="PlaceHolder 5"/>
+          <p:cNvPr id="70" name="PlaceHolder 5"/>
           <p:cNvSpPr>
             <a:spLocks noGrp="1"/>
           </p:cNvSpPr>
@@ -1789,7 +1789,7 @@
       </p:grpSpPr>
       <p:sp>
         <p:nvSpPr>
-          <p:cNvPr id="77" name="PlaceHolder 1"/>
+          <p:cNvPr id="71" name="PlaceHolder 1"/>
           <p:cNvSpPr>
             <a:spLocks noGrp="1"/>
           </p:cNvSpPr>
@@ -1820,7 +1820,7 @@
       </p:sp>
       <p:sp>
         <p:nvSpPr>
-          <p:cNvPr id="78" name="PlaceHolder 2"/>
+          <p:cNvPr id="72" name="PlaceHolder 2"/>
           <p:cNvSpPr>
             <a:spLocks noGrp="1"/>
           </p:cNvSpPr>
@@ -1850,7 +1850,7 @@
       </p:sp>
       <p:sp>
         <p:nvSpPr>
-          <p:cNvPr id="79" name="PlaceHolder 3"/>
+          <p:cNvPr id="73" name="PlaceHolder 3"/>
           <p:cNvSpPr>
             <a:spLocks noGrp="1"/>
           </p:cNvSpPr>
@@ -1880,7 +1880,7 @@
       </p:sp>
       <p:sp>
         <p:nvSpPr>
-          <p:cNvPr id="80" name="PlaceHolder 4"/>
+          <p:cNvPr id="74" name="PlaceHolder 4"/>
           <p:cNvSpPr>
             <a:spLocks noGrp="1"/>
           </p:cNvSpPr>
@@ -1910,7 +1910,7 @@
       </p:sp>
       <p:sp>
         <p:nvSpPr>
-          <p:cNvPr id="81" name="PlaceHolder 5"/>
+          <p:cNvPr id="75" name="PlaceHolder 5"/>
           <p:cNvSpPr>
             <a:spLocks noGrp="1"/>
           </p:cNvSpPr>
@@ -1940,7 +1940,7 @@
       </p:sp>
       <p:sp>
         <p:nvSpPr>
-          <p:cNvPr id="82" name="PlaceHolder 6"/>
+          <p:cNvPr id="76" name="PlaceHolder 6"/>
           <p:cNvSpPr>
             <a:spLocks noGrp="1"/>
           </p:cNvSpPr>
@@ -1970,7 +1970,7 @@
       </p:sp>
       <p:sp>
         <p:nvSpPr>
-          <p:cNvPr id="83" name="PlaceHolder 7"/>
+          <p:cNvPr id="77" name="PlaceHolder 7"/>
           <p:cNvSpPr>
             <a:spLocks noGrp="1"/>
           </p:cNvSpPr>
@@ -2044,7 +2044,7 @@
       </p:grpSpPr>
       <p:sp>
         <p:nvSpPr>
-          <p:cNvPr id="90" name="PlaceHolder 1"/>
+          <p:cNvPr id="81" name="PlaceHolder 1"/>
           <p:cNvSpPr>
             <a:spLocks noGrp="1"/>
           </p:cNvSpPr>
@@ -2075,7 +2075,7 @@
       </p:sp>
       <p:sp>
         <p:nvSpPr>
-          <p:cNvPr id="91" name="PlaceHolder 2"/>
+          <p:cNvPr id="82" name="PlaceHolder 2"/>
           <p:cNvSpPr>
             <a:spLocks noGrp="1"/>
           </p:cNvSpPr>
@@ -2128,7 +2128,7 @@
       </p:grpSpPr>
       <p:sp>
         <p:nvSpPr>
-          <p:cNvPr id="92" name="PlaceHolder 1"/>
+          <p:cNvPr id="83" name="PlaceHolder 1"/>
           <p:cNvSpPr>
             <a:spLocks noGrp="1"/>
           </p:cNvSpPr>
@@ -2159,7 +2159,7 @@
       </p:sp>
       <p:sp>
         <p:nvSpPr>
-          <p:cNvPr id="93" name="PlaceHolder 2"/>
+          <p:cNvPr id="84" name="PlaceHolder 2"/>
           <p:cNvSpPr>
             <a:spLocks noGrp="1"/>
           </p:cNvSpPr>
@@ -2211,7 +2211,7 @@
       </p:grpSpPr>
       <p:sp>
         <p:nvSpPr>
-          <p:cNvPr id="94" name="PlaceHolder 1"/>
+          <p:cNvPr id="85" name="PlaceHolder 1"/>
           <p:cNvSpPr>
             <a:spLocks noGrp="1"/>
           </p:cNvSpPr>
@@ -2242,7 +2242,7 @@
       </p:sp>
       <p:sp>
         <p:nvSpPr>
-          <p:cNvPr id="95" name="PlaceHolder 2"/>
+          <p:cNvPr id="86" name="PlaceHolder 2"/>
           <p:cNvSpPr>
             <a:spLocks noGrp="1"/>
           </p:cNvSpPr>
@@ -2272,7 +2272,7 @@
       </p:sp>
       <p:sp>
         <p:nvSpPr>
-          <p:cNvPr id="96" name="PlaceHolder 3"/>
+          <p:cNvPr id="87" name="PlaceHolder 3"/>
           <p:cNvSpPr>
             <a:spLocks noGrp="1"/>
           </p:cNvSpPr>
@@ -2324,7 +2324,7 @@
       </p:grpSpPr>
       <p:sp>
         <p:nvSpPr>
-          <p:cNvPr id="97" name="PlaceHolder 1"/>
+          <p:cNvPr id="88" name="PlaceHolder 1"/>
           <p:cNvSpPr>
             <a:spLocks noGrp="1"/>
           </p:cNvSpPr>
@@ -2377,7 +2377,7 @@
       </p:grpSpPr>
       <p:sp>
         <p:nvSpPr>
-          <p:cNvPr id="8" name="PlaceHolder 1"/>
+          <p:cNvPr id="5" name="PlaceHolder 1"/>
           <p:cNvSpPr>
             <a:spLocks noGrp="1"/>
           </p:cNvSpPr>
@@ -2408,7 +2408,7 @@
       </p:sp>
       <p:sp>
         <p:nvSpPr>
-          <p:cNvPr id="9" name="PlaceHolder 2"/>
+          <p:cNvPr id="6" name="PlaceHolder 2"/>
           <p:cNvSpPr>
             <a:spLocks noGrp="1"/>
           </p:cNvSpPr>
@@ -2460,7 +2460,7 @@
       </p:grpSpPr>
       <p:sp>
         <p:nvSpPr>
-          <p:cNvPr id="98" name="PlaceHolder 1"/>
+          <p:cNvPr id="89" name="PlaceHolder 1"/>
           <p:cNvSpPr>
             <a:spLocks noGrp="1"/>
           </p:cNvSpPr>
@@ -2513,7 +2513,7 @@
       </p:grpSpPr>
       <p:sp>
         <p:nvSpPr>
-          <p:cNvPr id="99" name="PlaceHolder 1"/>
+          <p:cNvPr id="90" name="PlaceHolder 1"/>
           <p:cNvSpPr>
             <a:spLocks noGrp="1"/>
           </p:cNvSpPr>
@@ -2544,7 +2544,7 @@
       </p:sp>
       <p:sp>
         <p:nvSpPr>
-          <p:cNvPr id="100" name="PlaceHolder 2"/>
+          <p:cNvPr id="91" name="PlaceHolder 2"/>
           <p:cNvSpPr>
             <a:spLocks noGrp="1"/>
           </p:cNvSpPr>
@@ -2574,7 +2574,7 @@
       </p:sp>
       <p:sp>
         <p:nvSpPr>
-          <p:cNvPr id="101" name="PlaceHolder 3"/>
+          <p:cNvPr id="92" name="PlaceHolder 3"/>
           <p:cNvSpPr>
             <a:spLocks noGrp="1"/>
           </p:cNvSpPr>
@@ -2604,7 +2604,7 @@
       </p:sp>
       <p:sp>
         <p:nvSpPr>
-          <p:cNvPr id="102" name="PlaceHolder 4"/>
+          <p:cNvPr id="93" name="PlaceHolder 4"/>
           <p:cNvSpPr>
             <a:spLocks noGrp="1"/>
           </p:cNvSpPr>
@@ -2656,7 +2656,7 @@
       </p:grpSpPr>
       <p:sp>
         <p:nvSpPr>
-          <p:cNvPr id="103" name="PlaceHolder 1"/>
+          <p:cNvPr id="94" name="PlaceHolder 1"/>
           <p:cNvSpPr>
             <a:spLocks noGrp="1"/>
           </p:cNvSpPr>
@@ -2687,7 +2687,7 @@
       </p:sp>
       <p:sp>
         <p:nvSpPr>
-          <p:cNvPr id="104" name="PlaceHolder 2"/>
+          <p:cNvPr id="95" name="PlaceHolder 2"/>
           <p:cNvSpPr>
             <a:spLocks noGrp="1"/>
           </p:cNvSpPr>
@@ -2717,7 +2717,7 @@
       </p:sp>
       <p:sp>
         <p:nvSpPr>
-          <p:cNvPr id="105" name="PlaceHolder 3"/>
+          <p:cNvPr id="96" name="PlaceHolder 3"/>
           <p:cNvSpPr>
             <a:spLocks noGrp="1"/>
           </p:cNvSpPr>
@@ -2747,7 +2747,7 @@
       </p:sp>
       <p:sp>
         <p:nvSpPr>
-          <p:cNvPr id="106" name="PlaceHolder 4"/>
+          <p:cNvPr id="97" name="PlaceHolder 4"/>
           <p:cNvSpPr>
             <a:spLocks noGrp="1"/>
           </p:cNvSpPr>
@@ -2799,7 +2799,7 @@
       </p:grpSpPr>
       <p:sp>
         <p:nvSpPr>
-          <p:cNvPr id="107" name="PlaceHolder 1"/>
+          <p:cNvPr id="98" name="PlaceHolder 1"/>
           <p:cNvSpPr>
             <a:spLocks noGrp="1"/>
           </p:cNvSpPr>
@@ -2830,7 +2830,7 @@
       </p:sp>
       <p:sp>
         <p:nvSpPr>
-          <p:cNvPr id="108" name="PlaceHolder 2"/>
+          <p:cNvPr id="99" name="PlaceHolder 2"/>
           <p:cNvSpPr>
             <a:spLocks noGrp="1"/>
           </p:cNvSpPr>
@@ -2860,7 +2860,7 @@
       </p:sp>
       <p:sp>
         <p:nvSpPr>
-          <p:cNvPr id="109" name="PlaceHolder 3"/>
+          <p:cNvPr id="100" name="PlaceHolder 3"/>
           <p:cNvSpPr>
             <a:spLocks noGrp="1"/>
           </p:cNvSpPr>
@@ -2890,7 +2890,7 @@
       </p:sp>
       <p:sp>
         <p:nvSpPr>
-          <p:cNvPr id="110" name="PlaceHolder 4"/>
+          <p:cNvPr id="101" name="PlaceHolder 4"/>
           <p:cNvSpPr>
             <a:spLocks noGrp="1"/>
           </p:cNvSpPr>
@@ -2942,7 +2942,7 @@
       </p:grpSpPr>
       <p:sp>
         <p:nvSpPr>
-          <p:cNvPr id="111" name="PlaceHolder 1"/>
+          <p:cNvPr id="102" name="PlaceHolder 1"/>
           <p:cNvSpPr>
             <a:spLocks noGrp="1"/>
           </p:cNvSpPr>
@@ -2973,7 +2973,7 @@
       </p:sp>
       <p:sp>
         <p:nvSpPr>
-          <p:cNvPr id="112" name="PlaceHolder 2"/>
+          <p:cNvPr id="103" name="PlaceHolder 2"/>
           <p:cNvSpPr>
             <a:spLocks noGrp="1"/>
           </p:cNvSpPr>
@@ -3003,7 +3003,7 @@
       </p:sp>
       <p:sp>
         <p:nvSpPr>
-          <p:cNvPr id="113" name="PlaceHolder 3"/>
+          <p:cNvPr id="104" name="PlaceHolder 3"/>
           <p:cNvSpPr>
             <a:spLocks noGrp="1"/>
           </p:cNvSpPr>
@@ -3055,7 +3055,7 @@
       </p:grpSpPr>
       <p:sp>
         <p:nvSpPr>
-          <p:cNvPr id="114" name="PlaceHolder 1"/>
+          <p:cNvPr id="105" name="PlaceHolder 1"/>
           <p:cNvSpPr>
             <a:spLocks noGrp="1"/>
           </p:cNvSpPr>
@@ -3086,7 +3086,7 @@
       </p:sp>
       <p:sp>
         <p:nvSpPr>
-          <p:cNvPr id="115" name="PlaceHolder 2"/>
+          <p:cNvPr id="106" name="PlaceHolder 2"/>
           <p:cNvSpPr>
             <a:spLocks noGrp="1"/>
           </p:cNvSpPr>
@@ -3116,7 +3116,7 @@
       </p:sp>
       <p:sp>
         <p:nvSpPr>
-          <p:cNvPr id="116" name="PlaceHolder 3"/>
+          <p:cNvPr id="107" name="PlaceHolder 3"/>
           <p:cNvSpPr>
             <a:spLocks noGrp="1"/>
           </p:cNvSpPr>
@@ -3146,7 +3146,7 @@
       </p:sp>
       <p:sp>
         <p:nvSpPr>
-          <p:cNvPr id="117" name="PlaceHolder 4"/>
+          <p:cNvPr id="108" name="PlaceHolder 4"/>
           <p:cNvSpPr>
             <a:spLocks noGrp="1"/>
           </p:cNvSpPr>
@@ -3176,7 +3176,7 @@
       </p:sp>
       <p:sp>
         <p:nvSpPr>
-          <p:cNvPr id="118" name="PlaceHolder 5"/>
+          <p:cNvPr id="109" name="PlaceHolder 5"/>
           <p:cNvSpPr>
             <a:spLocks noGrp="1"/>
           </p:cNvSpPr>
@@ -3228,7 +3228,7 @@
       </p:grpSpPr>
       <p:sp>
         <p:nvSpPr>
-          <p:cNvPr id="119" name="PlaceHolder 1"/>
+          <p:cNvPr id="110" name="PlaceHolder 1"/>
           <p:cNvSpPr>
             <a:spLocks noGrp="1"/>
           </p:cNvSpPr>
@@ -3259,7 +3259,7 @@
       </p:sp>
       <p:sp>
         <p:nvSpPr>
-          <p:cNvPr id="120" name="PlaceHolder 2"/>
+          <p:cNvPr id="111" name="PlaceHolder 2"/>
           <p:cNvSpPr>
             <a:spLocks noGrp="1"/>
           </p:cNvSpPr>
@@ -3289,7 +3289,7 @@
       </p:sp>
       <p:sp>
         <p:nvSpPr>
-          <p:cNvPr id="121" name="PlaceHolder 3"/>
+          <p:cNvPr id="112" name="PlaceHolder 3"/>
           <p:cNvSpPr>
             <a:spLocks noGrp="1"/>
           </p:cNvSpPr>
@@ -3319,7 +3319,7 @@
       </p:sp>
       <p:sp>
         <p:nvSpPr>
-          <p:cNvPr id="122" name="PlaceHolder 4"/>
+          <p:cNvPr id="113" name="PlaceHolder 4"/>
           <p:cNvSpPr>
             <a:spLocks noGrp="1"/>
           </p:cNvSpPr>
@@ -3349,7 +3349,7 @@
       </p:sp>
       <p:sp>
         <p:nvSpPr>
-          <p:cNvPr id="123" name="PlaceHolder 5"/>
+          <p:cNvPr id="114" name="PlaceHolder 5"/>
           <p:cNvSpPr>
             <a:spLocks noGrp="1"/>
           </p:cNvSpPr>
@@ -3379,7 +3379,7 @@
       </p:sp>
       <p:sp>
         <p:nvSpPr>
-          <p:cNvPr id="124" name="PlaceHolder 6"/>
+          <p:cNvPr id="115" name="PlaceHolder 6"/>
           <p:cNvSpPr>
             <a:spLocks noGrp="1"/>
           </p:cNvSpPr>
@@ -3409,7 +3409,7 @@
       </p:sp>
       <p:sp>
         <p:nvSpPr>
-          <p:cNvPr id="125" name="PlaceHolder 7"/>
+          <p:cNvPr id="116" name="PlaceHolder 7"/>
           <p:cNvSpPr>
             <a:spLocks noGrp="1"/>
           </p:cNvSpPr>
@@ -3483,7 +3483,7 @@
       </p:grpSpPr>
       <p:sp>
         <p:nvSpPr>
-          <p:cNvPr id="128" name="PlaceHolder 1"/>
+          <p:cNvPr id="119" name="PlaceHolder 1"/>
           <p:cNvSpPr>
             <a:spLocks noGrp="1"/>
           </p:cNvSpPr>
@@ -3514,7 +3514,7 @@
       </p:sp>
       <p:sp>
         <p:nvSpPr>
-          <p:cNvPr id="129" name="PlaceHolder 2"/>
+          <p:cNvPr id="120" name="PlaceHolder 2"/>
           <p:cNvSpPr>
             <a:spLocks noGrp="1"/>
           </p:cNvSpPr>
@@ -3567,7 +3567,7 @@
       </p:grpSpPr>
       <p:sp>
         <p:nvSpPr>
-          <p:cNvPr id="130" name="PlaceHolder 1"/>
+          <p:cNvPr id="121" name="PlaceHolder 1"/>
           <p:cNvSpPr>
             <a:spLocks noGrp="1"/>
           </p:cNvSpPr>
@@ -3598,7 +3598,7 @@
       </p:sp>
       <p:sp>
         <p:nvSpPr>
-          <p:cNvPr id="131" name="PlaceHolder 2"/>
+          <p:cNvPr id="122" name="PlaceHolder 2"/>
           <p:cNvSpPr>
             <a:spLocks noGrp="1"/>
           </p:cNvSpPr>
@@ -3650,7 +3650,7 @@
       </p:grpSpPr>
       <p:sp>
         <p:nvSpPr>
-          <p:cNvPr id="10" name="PlaceHolder 1"/>
+          <p:cNvPr id="7" name="PlaceHolder 1"/>
           <p:cNvSpPr>
             <a:spLocks noGrp="1"/>
           </p:cNvSpPr>
@@ -3681,7 +3681,7 @@
       </p:sp>
       <p:sp>
         <p:nvSpPr>
-          <p:cNvPr id="11" name="PlaceHolder 2"/>
+          <p:cNvPr id="8" name="PlaceHolder 2"/>
           <p:cNvSpPr>
             <a:spLocks noGrp="1"/>
           </p:cNvSpPr>
@@ -3711,7 +3711,7 @@
       </p:sp>
       <p:sp>
         <p:nvSpPr>
-          <p:cNvPr id="12" name="PlaceHolder 3"/>
+          <p:cNvPr id="9" name="PlaceHolder 3"/>
           <p:cNvSpPr>
             <a:spLocks noGrp="1"/>
           </p:cNvSpPr>
@@ -3763,7 +3763,7 @@
       </p:grpSpPr>
       <p:sp>
         <p:nvSpPr>
-          <p:cNvPr id="132" name="PlaceHolder 1"/>
+          <p:cNvPr id="123" name="PlaceHolder 1"/>
           <p:cNvSpPr>
             <a:spLocks noGrp="1"/>
           </p:cNvSpPr>
@@ -3794,7 +3794,7 @@
       </p:sp>
       <p:sp>
         <p:nvSpPr>
-          <p:cNvPr id="133" name="PlaceHolder 2"/>
+          <p:cNvPr id="124" name="PlaceHolder 2"/>
           <p:cNvSpPr>
             <a:spLocks noGrp="1"/>
           </p:cNvSpPr>
@@ -3824,7 +3824,7 @@
       </p:sp>
       <p:sp>
         <p:nvSpPr>
-          <p:cNvPr id="134" name="PlaceHolder 3"/>
+          <p:cNvPr id="125" name="PlaceHolder 3"/>
           <p:cNvSpPr>
             <a:spLocks noGrp="1"/>
           </p:cNvSpPr>
@@ -3876,7 +3876,7 @@
       </p:grpSpPr>
       <p:sp>
         <p:nvSpPr>
-          <p:cNvPr id="135" name="PlaceHolder 1"/>
+          <p:cNvPr id="126" name="PlaceHolder 1"/>
           <p:cNvSpPr>
             <a:spLocks noGrp="1"/>
           </p:cNvSpPr>
@@ -3929,7 +3929,7 @@
       </p:grpSpPr>
       <p:sp>
         <p:nvSpPr>
-          <p:cNvPr id="136" name="PlaceHolder 1"/>
+          <p:cNvPr id="127" name="PlaceHolder 1"/>
           <p:cNvSpPr>
             <a:spLocks noGrp="1"/>
           </p:cNvSpPr>
@@ -3982,7 +3982,7 @@
       </p:grpSpPr>
       <p:sp>
         <p:nvSpPr>
-          <p:cNvPr id="137" name="PlaceHolder 1"/>
+          <p:cNvPr id="128" name="PlaceHolder 1"/>
           <p:cNvSpPr>
             <a:spLocks noGrp="1"/>
           </p:cNvSpPr>
@@ -4013,7 +4013,7 @@
       </p:sp>
       <p:sp>
         <p:nvSpPr>
-          <p:cNvPr id="138" name="PlaceHolder 2"/>
+          <p:cNvPr id="129" name="PlaceHolder 2"/>
           <p:cNvSpPr>
             <a:spLocks noGrp="1"/>
           </p:cNvSpPr>
@@ -4043,7 +4043,7 @@
       </p:sp>
       <p:sp>
         <p:nvSpPr>
-          <p:cNvPr id="139" name="PlaceHolder 3"/>
+          <p:cNvPr id="130" name="PlaceHolder 3"/>
           <p:cNvSpPr>
             <a:spLocks noGrp="1"/>
           </p:cNvSpPr>
@@ -4073,7 +4073,7 @@
       </p:sp>
       <p:sp>
         <p:nvSpPr>
-          <p:cNvPr id="140" name="PlaceHolder 4"/>
+          <p:cNvPr id="131" name="PlaceHolder 4"/>
           <p:cNvSpPr>
             <a:spLocks noGrp="1"/>
           </p:cNvSpPr>
@@ -4125,7 +4125,7 @@
       </p:grpSpPr>
       <p:sp>
         <p:nvSpPr>
-          <p:cNvPr id="141" name="PlaceHolder 1"/>
+          <p:cNvPr id="132" name="PlaceHolder 1"/>
           <p:cNvSpPr>
             <a:spLocks noGrp="1"/>
           </p:cNvSpPr>
@@ -4156,7 +4156,7 @@
       </p:sp>
       <p:sp>
         <p:nvSpPr>
-          <p:cNvPr id="142" name="PlaceHolder 2"/>
+          <p:cNvPr id="133" name="PlaceHolder 2"/>
           <p:cNvSpPr>
             <a:spLocks noGrp="1"/>
           </p:cNvSpPr>
@@ -4186,7 +4186,7 @@
       </p:sp>
       <p:sp>
         <p:nvSpPr>
-          <p:cNvPr id="143" name="PlaceHolder 3"/>
+          <p:cNvPr id="134" name="PlaceHolder 3"/>
           <p:cNvSpPr>
             <a:spLocks noGrp="1"/>
           </p:cNvSpPr>
@@ -4216,7 +4216,7 @@
       </p:sp>
       <p:sp>
         <p:nvSpPr>
-          <p:cNvPr id="144" name="PlaceHolder 4"/>
+          <p:cNvPr id="135" name="PlaceHolder 4"/>
           <p:cNvSpPr>
             <a:spLocks noGrp="1"/>
           </p:cNvSpPr>
@@ -4268,7 +4268,7 @@
       </p:grpSpPr>
       <p:sp>
         <p:nvSpPr>
-          <p:cNvPr id="145" name="PlaceHolder 1"/>
+          <p:cNvPr id="136" name="PlaceHolder 1"/>
           <p:cNvSpPr>
             <a:spLocks noGrp="1"/>
           </p:cNvSpPr>
@@ -4299,7 +4299,7 @@
       </p:sp>
       <p:sp>
         <p:nvSpPr>
-          <p:cNvPr id="146" name="PlaceHolder 2"/>
+          <p:cNvPr id="137" name="PlaceHolder 2"/>
           <p:cNvSpPr>
             <a:spLocks noGrp="1"/>
           </p:cNvSpPr>
@@ -4329,7 +4329,7 @@
       </p:sp>
       <p:sp>
         <p:nvSpPr>
-          <p:cNvPr id="147" name="PlaceHolder 3"/>
+          <p:cNvPr id="138" name="PlaceHolder 3"/>
           <p:cNvSpPr>
             <a:spLocks noGrp="1"/>
           </p:cNvSpPr>
@@ -4359,7 +4359,7 @@
       </p:sp>
       <p:sp>
         <p:nvSpPr>
-          <p:cNvPr id="148" name="PlaceHolder 4"/>
+          <p:cNvPr id="139" name="PlaceHolder 4"/>
           <p:cNvSpPr>
             <a:spLocks noGrp="1"/>
           </p:cNvSpPr>
@@ -4411,7 +4411,7 @@
       </p:grpSpPr>
       <p:sp>
         <p:nvSpPr>
-          <p:cNvPr id="149" name="PlaceHolder 1"/>
+          <p:cNvPr id="140" name="PlaceHolder 1"/>
           <p:cNvSpPr>
             <a:spLocks noGrp="1"/>
           </p:cNvSpPr>
@@ -4442,7 +4442,7 @@
       </p:sp>
       <p:sp>
         <p:nvSpPr>
-          <p:cNvPr id="150" name="PlaceHolder 2"/>
+          <p:cNvPr id="141" name="PlaceHolder 2"/>
           <p:cNvSpPr>
             <a:spLocks noGrp="1"/>
           </p:cNvSpPr>
@@ -4472,7 +4472,7 @@
       </p:sp>
       <p:sp>
         <p:nvSpPr>
-          <p:cNvPr id="151" name="PlaceHolder 3"/>
+          <p:cNvPr id="142" name="PlaceHolder 3"/>
           <p:cNvSpPr>
             <a:spLocks noGrp="1"/>
           </p:cNvSpPr>
@@ -4524,7 +4524,7 @@
       </p:grpSpPr>
       <p:sp>
         <p:nvSpPr>
-          <p:cNvPr id="152" name="PlaceHolder 1"/>
+          <p:cNvPr id="143" name="PlaceHolder 1"/>
           <p:cNvSpPr>
             <a:spLocks noGrp="1"/>
           </p:cNvSpPr>
@@ -4555,7 +4555,7 @@
       </p:sp>
       <p:sp>
         <p:nvSpPr>
-          <p:cNvPr id="153" name="PlaceHolder 2"/>
+          <p:cNvPr id="144" name="PlaceHolder 2"/>
           <p:cNvSpPr>
             <a:spLocks noGrp="1"/>
           </p:cNvSpPr>
@@ -4585,7 +4585,7 @@
       </p:sp>
       <p:sp>
         <p:nvSpPr>
-          <p:cNvPr id="154" name="PlaceHolder 3"/>
+          <p:cNvPr id="145" name="PlaceHolder 3"/>
           <p:cNvSpPr>
             <a:spLocks noGrp="1"/>
           </p:cNvSpPr>
@@ -4615,7 +4615,7 @@
       </p:sp>
       <p:sp>
         <p:nvSpPr>
-          <p:cNvPr id="155" name="PlaceHolder 4"/>
+          <p:cNvPr id="146" name="PlaceHolder 4"/>
           <p:cNvSpPr>
             <a:spLocks noGrp="1"/>
           </p:cNvSpPr>
@@ -4645,7 +4645,7 @@
       </p:sp>
       <p:sp>
         <p:nvSpPr>
-          <p:cNvPr id="156" name="PlaceHolder 5"/>
+          <p:cNvPr id="147" name="PlaceHolder 5"/>
           <p:cNvSpPr>
             <a:spLocks noGrp="1"/>
           </p:cNvSpPr>
@@ -4697,7 +4697,7 @@
       </p:grpSpPr>
       <p:sp>
         <p:nvSpPr>
-          <p:cNvPr id="157" name="PlaceHolder 1"/>
+          <p:cNvPr id="148" name="PlaceHolder 1"/>
           <p:cNvSpPr>
             <a:spLocks noGrp="1"/>
           </p:cNvSpPr>
@@ -4728,7 +4728,7 @@
       </p:sp>
       <p:sp>
         <p:nvSpPr>
-          <p:cNvPr id="158" name="PlaceHolder 2"/>
+          <p:cNvPr id="149" name="PlaceHolder 2"/>
           <p:cNvSpPr>
             <a:spLocks noGrp="1"/>
           </p:cNvSpPr>
@@ -4758,7 +4758,7 @@
       </p:sp>
       <p:sp>
         <p:nvSpPr>
-          <p:cNvPr id="159" name="PlaceHolder 3"/>
+          <p:cNvPr id="150" name="PlaceHolder 3"/>
           <p:cNvSpPr>
             <a:spLocks noGrp="1"/>
           </p:cNvSpPr>
@@ -4788,7 +4788,7 @@
       </p:sp>
       <p:sp>
         <p:nvSpPr>
-          <p:cNvPr id="160" name="PlaceHolder 4"/>
+          <p:cNvPr id="151" name="PlaceHolder 4"/>
           <p:cNvSpPr>
             <a:spLocks noGrp="1"/>
           </p:cNvSpPr>
@@ -4818,7 +4818,7 @@
       </p:sp>
       <p:sp>
         <p:nvSpPr>
-          <p:cNvPr id="161" name="PlaceHolder 5"/>
+          <p:cNvPr id="152" name="PlaceHolder 5"/>
           <p:cNvSpPr>
             <a:spLocks noGrp="1"/>
           </p:cNvSpPr>
@@ -4848,7 +4848,7 @@
       </p:sp>
       <p:sp>
         <p:nvSpPr>
-          <p:cNvPr id="162" name="PlaceHolder 6"/>
+          <p:cNvPr id="153" name="PlaceHolder 6"/>
           <p:cNvSpPr>
             <a:spLocks noGrp="1"/>
           </p:cNvSpPr>
@@ -4878,7 +4878,7 @@
       </p:sp>
       <p:sp>
         <p:nvSpPr>
-          <p:cNvPr id="163" name="PlaceHolder 7"/>
+          <p:cNvPr id="154" name="PlaceHolder 7"/>
           <p:cNvSpPr>
             <a:spLocks noGrp="1"/>
           </p:cNvSpPr>
@@ -4930,7 +4930,7 @@
       </p:grpSpPr>
       <p:sp>
         <p:nvSpPr>
-          <p:cNvPr id="13" name="PlaceHolder 1"/>
+          <p:cNvPr id="10" name="PlaceHolder 1"/>
           <p:cNvSpPr>
             <a:spLocks noGrp="1"/>
           </p:cNvSpPr>
@@ -4983,7 +4983,7 @@
       </p:grpSpPr>
       <p:sp>
         <p:nvSpPr>
-          <p:cNvPr id="14" name="PlaceHolder 1"/>
+          <p:cNvPr id="11" name="PlaceHolder 1"/>
           <p:cNvSpPr>
             <a:spLocks noGrp="1"/>
           </p:cNvSpPr>
@@ -5036,7 +5036,7 @@
       </p:grpSpPr>
       <p:sp>
         <p:nvSpPr>
-          <p:cNvPr id="15" name="PlaceHolder 1"/>
+          <p:cNvPr id="12" name="PlaceHolder 1"/>
           <p:cNvSpPr>
             <a:spLocks noGrp="1"/>
           </p:cNvSpPr>
@@ -5067,7 +5067,7 @@
       </p:sp>
       <p:sp>
         <p:nvSpPr>
-          <p:cNvPr id="16" name="PlaceHolder 2"/>
+          <p:cNvPr id="13" name="PlaceHolder 2"/>
           <p:cNvSpPr>
             <a:spLocks noGrp="1"/>
           </p:cNvSpPr>
@@ -5097,7 +5097,7 @@
       </p:sp>
       <p:sp>
         <p:nvSpPr>
-          <p:cNvPr id="17" name="PlaceHolder 3"/>
+          <p:cNvPr id="14" name="PlaceHolder 3"/>
           <p:cNvSpPr>
             <a:spLocks noGrp="1"/>
           </p:cNvSpPr>
@@ -5127,7 +5127,7 @@
       </p:sp>
       <p:sp>
         <p:nvSpPr>
-          <p:cNvPr id="18" name="PlaceHolder 4"/>
+          <p:cNvPr id="15" name="PlaceHolder 4"/>
           <p:cNvSpPr>
             <a:spLocks noGrp="1"/>
           </p:cNvSpPr>
@@ -5179,7 +5179,7 @@
       </p:grpSpPr>
       <p:sp>
         <p:nvSpPr>
-          <p:cNvPr id="19" name="PlaceHolder 1"/>
+          <p:cNvPr id="16" name="PlaceHolder 1"/>
           <p:cNvSpPr>
             <a:spLocks noGrp="1"/>
           </p:cNvSpPr>
@@ -5210,7 +5210,7 @@
       </p:sp>
       <p:sp>
         <p:nvSpPr>
-          <p:cNvPr id="20" name="PlaceHolder 2"/>
+          <p:cNvPr id="17" name="PlaceHolder 2"/>
           <p:cNvSpPr>
             <a:spLocks noGrp="1"/>
           </p:cNvSpPr>
@@ -5240,7 +5240,7 @@
       </p:sp>
       <p:sp>
         <p:nvSpPr>
-          <p:cNvPr id="21" name="PlaceHolder 3"/>
+          <p:cNvPr id="18" name="PlaceHolder 3"/>
           <p:cNvSpPr>
             <a:spLocks noGrp="1"/>
           </p:cNvSpPr>
@@ -5270,7 +5270,7 @@
       </p:sp>
       <p:sp>
         <p:nvSpPr>
-          <p:cNvPr id="22" name="PlaceHolder 4"/>
+          <p:cNvPr id="19" name="PlaceHolder 4"/>
           <p:cNvSpPr>
             <a:spLocks noGrp="1"/>
           </p:cNvSpPr>
@@ -5322,7 +5322,7 @@
       </p:grpSpPr>
       <p:sp>
         <p:nvSpPr>
-          <p:cNvPr id="23" name="PlaceHolder 1"/>
+          <p:cNvPr id="20" name="PlaceHolder 1"/>
           <p:cNvSpPr>
             <a:spLocks noGrp="1"/>
           </p:cNvSpPr>
@@ -5353,7 +5353,7 @@
       </p:sp>
       <p:sp>
         <p:nvSpPr>
-          <p:cNvPr id="24" name="PlaceHolder 2"/>
+          <p:cNvPr id="21" name="PlaceHolder 2"/>
           <p:cNvSpPr>
             <a:spLocks noGrp="1"/>
           </p:cNvSpPr>
@@ -5383,7 +5383,7 @@
       </p:sp>
       <p:sp>
         <p:nvSpPr>
-          <p:cNvPr id="25" name="PlaceHolder 3"/>
+          <p:cNvPr id="22" name="PlaceHolder 3"/>
           <p:cNvSpPr>
             <a:spLocks noGrp="1"/>
           </p:cNvSpPr>
@@ -5413,7 +5413,7 @@
       </p:sp>
       <p:sp>
         <p:nvSpPr>
-          <p:cNvPr id="26" name="PlaceHolder 4"/>
+          <p:cNvPr id="23" name="PlaceHolder 4"/>
           <p:cNvSpPr>
             <a:spLocks noGrp="1"/>
           </p:cNvSpPr>
@@ -5482,7 +5482,7 @@
         <p:spPr>
           <a:xfrm>
             <a:off x="-9000" y="5213880"/>
-            <a:ext cx="8389440" cy="516600"/>
+            <a:ext cx="8389080" cy="516240"/>
           </a:xfrm>
           <a:prstGeom prst="rect">
             <a:avLst/>
@@ -5514,6 +5514,7 @@
                   <a:srgbClr val="a6a6a6"/>
                 </a:solidFill>
                 <a:latin typeface="Calibri"/>
+                <a:ea typeface="DejaVu Sans"/>
               </a:rPr>
               <a:t>This presentation uses a free template provided by FPPT.com</a:t>
             </a:r>
@@ -5533,6 +5534,7 @@
                   <a:srgbClr val="a6a6a6"/>
                 </a:solidFill>
                 <a:latin typeface="Calibri"/>
+                <a:ea typeface="DejaVu Sans"/>
               </a:rPr>
               <a:t>www.free-power-point-templates.com</a:t>
             </a:r>
@@ -5554,47 +5556,26 @@
         </p:nvSpPr>
         <p:spPr>
           <a:xfrm>
-            <a:off x="1059840" y="2419200"/>
-            <a:ext cx="7176600" cy="1374120"/>
-          </a:xfrm>
-          <a:prstGeom prst="rect">
-            <a:avLst/>
-          </a:prstGeom>
-        </p:spPr>
-        <p:txBody>
-          <a:bodyPr anchor="ctr">
-            <a:normAutofit/>
-          </a:bodyPr>
-          <a:p>
-            <a:pPr algn="r">
-              <a:lnSpc>
-                <a:spcPct val="100000"/>
-              </a:lnSpc>
-            </a:pPr>
+            <a:off x="457200" y="205200"/>
+            <a:ext cx="8228880" cy="858240"/>
+          </a:xfrm>
+          <a:prstGeom prst="rect">
+            <a:avLst/>
+          </a:prstGeom>
+        </p:spPr>
+        <p:txBody>
+          <a:bodyPr lIns="0" rIns="0" tIns="0" bIns="0" anchor="ctr">
+            <a:noAutofit/>
+          </a:bodyPr>
+          <a:p>
             <a:r>
-              <a:rPr b="0" lang="en-US" sz="3600" spc="-1" strike="noStrike">
-                <a:solidFill>
-                  <a:srgbClr val="7030a0"/>
-                </a:solidFill>
-                <a:latin typeface="Calibri"/>
+              <a:rPr b="0" lang="en-US" sz="1800" spc="-1" strike="noStrike">
+                <a:latin typeface="Arial"/>
               </a:rPr>
-              <a:t>Click to edit </a:t>
+              <a:t>Click to edit the title text format</a:t>
             </a:r>
-            <a:br/>
-            <a:r>
-              <a:rPr b="0" lang="en-US" sz="3600" spc="-1" strike="noStrike">
-                <a:solidFill>
-                  <a:srgbClr val="7030a0"/>
-                </a:solidFill>
-                <a:latin typeface="Calibri"/>
-              </a:rPr>
-              <a:t>Master title style</a:t>
-            </a:r>
-            <a:endParaRPr b="0" lang="en-US" sz="3600" spc="-1" strike="noStrike">
-              <a:solidFill>
-                <a:srgbClr val="000000"/>
-              </a:solidFill>
-              <a:latin typeface="Calibri"/>
+            <a:endParaRPr b="0" lang="en-US" sz="1800" spc="-1" strike="noStrike">
+              <a:latin typeface="Arial"/>
             </a:endParaRPr>
           </a:p>
         </p:txBody>
@@ -5602,124 +5583,6 @@
       <p:sp>
         <p:nvSpPr>
           <p:cNvPr id="2" name="PlaceHolder 3"/>
-          <p:cNvSpPr>
-            <a:spLocks noGrp="1"/>
-          </p:cNvSpPr>
-          <p:nvPr>
-            <p:ph type="dt"/>
-          </p:nvPr>
-        </p:nvSpPr>
-        <p:spPr>
-          <a:xfrm>
-            <a:off x="457200" y="4767120"/>
-            <a:ext cx="2133360" cy="273600"/>
-          </a:xfrm>
-          <a:prstGeom prst="rect">
-            <a:avLst/>
-          </a:prstGeom>
-        </p:spPr>
-        <p:txBody>
-          <a:bodyPr anchor="ctr">
-            <a:noAutofit/>
-          </a:bodyPr>
-          <a:p>
-            <a:pPr>
-              <a:lnSpc>
-                <a:spcPct val="100000"/>
-              </a:lnSpc>
-            </a:pPr>
-            <a:fld id="{300D9417-F325-4760-983C-DFA8FF593B91}" type="datetime">
-              <a:rPr b="0" lang="en-US" sz="1200" spc="-1" strike="noStrike">
-                <a:solidFill>
-                  <a:srgbClr val="8b8b8b"/>
-                </a:solidFill>
-                <a:latin typeface="Calibri"/>
-              </a:rPr>
-              <a:t>6/6/22</a:t>
-            </a:fld>
-            <a:endParaRPr b="0" lang="en-US" sz="1200" spc="-1" strike="noStrike">
-              <a:latin typeface="Times New Roman"/>
-            </a:endParaRPr>
-          </a:p>
-        </p:txBody>
-      </p:sp>
-      <p:sp>
-        <p:nvSpPr>
-          <p:cNvPr id="3" name="PlaceHolder 4"/>
-          <p:cNvSpPr>
-            <a:spLocks noGrp="1"/>
-          </p:cNvSpPr>
-          <p:nvPr>
-            <p:ph type="ftr"/>
-          </p:nvPr>
-        </p:nvSpPr>
-        <p:spPr>
-          <a:xfrm>
-            <a:off x="3124080" y="4767120"/>
-            <a:ext cx="2895120" cy="273600"/>
-          </a:xfrm>
-          <a:prstGeom prst="rect">
-            <a:avLst/>
-          </a:prstGeom>
-        </p:spPr>
-        <p:txBody>
-          <a:bodyPr anchor="ctr">
-            <a:noAutofit/>
-          </a:bodyPr>
-          <a:p>
-            <a:endParaRPr b="0" lang="en-US" sz="2400" spc="-1" strike="noStrike">
-              <a:latin typeface="Times New Roman"/>
-            </a:endParaRPr>
-          </a:p>
-        </p:txBody>
-      </p:sp>
-      <p:sp>
-        <p:nvSpPr>
-          <p:cNvPr id="4" name="PlaceHolder 5"/>
-          <p:cNvSpPr>
-            <a:spLocks noGrp="1"/>
-          </p:cNvSpPr>
-          <p:nvPr>
-            <p:ph type="sldNum"/>
-          </p:nvPr>
-        </p:nvSpPr>
-        <p:spPr>
-          <a:xfrm>
-            <a:off x="6553080" y="4767120"/>
-            <a:ext cx="2133360" cy="273600"/>
-          </a:xfrm>
-          <a:prstGeom prst="rect">
-            <a:avLst/>
-          </a:prstGeom>
-        </p:spPr>
-        <p:txBody>
-          <a:bodyPr anchor="ctr">
-            <a:noAutofit/>
-          </a:bodyPr>
-          <a:p>
-            <a:pPr algn="r">
-              <a:lnSpc>
-                <a:spcPct val="100000"/>
-              </a:lnSpc>
-            </a:pPr>
-            <a:fld id="{23C30007-CA9E-47A5-8169-5CB135F287D2}" type="slidenum">
-              <a:rPr b="0" lang="en-US" sz="1200" spc="-1" strike="noStrike">
-                <a:solidFill>
-                  <a:srgbClr val="8b8b8b"/>
-                </a:solidFill>
-                <a:latin typeface="Calibri"/>
-              </a:rPr>
-              <a:t>&lt;number&gt;</a:t>
-            </a:fld>
-            <a:endParaRPr b="0" lang="en-US" sz="1200" spc="-1" strike="noStrike">
-              <a:latin typeface="Times New Roman"/>
-            </a:endParaRPr>
-          </a:p>
-        </p:txBody>
-      </p:sp>
-      <p:sp>
-        <p:nvSpPr>
-          <p:cNvPr id="5" name="PlaceHolder 6"/>
           <p:cNvSpPr>
             <a:spLocks noGrp="1"/>
           </p:cNvSpPr>
@@ -5754,18 +5617,12 @@
             </a:pPr>
             <a:r>
               <a:rPr b="0" lang="en-US" sz="3200" spc="-1" strike="noStrike">
-                <a:solidFill>
-                  <a:srgbClr val="000000"/>
-                </a:solidFill>
-                <a:latin typeface="Calibri"/>
+                <a:latin typeface="Arial"/>
               </a:rPr>
               <a:t>Click to edit the outline text format</a:t>
             </a:r>
             <a:endParaRPr b="0" lang="en-US" sz="3200" spc="-1" strike="noStrike">
-              <a:solidFill>
-                <a:srgbClr val="000000"/>
-              </a:solidFill>
-              <a:latin typeface="Calibri"/>
+              <a:latin typeface="Arial"/>
             </a:endParaRPr>
           </a:p>
           <a:p>
@@ -5781,19 +5638,13 @@
               <a:buChar char=""/>
             </a:pPr>
             <a:r>
-              <a:rPr b="0" lang="en-US" sz="2400" spc="-1" strike="noStrike">
-                <a:solidFill>
-                  <a:srgbClr val="000000"/>
-                </a:solidFill>
-                <a:latin typeface="Calibri"/>
+              <a:rPr b="0" lang="en-US" sz="2800" spc="-1" strike="noStrike">
+                <a:latin typeface="Arial"/>
               </a:rPr>
               <a:t>Second Outline Level</a:t>
             </a:r>
-            <a:endParaRPr b="0" lang="en-US" sz="2400" spc="-1" strike="noStrike">
-              <a:solidFill>
-                <a:srgbClr val="000000"/>
-              </a:solidFill>
-              <a:latin typeface="Calibri"/>
+            <a:endParaRPr b="0" lang="en-US" sz="2800" spc="-1" strike="noStrike">
+              <a:latin typeface="Arial"/>
             </a:endParaRPr>
           </a:p>
           <a:p>
@@ -5809,19 +5660,13 @@
               <a:buChar char=""/>
             </a:pPr>
             <a:r>
-              <a:rPr b="0" lang="en-US" sz="2000" spc="-1" strike="noStrike">
-                <a:solidFill>
-                  <a:srgbClr val="000000"/>
-                </a:solidFill>
-                <a:latin typeface="Calibri"/>
+              <a:rPr b="0" lang="en-US" sz="2400" spc="-1" strike="noStrike">
+                <a:latin typeface="Arial"/>
               </a:rPr>
               <a:t>Third Outline Level</a:t>
             </a:r>
-            <a:endParaRPr b="0" lang="en-US" sz="2000" spc="-1" strike="noStrike">
-              <a:solidFill>
-                <a:srgbClr val="000000"/>
-              </a:solidFill>
-              <a:latin typeface="Calibri"/>
+            <a:endParaRPr b="0" lang="en-US" sz="2400" spc="-1" strike="noStrike">
+              <a:latin typeface="Arial"/>
             </a:endParaRPr>
           </a:p>
           <a:p>
@@ -5838,18 +5683,12 @@
             </a:pPr>
             <a:r>
               <a:rPr b="0" lang="en-US" sz="2000" spc="-1" strike="noStrike">
-                <a:solidFill>
-                  <a:srgbClr val="000000"/>
-                </a:solidFill>
-                <a:latin typeface="Calibri"/>
+                <a:latin typeface="Arial"/>
               </a:rPr>
               <a:t>Fourth Outline Level</a:t>
             </a:r>
             <a:endParaRPr b="0" lang="en-US" sz="2000" spc="-1" strike="noStrike">
-              <a:solidFill>
-                <a:srgbClr val="000000"/>
-              </a:solidFill>
-              <a:latin typeface="Calibri"/>
+              <a:latin typeface="Arial"/>
             </a:endParaRPr>
           </a:p>
           <a:p>
@@ -5866,18 +5705,12 @@
             </a:pPr>
             <a:r>
               <a:rPr b="0" lang="en-US" sz="2000" spc="-1" strike="noStrike">
-                <a:solidFill>
-                  <a:srgbClr val="000000"/>
-                </a:solidFill>
-                <a:latin typeface="Calibri"/>
+                <a:latin typeface="Arial"/>
               </a:rPr>
               <a:t>Fifth Outline Level</a:t>
             </a:r>
             <a:endParaRPr b="0" lang="en-US" sz="2000" spc="-1" strike="noStrike">
-              <a:solidFill>
-                <a:srgbClr val="000000"/>
-              </a:solidFill>
-              <a:latin typeface="Calibri"/>
+              <a:latin typeface="Arial"/>
             </a:endParaRPr>
           </a:p>
           <a:p>
@@ -5894,18 +5727,12 @@
             </a:pPr>
             <a:r>
               <a:rPr b="0" lang="en-US" sz="2000" spc="-1" strike="noStrike">
-                <a:solidFill>
-                  <a:srgbClr val="000000"/>
-                </a:solidFill>
-                <a:latin typeface="Calibri"/>
+                <a:latin typeface="Arial"/>
               </a:rPr>
               <a:t>Sixth Outline Level</a:t>
             </a:r>
             <a:endParaRPr b="0" lang="en-US" sz="2000" spc="-1" strike="noStrike">
-              <a:solidFill>
-                <a:srgbClr val="000000"/>
-              </a:solidFill>
-              <a:latin typeface="Calibri"/>
+              <a:latin typeface="Arial"/>
             </a:endParaRPr>
           </a:p>
           <a:p>
@@ -5922,18 +5749,12 @@
             </a:pPr>
             <a:r>
               <a:rPr b="0" lang="en-US" sz="2000" spc="-1" strike="noStrike">
-                <a:solidFill>
-                  <a:srgbClr val="000000"/>
-                </a:solidFill>
-                <a:latin typeface="Calibri"/>
+                <a:latin typeface="Arial"/>
               </a:rPr>
               <a:t>Seventh Outline Level</a:t>
             </a:r>
             <a:endParaRPr b="0" lang="en-US" sz="2000" spc="-1" strike="noStrike">
-              <a:solidFill>
-                <a:srgbClr val="000000"/>
-              </a:solidFill>
-              <a:latin typeface="Calibri"/>
+              <a:latin typeface="Arial"/>
             </a:endParaRPr>
           </a:p>
         </p:txBody>
@@ -5987,14 +5808,14 @@
       </p:grpSpPr>
       <p:sp>
         <p:nvSpPr>
-          <p:cNvPr id="42" name="CustomShape 1"/>
+          <p:cNvPr id="39" name="CustomShape 1"/>
           <p:cNvSpPr/>
           <p:nvPr/>
         </p:nvSpPr>
         <p:spPr>
           <a:xfrm>
             <a:off x="-9000" y="5213880"/>
-            <a:ext cx="8389440" cy="516600"/>
+            <a:ext cx="8389080" cy="516240"/>
           </a:xfrm>
           <a:prstGeom prst="rect">
             <a:avLst/>
@@ -6026,6 +5847,7 @@
                   <a:srgbClr val="a6a6a6"/>
                 </a:solidFill>
                 <a:latin typeface="Calibri"/>
+                <a:ea typeface="DejaVu Sans"/>
               </a:rPr>
               <a:t>This presentation uses a free template provided by FPPT.com</a:t>
             </a:r>
@@ -6045,6 +5867,7 @@
                   <a:srgbClr val="a6a6a6"/>
                 </a:solidFill>
                 <a:latin typeface="Calibri"/>
+                <a:ea typeface="DejaVu Sans"/>
               </a:rPr>
               <a:t>www.free-power-point-templates.com</a:t>
             </a:r>
@@ -6056,7 +5879,7 @@
       </p:sp>
       <p:sp>
         <p:nvSpPr>
-          <p:cNvPr id="43" name="PlaceHolder 2"/>
+          <p:cNvPr id="40" name="PlaceHolder 2"/>
           <p:cNvSpPr>
             <a:spLocks noGrp="1"/>
           </p:cNvSpPr>
@@ -6066,330 +5889,206 @@
         </p:nvSpPr>
         <p:spPr>
           <a:xfrm>
-            <a:off x="2281320" y="433800"/>
-            <a:ext cx="6413400" cy="725040"/>
-          </a:xfrm>
-          <a:prstGeom prst="rect">
-            <a:avLst/>
-          </a:prstGeom>
-        </p:spPr>
-        <p:txBody>
-          <a:bodyPr anchor="ctr">
-            <a:normAutofit fontScale="45000"/>
-          </a:bodyPr>
-          <a:p>
-            <a:pPr>
-              <a:lnSpc>
-                <a:spcPct val="100000"/>
-              </a:lnSpc>
+            <a:off x="457200" y="205200"/>
+            <a:ext cx="8229240" cy="858600"/>
+          </a:xfrm>
+          <a:prstGeom prst="rect">
+            <a:avLst/>
+          </a:prstGeom>
+        </p:spPr>
+        <p:txBody>
+          <a:bodyPr lIns="0" rIns="0" tIns="0" bIns="0" anchor="ctr">
+            <a:noAutofit/>
+          </a:bodyPr>
+          <a:p>
+            <a:pPr algn="ctr"/>
+            <a:r>
+              <a:rPr b="0" lang="en-US" sz="4400" spc="-1" strike="noStrike">
+                <a:latin typeface="Arial"/>
+              </a:rPr>
+              <a:t>Click to edit the title text format</a:t>
+            </a:r>
+            <a:endParaRPr b="0" lang="en-US" sz="4400" spc="-1" strike="noStrike">
+              <a:latin typeface="Arial"/>
+            </a:endParaRPr>
+          </a:p>
+        </p:txBody>
+      </p:sp>
+      <p:sp>
+        <p:nvSpPr>
+          <p:cNvPr id="41" name="PlaceHolder 3"/>
+          <p:cNvSpPr>
+            <a:spLocks noGrp="1"/>
+          </p:cNvSpPr>
+          <p:nvPr>
+            <p:ph type="body"/>
+          </p:nvPr>
+        </p:nvSpPr>
+        <p:spPr>
+          <a:xfrm>
+            <a:off x="457200" y="1203480"/>
+            <a:ext cx="8229240" cy="2982960"/>
+          </a:xfrm>
+          <a:prstGeom prst="rect">
+            <a:avLst/>
+          </a:prstGeom>
+        </p:spPr>
+        <p:txBody>
+          <a:bodyPr lIns="0" rIns="0" tIns="0" bIns="0">
+            <a:normAutofit/>
+          </a:bodyPr>
+          <a:p>
+            <a:pPr marL="432000" indent="-324000">
+              <a:spcBef>
+                <a:spcPts val="1417"/>
+              </a:spcBef>
+              <a:buClr>
+                <a:srgbClr val="000000"/>
+              </a:buClr>
+              <a:buSzPct val="45000"/>
+              <a:buFont typeface="Wingdings" charset="2"/>
+              <a:buChar char=""/>
             </a:pPr>
             <a:r>
-              <a:rPr b="0" lang="en-US" sz="3600" spc="-1" strike="noStrike">
-                <a:solidFill>
-                  <a:srgbClr val="7030a0"/>
-                </a:solidFill>
-                <a:latin typeface="Calibri"/>
+              <a:rPr b="0" lang="en-US" sz="3200" spc="-1" strike="noStrike">
+                <a:latin typeface="Arial"/>
               </a:rPr>
-              <a:t>Click to edit Master title style</a:t>
+              <a:t>Click to edit the outline text format</a:t>
             </a:r>
-            <a:endParaRPr b="0" lang="en-US" sz="3600" spc="-1" strike="noStrike">
-              <a:solidFill>
-                <a:srgbClr val="000000"/>
-              </a:solidFill>
-              <a:latin typeface="Calibri"/>
-            </a:endParaRPr>
-          </a:p>
-        </p:txBody>
-      </p:sp>
-      <p:sp>
-        <p:nvSpPr>
-          <p:cNvPr id="44" name="PlaceHolder 3"/>
-          <p:cNvSpPr>
-            <a:spLocks noGrp="1"/>
-          </p:cNvSpPr>
-          <p:nvPr>
-            <p:ph type="body"/>
-          </p:nvPr>
-        </p:nvSpPr>
-        <p:spPr>
-          <a:xfrm>
-            <a:off x="2281320" y="1197360"/>
-            <a:ext cx="6413400" cy="3510720"/>
-          </a:xfrm>
-          <a:prstGeom prst="rect">
-            <a:avLst/>
-          </a:prstGeom>
-        </p:spPr>
-        <p:txBody>
-          <a:bodyPr>
-            <a:noAutofit/>
-          </a:bodyPr>
-          <a:p>
-            <a:pPr marL="343080" indent="-342720">
-              <a:lnSpc>
-                <a:spcPct val="100000"/>
-              </a:lnSpc>
+            <a:endParaRPr b="0" lang="en-US" sz="3200" spc="-1" strike="noStrike">
+              <a:latin typeface="Arial"/>
+            </a:endParaRPr>
+          </a:p>
+          <a:p>
+            <a:pPr lvl="1" marL="864000" indent="-324000">
               <a:spcBef>
-                <a:spcPts val="561"/>
+                <a:spcPts val="1134"/>
               </a:spcBef>
               <a:buClr>
-                <a:srgbClr val="002060"/>
+                <a:srgbClr val="000000"/>
               </a:buClr>
-              <a:buFont typeface="Arial"/>
-              <a:buChar char="•"/>
+              <a:buSzPct val="75000"/>
+              <a:buFont typeface="Symbol" charset="2"/>
+              <a:buChar char=""/>
             </a:pPr>
             <a:r>
               <a:rPr b="0" lang="en-US" sz="2800" spc="-1" strike="noStrike">
-                <a:solidFill>
-                  <a:srgbClr val="002060"/>
-                </a:solidFill>
-                <a:latin typeface="Calibri"/>
+                <a:latin typeface="Arial"/>
               </a:rPr>
-              <a:t>Click to edit Master text styles</a:t>
+              <a:t>Second Outline Level</a:t>
             </a:r>
             <a:endParaRPr b="0" lang="en-US" sz="2800" spc="-1" strike="noStrike">
-              <a:solidFill>
-                <a:srgbClr val="000000"/>
-              </a:solidFill>
-              <a:latin typeface="Calibri"/>
-            </a:endParaRPr>
-          </a:p>
-          <a:p>
-            <a:pPr lvl="1" marL="743040" indent="-285480">
-              <a:lnSpc>
-                <a:spcPct val="100000"/>
-              </a:lnSpc>
+              <a:latin typeface="Arial"/>
+            </a:endParaRPr>
+          </a:p>
+          <a:p>
+            <a:pPr lvl="2" marL="1296000" indent="-288000">
               <a:spcBef>
-                <a:spcPts val="561"/>
+                <a:spcPts val="850"/>
               </a:spcBef>
               <a:buClr>
-                <a:srgbClr val="002060"/>
+                <a:srgbClr val="000000"/>
               </a:buClr>
-              <a:buFont typeface="Arial"/>
-              <a:buChar char="–"/>
-            </a:pPr>
-            <a:r>
-              <a:rPr b="0" lang="en-US" sz="2800" spc="-1" strike="noStrike">
-                <a:solidFill>
-                  <a:srgbClr val="002060"/>
-                </a:solidFill>
-                <a:latin typeface="Calibri"/>
-              </a:rPr>
-              <a:t>Second level</a:t>
-            </a:r>
-            <a:endParaRPr b="0" lang="en-US" sz="2800" spc="-1" strike="noStrike">
-              <a:solidFill>
-                <a:srgbClr val="000000"/>
-              </a:solidFill>
-              <a:latin typeface="Calibri"/>
-            </a:endParaRPr>
-          </a:p>
-          <a:p>
-            <a:pPr lvl="2" marL="1143000" indent="-228240">
-              <a:lnSpc>
-                <a:spcPct val="100000"/>
-              </a:lnSpc>
-              <a:spcBef>
-                <a:spcPts val="479"/>
-              </a:spcBef>
-              <a:buClr>
-                <a:srgbClr val="002060"/>
-              </a:buClr>
-              <a:buFont typeface="Arial"/>
-              <a:buChar char="•"/>
+              <a:buSzPct val="45000"/>
+              <a:buFont typeface="Wingdings" charset="2"/>
+              <a:buChar char=""/>
             </a:pPr>
             <a:r>
               <a:rPr b="0" lang="en-US" sz="2400" spc="-1" strike="noStrike">
-                <a:solidFill>
-                  <a:srgbClr val="002060"/>
-                </a:solidFill>
-                <a:latin typeface="Calibri"/>
+                <a:latin typeface="Arial"/>
               </a:rPr>
-              <a:t>Third level</a:t>
+              <a:t>Third Outline Level</a:t>
             </a:r>
             <a:endParaRPr b="0" lang="en-US" sz="2400" spc="-1" strike="noStrike">
-              <a:solidFill>
-                <a:srgbClr val="000000"/>
-              </a:solidFill>
-              <a:latin typeface="Calibri"/>
-            </a:endParaRPr>
-          </a:p>
-          <a:p>
-            <a:pPr lvl="3" marL="1600200" indent="-228240">
-              <a:lnSpc>
-                <a:spcPct val="100000"/>
-              </a:lnSpc>
+              <a:latin typeface="Arial"/>
+            </a:endParaRPr>
+          </a:p>
+          <a:p>
+            <a:pPr lvl="3" marL="1728000" indent="-216000">
               <a:spcBef>
-                <a:spcPts val="400"/>
+                <a:spcPts val="567"/>
               </a:spcBef>
               <a:buClr>
-                <a:srgbClr val="002060"/>
+                <a:srgbClr val="000000"/>
               </a:buClr>
-              <a:buFont typeface="Arial"/>
-              <a:buChar char="–"/>
+              <a:buSzPct val="75000"/>
+              <a:buFont typeface="Symbol" charset="2"/>
+              <a:buChar char=""/>
             </a:pPr>
             <a:r>
               <a:rPr b="0" lang="en-US" sz="2000" spc="-1" strike="noStrike">
-                <a:solidFill>
-                  <a:srgbClr val="002060"/>
-                </a:solidFill>
-                <a:latin typeface="Calibri"/>
+                <a:latin typeface="Arial"/>
               </a:rPr>
-              <a:t>Fourth level</a:t>
+              <a:t>Fourth Outline Level</a:t>
             </a:r>
             <a:endParaRPr b="0" lang="en-US" sz="2000" spc="-1" strike="noStrike">
-              <a:solidFill>
-                <a:srgbClr val="000000"/>
-              </a:solidFill>
-              <a:latin typeface="Calibri"/>
-            </a:endParaRPr>
-          </a:p>
-          <a:p>
-            <a:pPr lvl="4" marL="2057400" indent="-228240">
-              <a:lnSpc>
-                <a:spcPct val="100000"/>
-              </a:lnSpc>
+              <a:latin typeface="Arial"/>
+            </a:endParaRPr>
+          </a:p>
+          <a:p>
+            <a:pPr lvl="4" marL="2160000" indent="-216000">
               <a:spcBef>
-                <a:spcPts val="400"/>
+                <a:spcPts val="283"/>
               </a:spcBef>
               <a:buClr>
-                <a:srgbClr val="002060"/>
+                <a:srgbClr val="000000"/>
               </a:buClr>
-              <a:buFont typeface="Arial"/>
-              <a:buChar char="»"/>
+              <a:buSzPct val="45000"/>
+              <a:buFont typeface="Wingdings" charset="2"/>
+              <a:buChar char=""/>
             </a:pPr>
             <a:r>
               <a:rPr b="0" lang="en-US" sz="2000" spc="-1" strike="noStrike">
-                <a:solidFill>
-                  <a:srgbClr val="002060"/>
-                </a:solidFill>
-                <a:latin typeface="Calibri"/>
+                <a:latin typeface="Arial"/>
               </a:rPr>
-              <a:t>Fifth level</a:t>
+              <a:t>Fifth Outline Level</a:t>
             </a:r>
             <a:endParaRPr b="0" lang="en-US" sz="2000" spc="-1" strike="noStrike">
-              <a:solidFill>
+              <a:latin typeface="Arial"/>
+            </a:endParaRPr>
+          </a:p>
+          <a:p>
+            <a:pPr lvl="5" marL="2592000" indent="-216000">
+              <a:spcBef>
+                <a:spcPts val="283"/>
+              </a:spcBef>
+              <a:buClr>
                 <a:srgbClr val="000000"/>
-              </a:solidFill>
-              <a:latin typeface="Calibri"/>
-            </a:endParaRPr>
-          </a:p>
-        </p:txBody>
-      </p:sp>
-      <p:sp>
-        <p:nvSpPr>
-          <p:cNvPr id="45" name="PlaceHolder 4"/>
-          <p:cNvSpPr>
-            <a:spLocks noGrp="1"/>
-          </p:cNvSpPr>
-          <p:nvPr>
-            <p:ph type="dt"/>
-          </p:nvPr>
-        </p:nvSpPr>
-        <p:spPr>
-          <a:xfrm>
-            <a:off x="457200" y="4767120"/>
-            <a:ext cx="2133360" cy="273600"/>
-          </a:xfrm>
-          <a:prstGeom prst="rect">
-            <a:avLst/>
-          </a:prstGeom>
-        </p:spPr>
-        <p:txBody>
-          <a:bodyPr anchor="ctr">
-            <a:noAutofit/>
-          </a:bodyPr>
-          <a:p>
-            <a:pPr>
-              <a:lnSpc>
-                <a:spcPct val="100000"/>
-              </a:lnSpc>
+              </a:buClr>
+              <a:buSzPct val="45000"/>
+              <a:buFont typeface="Wingdings" charset="2"/>
+              <a:buChar char=""/>
             </a:pPr>
-            <a:fld id="{33E426FF-B49F-46EB-97F5-DAF779AE7795}" type="datetime">
-              <a:rPr b="0" lang="en-US" sz="1200" spc="-1" strike="noStrike">
-                <a:solidFill>
-                  <a:srgbClr val="8b8b8b"/>
-                </a:solidFill>
-                <a:latin typeface="Calibri"/>
+            <a:r>
+              <a:rPr b="0" lang="en-US" sz="2000" spc="-1" strike="noStrike">
+                <a:latin typeface="Arial"/>
               </a:rPr>
-              <a:t>6/6/22</a:t>
-            </a:fld>
-            <a:endParaRPr b="0" lang="en-US" sz="1200" spc="-1" strike="noStrike">
-              <a:latin typeface="Times New Roman"/>
-            </a:endParaRPr>
-          </a:p>
-        </p:txBody>
-      </p:sp>
-      <p:sp>
-        <p:nvSpPr>
-          <p:cNvPr id="46" name="PlaceHolder 5"/>
-          <p:cNvSpPr>
-            <a:spLocks noGrp="1"/>
-          </p:cNvSpPr>
-          <p:nvPr>
-            <p:ph type="ftr"/>
-          </p:nvPr>
-        </p:nvSpPr>
-        <p:spPr>
-          <a:xfrm>
-            <a:off x="3124080" y="4767120"/>
-            <a:ext cx="2895120" cy="273600"/>
-          </a:xfrm>
-          <a:prstGeom prst="rect">
-            <a:avLst/>
-          </a:prstGeom>
-        </p:spPr>
-        <p:txBody>
-          <a:bodyPr anchor="ctr">
-            <a:noAutofit/>
-          </a:bodyPr>
-          <a:p>
-            <a:endParaRPr b="0" lang="en-US" sz="2400" spc="-1" strike="noStrike">
-              <a:latin typeface="Times New Roman"/>
-            </a:endParaRPr>
-          </a:p>
-        </p:txBody>
-      </p:sp>
-      <p:sp>
-        <p:nvSpPr>
-          <p:cNvPr id="47" name="PlaceHolder 6"/>
-          <p:cNvSpPr>
-            <a:spLocks noGrp="1"/>
-          </p:cNvSpPr>
-          <p:nvPr>
-            <p:ph type="sldNum"/>
-          </p:nvPr>
-        </p:nvSpPr>
-        <p:spPr>
-          <a:xfrm>
-            <a:off x="6553080" y="4767120"/>
-            <a:ext cx="2133360" cy="273600"/>
-          </a:xfrm>
-          <a:prstGeom prst="rect">
-            <a:avLst/>
-          </a:prstGeom>
-        </p:spPr>
-        <p:txBody>
-          <a:bodyPr anchor="ctr">
-            <a:noAutofit/>
-          </a:bodyPr>
-          <a:p>
-            <a:pPr algn="r">
-              <a:lnSpc>
-                <a:spcPct val="100000"/>
-              </a:lnSpc>
+              <a:t>Sixth Outline Level</a:t>
+            </a:r>
+            <a:endParaRPr b="0" lang="en-US" sz="2000" spc="-1" strike="noStrike">
+              <a:latin typeface="Arial"/>
+            </a:endParaRPr>
+          </a:p>
+          <a:p>
+            <a:pPr lvl="6" marL="3024000" indent="-216000">
+              <a:spcBef>
+                <a:spcPts val="283"/>
+              </a:spcBef>
+              <a:buClr>
+                <a:srgbClr val="000000"/>
+              </a:buClr>
+              <a:buSzPct val="45000"/>
+              <a:buFont typeface="Wingdings" charset="2"/>
+              <a:buChar char=""/>
             </a:pPr>
-            <a:fld id="{A4EFC3E1-D9FC-474F-B2D3-A46242A7579D}" type="slidenum">
-              <a:rPr b="0" lang="en-US" sz="1200" spc="-1" strike="noStrike">
-                <a:solidFill>
-                  <a:srgbClr val="8b8b8b"/>
-                </a:solidFill>
-                <a:latin typeface="Calibri"/>
+            <a:r>
+              <a:rPr b="0" lang="en-US" sz="2000" spc="-1" strike="noStrike">
+                <a:latin typeface="Arial"/>
               </a:rPr>
-              <a:t>&lt;number&gt;</a:t>
-            </a:fld>
-            <a:endParaRPr b="0" lang="en-US" sz="1200" spc="-1" strike="noStrike">
-              <a:latin typeface="Times New Roman"/>
+              <a:t>Seventh Outline Level</a:t>
+            </a:r>
+            <a:endParaRPr b="0" lang="en-US" sz="2000" spc="-1" strike="noStrike">
+              <a:latin typeface="Arial"/>
             </a:endParaRPr>
           </a:p>
         </p:txBody>
@@ -6443,14 +6142,14 @@
       </p:grpSpPr>
       <p:sp>
         <p:nvSpPr>
-          <p:cNvPr id="84" name="CustomShape 1"/>
+          <p:cNvPr id="78" name="CustomShape 1"/>
           <p:cNvSpPr/>
           <p:nvPr/>
         </p:nvSpPr>
         <p:spPr>
           <a:xfrm>
             <a:off x="-9000" y="5213880"/>
-            <a:ext cx="8389440" cy="516600"/>
+            <a:ext cx="8389080" cy="516240"/>
           </a:xfrm>
           <a:prstGeom prst="rect">
             <a:avLst/>
@@ -6482,6 +6181,7 @@
                   <a:srgbClr val="a6a6a6"/>
                 </a:solidFill>
                 <a:latin typeface="Calibri"/>
+                <a:ea typeface="DejaVu Sans"/>
               </a:rPr>
               <a:t>This presentation uses a free template provided by FPPT.com</a:t>
             </a:r>
@@ -6501,6 +6201,7 @@
                   <a:srgbClr val="a6a6a6"/>
                 </a:solidFill>
                 <a:latin typeface="Calibri"/>
+                <a:ea typeface="DejaVu Sans"/>
               </a:rPr>
               <a:t>www.free-power-point-templates.com</a:t>
             </a:r>
@@ -6512,7 +6213,7 @@
       </p:sp>
       <p:sp>
         <p:nvSpPr>
-          <p:cNvPr id="85" name="PlaceHolder 2"/>
+          <p:cNvPr id="79" name="PlaceHolder 2"/>
           <p:cNvSpPr>
             <a:spLocks noGrp="1"/>
           </p:cNvSpPr>
@@ -6522,330 +6223,206 @@
         </p:nvSpPr>
         <p:spPr>
           <a:xfrm>
-            <a:off x="448920" y="586440"/>
-            <a:ext cx="8245800" cy="763200"/>
-          </a:xfrm>
-          <a:prstGeom prst="rect">
-            <a:avLst/>
-          </a:prstGeom>
-        </p:spPr>
-        <p:txBody>
-          <a:bodyPr anchor="ctr">
-            <a:normAutofit/>
-          </a:bodyPr>
-          <a:p>
-            <a:pPr>
-              <a:lnSpc>
-                <a:spcPct val="100000"/>
-              </a:lnSpc>
+            <a:off x="457200" y="205200"/>
+            <a:ext cx="8229240" cy="858600"/>
+          </a:xfrm>
+          <a:prstGeom prst="rect">
+            <a:avLst/>
+          </a:prstGeom>
+        </p:spPr>
+        <p:txBody>
+          <a:bodyPr lIns="0" rIns="0" tIns="0" bIns="0" anchor="ctr">
+            <a:noAutofit/>
+          </a:bodyPr>
+          <a:p>
+            <a:pPr algn="ctr"/>
+            <a:r>
+              <a:rPr b="0" lang="en-US" sz="4400" spc="-1" strike="noStrike">
+                <a:latin typeface="Arial"/>
+              </a:rPr>
+              <a:t>Click to edit the title text format</a:t>
+            </a:r>
+            <a:endParaRPr b="0" lang="en-US" sz="4400" spc="-1" strike="noStrike">
+              <a:latin typeface="Arial"/>
+            </a:endParaRPr>
+          </a:p>
+        </p:txBody>
+      </p:sp>
+      <p:sp>
+        <p:nvSpPr>
+          <p:cNvPr id="80" name="PlaceHolder 3"/>
+          <p:cNvSpPr>
+            <a:spLocks noGrp="1"/>
+          </p:cNvSpPr>
+          <p:nvPr>
+            <p:ph type="body"/>
+          </p:nvPr>
+        </p:nvSpPr>
+        <p:spPr>
+          <a:xfrm>
+            <a:off x="457200" y="1203480"/>
+            <a:ext cx="8229240" cy="2982960"/>
+          </a:xfrm>
+          <a:prstGeom prst="rect">
+            <a:avLst/>
+          </a:prstGeom>
+        </p:spPr>
+        <p:txBody>
+          <a:bodyPr lIns="0" rIns="0" tIns="0" bIns="0">
+            <a:normAutofit/>
+          </a:bodyPr>
+          <a:p>
+            <a:pPr marL="432000" indent="-324000">
+              <a:spcBef>
+                <a:spcPts val="1417"/>
+              </a:spcBef>
+              <a:buClr>
+                <a:srgbClr val="000000"/>
+              </a:buClr>
+              <a:buSzPct val="45000"/>
+              <a:buFont typeface="Wingdings" charset="2"/>
+              <a:buChar char=""/>
             </a:pPr>
             <a:r>
-              <a:rPr b="0" lang="en-US" sz="3600" spc="-1" strike="noStrike">
-                <a:solidFill>
-                  <a:srgbClr val="7030a0"/>
-                </a:solidFill>
-                <a:latin typeface="Calibri"/>
+              <a:rPr b="0" lang="en-US" sz="3200" spc="-1" strike="noStrike">
+                <a:latin typeface="Arial"/>
               </a:rPr>
-              <a:t>Click to edit Master title style</a:t>
+              <a:t>Click to edit the outline text format</a:t>
             </a:r>
-            <a:endParaRPr b="0" lang="en-US" sz="3600" spc="-1" strike="noStrike">
-              <a:solidFill>
-                <a:srgbClr val="000000"/>
-              </a:solidFill>
-              <a:latin typeface="Calibri"/>
-            </a:endParaRPr>
-          </a:p>
-        </p:txBody>
-      </p:sp>
-      <p:sp>
-        <p:nvSpPr>
-          <p:cNvPr id="86" name="PlaceHolder 3"/>
-          <p:cNvSpPr>
-            <a:spLocks noGrp="1"/>
-          </p:cNvSpPr>
-          <p:nvPr>
-            <p:ph type="body"/>
-          </p:nvPr>
-        </p:nvSpPr>
-        <p:spPr>
-          <a:xfrm>
-            <a:off x="448920" y="1502640"/>
-            <a:ext cx="8245800" cy="3206520"/>
-          </a:xfrm>
-          <a:prstGeom prst="rect">
-            <a:avLst/>
-          </a:prstGeom>
-        </p:spPr>
-        <p:txBody>
-          <a:bodyPr>
-            <a:noAutofit/>
-          </a:bodyPr>
-          <a:p>
-            <a:pPr marL="343080" indent="-342720">
-              <a:lnSpc>
-                <a:spcPct val="100000"/>
-              </a:lnSpc>
+            <a:endParaRPr b="0" lang="en-US" sz="3200" spc="-1" strike="noStrike">
+              <a:latin typeface="Arial"/>
+            </a:endParaRPr>
+          </a:p>
+          <a:p>
+            <a:pPr lvl="1" marL="864000" indent="-324000">
               <a:spcBef>
-                <a:spcPts val="561"/>
+                <a:spcPts val="1134"/>
               </a:spcBef>
               <a:buClr>
-                <a:srgbClr val="002060"/>
+                <a:srgbClr val="000000"/>
               </a:buClr>
-              <a:buFont typeface="Arial"/>
-              <a:buChar char="•"/>
+              <a:buSzPct val="75000"/>
+              <a:buFont typeface="Symbol" charset="2"/>
+              <a:buChar char=""/>
             </a:pPr>
             <a:r>
               <a:rPr b="0" lang="en-US" sz="2800" spc="-1" strike="noStrike">
-                <a:solidFill>
-                  <a:srgbClr val="002060"/>
-                </a:solidFill>
-                <a:latin typeface="Calibri"/>
+                <a:latin typeface="Arial"/>
               </a:rPr>
-              <a:t>Click to edit Master text styles</a:t>
+              <a:t>Second Outline Level</a:t>
             </a:r>
             <a:endParaRPr b="0" lang="en-US" sz="2800" spc="-1" strike="noStrike">
-              <a:solidFill>
-                <a:srgbClr val="000000"/>
-              </a:solidFill>
-              <a:latin typeface="Calibri"/>
-            </a:endParaRPr>
-          </a:p>
-          <a:p>
-            <a:pPr lvl="1" marL="743040" indent="-285480">
-              <a:lnSpc>
-                <a:spcPct val="100000"/>
-              </a:lnSpc>
+              <a:latin typeface="Arial"/>
+            </a:endParaRPr>
+          </a:p>
+          <a:p>
+            <a:pPr lvl="2" marL="1296000" indent="-288000">
               <a:spcBef>
-                <a:spcPts val="561"/>
+                <a:spcPts val="850"/>
               </a:spcBef>
               <a:buClr>
-                <a:srgbClr val="002060"/>
+                <a:srgbClr val="000000"/>
               </a:buClr>
-              <a:buFont typeface="Arial"/>
-              <a:buChar char="–"/>
-            </a:pPr>
-            <a:r>
-              <a:rPr b="0" lang="en-US" sz="2800" spc="-1" strike="noStrike">
-                <a:solidFill>
-                  <a:srgbClr val="002060"/>
-                </a:solidFill>
-                <a:latin typeface="Calibri"/>
-              </a:rPr>
-              <a:t>Second level</a:t>
-            </a:r>
-            <a:endParaRPr b="0" lang="en-US" sz="2800" spc="-1" strike="noStrike">
-              <a:solidFill>
-                <a:srgbClr val="000000"/>
-              </a:solidFill>
-              <a:latin typeface="Calibri"/>
-            </a:endParaRPr>
-          </a:p>
-          <a:p>
-            <a:pPr lvl="2" marL="1143000" indent="-228240">
-              <a:lnSpc>
-                <a:spcPct val="100000"/>
-              </a:lnSpc>
-              <a:spcBef>
-                <a:spcPts val="479"/>
-              </a:spcBef>
-              <a:buClr>
-                <a:srgbClr val="002060"/>
-              </a:buClr>
-              <a:buFont typeface="Arial"/>
-              <a:buChar char="•"/>
+              <a:buSzPct val="45000"/>
+              <a:buFont typeface="Wingdings" charset="2"/>
+              <a:buChar char=""/>
             </a:pPr>
             <a:r>
               <a:rPr b="0" lang="en-US" sz="2400" spc="-1" strike="noStrike">
-                <a:solidFill>
-                  <a:srgbClr val="002060"/>
-                </a:solidFill>
-                <a:latin typeface="Calibri"/>
+                <a:latin typeface="Arial"/>
               </a:rPr>
-              <a:t>Third level</a:t>
+              <a:t>Third Outline Level</a:t>
             </a:r>
             <a:endParaRPr b="0" lang="en-US" sz="2400" spc="-1" strike="noStrike">
-              <a:solidFill>
-                <a:srgbClr val="000000"/>
-              </a:solidFill>
-              <a:latin typeface="Calibri"/>
-            </a:endParaRPr>
-          </a:p>
-          <a:p>
-            <a:pPr lvl="3" marL="1600200" indent="-228240">
-              <a:lnSpc>
-                <a:spcPct val="100000"/>
-              </a:lnSpc>
+              <a:latin typeface="Arial"/>
+            </a:endParaRPr>
+          </a:p>
+          <a:p>
+            <a:pPr lvl="3" marL="1728000" indent="-216000">
               <a:spcBef>
-                <a:spcPts val="400"/>
+                <a:spcPts val="567"/>
               </a:spcBef>
               <a:buClr>
-                <a:srgbClr val="002060"/>
+                <a:srgbClr val="000000"/>
               </a:buClr>
-              <a:buFont typeface="Arial"/>
-              <a:buChar char="–"/>
+              <a:buSzPct val="75000"/>
+              <a:buFont typeface="Symbol" charset="2"/>
+              <a:buChar char=""/>
             </a:pPr>
             <a:r>
               <a:rPr b="0" lang="en-US" sz="2000" spc="-1" strike="noStrike">
-                <a:solidFill>
-                  <a:srgbClr val="002060"/>
-                </a:solidFill>
-                <a:latin typeface="Calibri"/>
+                <a:latin typeface="Arial"/>
               </a:rPr>
-              <a:t>Fourth level</a:t>
+              <a:t>Fourth Outline Level</a:t>
             </a:r>
             <a:endParaRPr b="0" lang="en-US" sz="2000" spc="-1" strike="noStrike">
-              <a:solidFill>
-                <a:srgbClr val="000000"/>
-              </a:solidFill>
-              <a:latin typeface="Calibri"/>
-            </a:endParaRPr>
-          </a:p>
-          <a:p>
-            <a:pPr lvl="4" marL="2057400" indent="-228240">
-              <a:lnSpc>
-                <a:spcPct val="100000"/>
-              </a:lnSpc>
+              <a:latin typeface="Arial"/>
+            </a:endParaRPr>
+          </a:p>
+          <a:p>
+            <a:pPr lvl="4" marL="2160000" indent="-216000">
               <a:spcBef>
-                <a:spcPts val="400"/>
+                <a:spcPts val="283"/>
               </a:spcBef>
               <a:buClr>
-                <a:srgbClr val="002060"/>
+                <a:srgbClr val="000000"/>
               </a:buClr>
-              <a:buFont typeface="Arial"/>
-              <a:buChar char="»"/>
+              <a:buSzPct val="45000"/>
+              <a:buFont typeface="Wingdings" charset="2"/>
+              <a:buChar char=""/>
             </a:pPr>
             <a:r>
               <a:rPr b="0" lang="en-US" sz="2000" spc="-1" strike="noStrike">
-                <a:solidFill>
-                  <a:srgbClr val="002060"/>
-                </a:solidFill>
-                <a:latin typeface="Calibri"/>
+                <a:latin typeface="Arial"/>
               </a:rPr>
-              <a:t>Fifth level</a:t>
+              <a:t>Fifth Outline Level</a:t>
             </a:r>
             <a:endParaRPr b="0" lang="en-US" sz="2000" spc="-1" strike="noStrike">
-              <a:solidFill>
+              <a:latin typeface="Arial"/>
+            </a:endParaRPr>
+          </a:p>
+          <a:p>
+            <a:pPr lvl="5" marL="2592000" indent="-216000">
+              <a:spcBef>
+                <a:spcPts val="283"/>
+              </a:spcBef>
+              <a:buClr>
                 <a:srgbClr val="000000"/>
-              </a:solidFill>
-              <a:latin typeface="Calibri"/>
-            </a:endParaRPr>
-          </a:p>
-        </p:txBody>
-      </p:sp>
-      <p:sp>
-        <p:nvSpPr>
-          <p:cNvPr id="87" name="PlaceHolder 4"/>
-          <p:cNvSpPr>
-            <a:spLocks noGrp="1"/>
-          </p:cNvSpPr>
-          <p:nvPr>
-            <p:ph type="dt"/>
-          </p:nvPr>
-        </p:nvSpPr>
-        <p:spPr>
-          <a:xfrm>
-            <a:off x="457200" y="4767120"/>
-            <a:ext cx="2133360" cy="273600"/>
-          </a:xfrm>
-          <a:prstGeom prst="rect">
-            <a:avLst/>
-          </a:prstGeom>
-        </p:spPr>
-        <p:txBody>
-          <a:bodyPr anchor="ctr">
-            <a:noAutofit/>
-          </a:bodyPr>
-          <a:p>
-            <a:pPr>
-              <a:lnSpc>
-                <a:spcPct val="100000"/>
-              </a:lnSpc>
+              </a:buClr>
+              <a:buSzPct val="45000"/>
+              <a:buFont typeface="Wingdings" charset="2"/>
+              <a:buChar char=""/>
             </a:pPr>
-            <a:fld id="{1B5A2E96-9B0C-4BE8-A66A-5A4201F12DF4}" type="datetime">
-              <a:rPr b="0" lang="en-US" sz="1200" spc="-1" strike="noStrike">
-                <a:solidFill>
-                  <a:srgbClr val="8b8b8b"/>
-                </a:solidFill>
-                <a:latin typeface="Calibri"/>
+            <a:r>
+              <a:rPr b="0" lang="en-US" sz="2000" spc="-1" strike="noStrike">
+                <a:latin typeface="Arial"/>
               </a:rPr>
-              <a:t>6/6/22</a:t>
-            </a:fld>
-            <a:endParaRPr b="0" lang="en-US" sz="1200" spc="-1" strike="noStrike">
-              <a:latin typeface="Times New Roman"/>
-            </a:endParaRPr>
-          </a:p>
-        </p:txBody>
-      </p:sp>
-      <p:sp>
-        <p:nvSpPr>
-          <p:cNvPr id="88" name="PlaceHolder 5"/>
-          <p:cNvSpPr>
-            <a:spLocks noGrp="1"/>
-          </p:cNvSpPr>
-          <p:nvPr>
-            <p:ph type="ftr"/>
-          </p:nvPr>
-        </p:nvSpPr>
-        <p:spPr>
-          <a:xfrm>
-            <a:off x="3124080" y="4767120"/>
-            <a:ext cx="2895120" cy="273600"/>
-          </a:xfrm>
-          <a:prstGeom prst="rect">
-            <a:avLst/>
-          </a:prstGeom>
-        </p:spPr>
-        <p:txBody>
-          <a:bodyPr anchor="ctr">
-            <a:noAutofit/>
-          </a:bodyPr>
-          <a:p>
-            <a:endParaRPr b="0" lang="en-US" sz="2400" spc="-1" strike="noStrike">
-              <a:latin typeface="Times New Roman"/>
-            </a:endParaRPr>
-          </a:p>
-        </p:txBody>
-      </p:sp>
-      <p:sp>
-        <p:nvSpPr>
-          <p:cNvPr id="89" name="PlaceHolder 6"/>
-          <p:cNvSpPr>
-            <a:spLocks noGrp="1"/>
-          </p:cNvSpPr>
-          <p:nvPr>
-            <p:ph type="sldNum"/>
-          </p:nvPr>
-        </p:nvSpPr>
-        <p:spPr>
-          <a:xfrm>
-            <a:off x="6553080" y="4767120"/>
-            <a:ext cx="2133360" cy="273600"/>
-          </a:xfrm>
-          <a:prstGeom prst="rect">
-            <a:avLst/>
-          </a:prstGeom>
-        </p:spPr>
-        <p:txBody>
-          <a:bodyPr anchor="ctr">
-            <a:noAutofit/>
-          </a:bodyPr>
-          <a:p>
-            <a:pPr algn="r">
-              <a:lnSpc>
-                <a:spcPct val="100000"/>
-              </a:lnSpc>
+              <a:t>Sixth Outline Level</a:t>
+            </a:r>
+            <a:endParaRPr b="0" lang="en-US" sz="2000" spc="-1" strike="noStrike">
+              <a:latin typeface="Arial"/>
+            </a:endParaRPr>
+          </a:p>
+          <a:p>
+            <a:pPr lvl="6" marL="3024000" indent="-216000">
+              <a:spcBef>
+                <a:spcPts val="283"/>
+              </a:spcBef>
+              <a:buClr>
+                <a:srgbClr val="000000"/>
+              </a:buClr>
+              <a:buSzPct val="45000"/>
+              <a:buFont typeface="Wingdings" charset="2"/>
+              <a:buChar char=""/>
             </a:pPr>
-            <a:fld id="{4B9D80BA-2FA2-442E-B7D4-E157B1E45553}" type="slidenum">
-              <a:rPr b="0" lang="en-US" sz="1200" spc="-1" strike="noStrike">
-                <a:solidFill>
-                  <a:srgbClr val="8b8b8b"/>
-                </a:solidFill>
-                <a:latin typeface="Calibri"/>
+            <a:r>
+              <a:rPr b="0" lang="en-US" sz="2000" spc="-1" strike="noStrike">
+                <a:latin typeface="Arial"/>
               </a:rPr>
-              <a:t>&lt;number&gt;</a:t>
-            </a:fld>
-            <a:endParaRPr b="0" lang="en-US" sz="1200" spc="-1" strike="noStrike">
-              <a:latin typeface="Times New Roman"/>
+              <a:t>Seventh Outline Level</a:t>
+            </a:r>
+            <a:endParaRPr b="0" lang="en-US" sz="2000" spc="-1" strike="noStrike">
+              <a:latin typeface="Arial"/>
             </a:endParaRPr>
           </a:p>
         </p:txBody>
@@ -6899,7 +6476,7 @@
       </p:grpSpPr>
       <p:sp>
         <p:nvSpPr>
-          <p:cNvPr id="126" name="PlaceHolder 1"/>
+          <p:cNvPr id="117" name="PlaceHolder 1"/>
           <p:cNvSpPr>
             <a:spLocks noGrp="1"/>
           </p:cNvSpPr>
@@ -6936,7 +6513,7 @@
       </p:sp>
       <p:sp>
         <p:nvSpPr>
-          <p:cNvPr id="127" name="PlaceHolder 2"/>
+          <p:cNvPr id="118" name="PlaceHolder 2"/>
           <p:cNvSpPr>
             <a:spLocks noGrp="1"/>
           </p:cNvSpPr>
@@ -7152,14 +6729,14 @@
       </p:grpSpPr>
       <p:sp>
         <p:nvSpPr>
-          <p:cNvPr id="164" name="TextShape 1"/>
-          <p:cNvSpPr txBox="1"/>
+          <p:cNvPr id="155" name="CustomShape 1"/>
+          <p:cNvSpPr/>
           <p:nvPr/>
         </p:nvSpPr>
         <p:spPr>
           <a:xfrm>
             <a:off x="754200" y="2877120"/>
-            <a:ext cx="7329600" cy="1844280"/>
+            <a:ext cx="7329240" cy="1843920"/>
           </a:xfrm>
           <a:prstGeom prst="rect">
             <a:avLst/>
@@ -7169,15 +6746,21 @@
             <a:noFill/>
           </a:ln>
           <a:effectLst>
-            <a:outerShdw dist="37674" dir="2700000">
+            <a:outerShdw dir="2700000" dist="37674">
               <a:srgbClr val="000000">
                 <a:alpha val="40000"/>
               </a:srgbClr>
             </a:outerShdw>
           </a:effectLst>
         </p:spPr>
-        <p:txBody>
-          <a:bodyPr anchor="ctr">
+        <p:style>
+          <a:lnRef idx="0"/>
+          <a:fillRef idx="0"/>
+          <a:effectRef idx="0"/>
+          <a:fontRef idx="minor"/>
+        </p:style>
+        <p:txBody>
+          <a:bodyPr lIns="90000" rIns="90000" tIns="45000" bIns="45000" anchor="ctr">
             <a:normAutofit/>
           </a:bodyPr>
           <a:p>
@@ -7206,10 +6789,7 @@
               <a:t>Installation &amp; Configuration</a:t>
             </a:r>
             <a:endParaRPr b="0" lang="en-US" sz="4000" spc="-1" strike="noStrike">
-              <a:solidFill>
-                <a:srgbClr val="000000"/>
-              </a:solidFill>
-              <a:latin typeface="Calibri"/>
+              <a:latin typeface="Arial"/>
             </a:endParaRPr>
           </a:p>
         </p:txBody>
@@ -7246,14 +6826,14 @@
       </p:grpSpPr>
       <p:sp>
         <p:nvSpPr>
-          <p:cNvPr id="165" name="TextShape 1"/>
-          <p:cNvSpPr txBox="1"/>
+          <p:cNvPr id="156" name="CustomShape 1"/>
+          <p:cNvSpPr/>
           <p:nvPr/>
         </p:nvSpPr>
         <p:spPr>
           <a:xfrm>
             <a:off x="2586960" y="128520"/>
-            <a:ext cx="6107760" cy="725040"/>
+            <a:ext cx="6107400" cy="724680"/>
           </a:xfrm>
           <a:prstGeom prst="rect">
             <a:avLst/>
@@ -7263,8 +6843,14 @@
             <a:noFill/>
           </a:ln>
         </p:spPr>
-        <p:txBody>
-          <a:bodyPr anchor="ctr">
+        <p:style>
+          <a:lnRef idx="0"/>
+          <a:fillRef idx="0"/>
+          <a:effectRef idx="0"/>
+          <a:fontRef idx="minor"/>
+        </p:style>
+        <p:txBody>
+          <a:bodyPr lIns="90000" rIns="90000" tIns="45000" bIns="45000" anchor="ctr">
             <a:normAutofit/>
           </a:bodyPr>
           <a:p>
@@ -7283,24 +6869,21 @@
               <a:t>Group members</a:t>
             </a:r>
             <a:endParaRPr b="0" lang="en-US" sz="3600" spc="-1" strike="noStrike">
-              <a:solidFill>
-                <a:srgbClr val="000000"/>
-              </a:solidFill>
-              <a:latin typeface="Calibri"/>
-            </a:endParaRPr>
-          </a:p>
-        </p:txBody>
-      </p:sp>
-      <p:sp>
-        <p:nvSpPr>
-          <p:cNvPr id="166" name="TextShape 2"/>
-          <p:cNvSpPr txBox="1"/>
+              <a:latin typeface="Arial"/>
+            </a:endParaRPr>
+          </a:p>
+        </p:txBody>
+      </p:sp>
+      <p:sp>
+        <p:nvSpPr>
+          <p:cNvPr id="157" name="CustomShape 2"/>
+          <p:cNvSpPr/>
           <p:nvPr/>
         </p:nvSpPr>
         <p:spPr>
           <a:xfrm>
             <a:off x="2433960" y="1502640"/>
-            <a:ext cx="6260400" cy="3206520"/>
+            <a:ext cx="6260040" cy="3206160"/>
           </a:xfrm>
           <a:prstGeom prst="rect">
             <a:avLst/>
@@ -7310,12 +6893,18 @@
             <a:noFill/>
           </a:ln>
         </p:spPr>
-        <p:txBody>
-          <a:bodyPr>
-            <a:normAutofit/>
-          </a:bodyPr>
-          <a:p>
-            <a:pPr marL="343080" indent="-342720">
+        <p:style>
+          <a:lnRef idx="0"/>
+          <a:fillRef idx="0"/>
+          <a:effectRef idx="0"/>
+          <a:fontRef idx="minor"/>
+        </p:style>
+        <p:txBody>
+          <a:bodyPr lIns="90000" rIns="90000" tIns="45000" bIns="45000">
+            <a:normAutofit/>
+          </a:bodyPr>
+          <a:p>
+            <a:pPr marL="343080" indent="-342360">
               <a:lnSpc>
                 <a:spcPct val="100000"/>
               </a:lnSpc>
@@ -7338,14 +6927,11 @@
               <a:t>Mahdi </a:t>
             </a:r>
             <a:endParaRPr b="0" lang="en-US" sz="2800" spc="-1" strike="noStrike">
-              <a:solidFill>
-                <a:srgbClr val="000000"/>
-              </a:solidFill>
-              <a:latin typeface="Calibri"/>
-            </a:endParaRPr>
-          </a:p>
-          <a:p>
-            <a:pPr marL="343080" indent="-342720">
+              <a:latin typeface="Arial"/>
+            </a:endParaRPr>
+          </a:p>
+          <a:p>
+            <a:pPr marL="343080" indent="-342360">
               <a:lnSpc>
                 <a:spcPct val="100000"/>
               </a:lnSpc>
@@ -7368,14 +6954,11 @@
               <a:t>Samiullah Wardak</a:t>
             </a:r>
             <a:endParaRPr b="0" lang="en-US" sz="2800" spc="-1" strike="noStrike">
-              <a:solidFill>
-                <a:srgbClr val="000000"/>
-              </a:solidFill>
-              <a:latin typeface="Calibri"/>
-            </a:endParaRPr>
-          </a:p>
-          <a:p>
-            <a:pPr marL="343080" indent="-342720">
+              <a:latin typeface="Arial"/>
+            </a:endParaRPr>
+          </a:p>
+          <a:p>
+            <a:pPr marL="343080" indent="-342360">
               <a:lnSpc>
                 <a:spcPct val="100000"/>
               </a:lnSpc>
@@ -7398,14 +6981,11 @@
               <a:t>Atiqullah Hamraz</a:t>
             </a:r>
             <a:endParaRPr b="0" lang="en-US" sz="2800" spc="-1" strike="noStrike">
-              <a:solidFill>
-                <a:srgbClr val="000000"/>
-              </a:solidFill>
-              <a:latin typeface="Calibri"/>
-            </a:endParaRPr>
-          </a:p>
-          <a:p>
-            <a:pPr marL="343080" indent="-342720">
+              <a:latin typeface="Arial"/>
+            </a:endParaRPr>
+          </a:p>
+          <a:p>
+            <a:pPr marL="343080" indent="-342360">
               <a:lnSpc>
                 <a:spcPct val="100000"/>
               </a:lnSpc>
@@ -7428,14 +7008,11 @@
               <a:t>Baha-ul-haq Sharifi</a:t>
             </a:r>
             <a:endParaRPr b="0" lang="en-US" sz="2800" spc="-1" strike="noStrike">
-              <a:solidFill>
-                <a:srgbClr val="000000"/>
-              </a:solidFill>
-              <a:latin typeface="Calibri"/>
-            </a:endParaRPr>
-          </a:p>
-          <a:p>
-            <a:pPr marL="343080" indent="-342720">
+              <a:latin typeface="Arial"/>
+            </a:endParaRPr>
+          </a:p>
+          <a:p>
+            <a:pPr marL="343080" indent="-342360">
               <a:lnSpc>
                 <a:spcPct val="100000"/>
               </a:lnSpc>
@@ -7458,10 +7035,7 @@
               <a:t>Hedayatullah Nekzad</a:t>
             </a:r>
             <a:endParaRPr b="0" lang="en-US" sz="2800" spc="-1" strike="noStrike">
-              <a:solidFill>
-                <a:srgbClr val="000000"/>
-              </a:solidFill>
-              <a:latin typeface="Calibri"/>
+              <a:latin typeface="Arial"/>
             </a:endParaRPr>
           </a:p>
           <a:p>
@@ -7474,10 +7048,7 @@
               </a:spcBef>
             </a:pPr>
             <a:endParaRPr b="0" lang="en-US" sz="2800" spc="-1" strike="noStrike">
-              <a:solidFill>
-                <a:srgbClr val="000000"/>
-              </a:solidFill>
-              <a:latin typeface="Calibri"/>
+              <a:latin typeface="Arial"/>
             </a:endParaRPr>
           </a:p>
           <a:p>
@@ -7490,10 +7061,7 @@
               </a:spcBef>
             </a:pPr>
             <a:endParaRPr b="0" lang="en-US" sz="2800" spc="-1" strike="noStrike">
-              <a:solidFill>
-                <a:srgbClr val="000000"/>
-              </a:solidFill>
-              <a:latin typeface="Calibri"/>
+              <a:latin typeface="Arial"/>
             </a:endParaRPr>
           </a:p>
           <a:p>
@@ -7506,10 +7074,7 @@
               </a:spcBef>
             </a:pPr>
             <a:endParaRPr b="0" lang="en-US" sz="2800" spc="-1" strike="noStrike">
-              <a:solidFill>
-                <a:srgbClr val="000000"/>
-              </a:solidFill>
-              <a:latin typeface="Calibri"/>
+              <a:latin typeface="Arial"/>
             </a:endParaRPr>
           </a:p>
         </p:txBody>
@@ -7546,14 +7111,14 @@
       </p:grpSpPr>
       <p:sp>
         <p:nvSpPr>
-          <p:cNvPr id="167" name="TextShape 1"/>
-          <p:cNvSpPr txBox="1"/>
+          <p:cNvPr id="158" name="CustomShape 1"/>
+          <p:cNvSpPr/>
           <p:nvPr/>
         </p:nvSpPr>
         <p:spPr>
           <a:xfrm>
             <a:off x="448920" y="586440"/>
-            <a:ext cx="8245800" cy="763200"/>
+            <a:ext cx="8245440" cy="762840"/>
           </a:xfrm>
           <a:prstGeom prst="rect">
             <a:avLst/>
@@ -7563,8 +7128,14 @@
             <a:noFill/>
           </a:ln>
         </p:spPr>
-        <p:txBody>
-          <a:bodyPr anchor="ctr">
+        <p:style>
+          <a:lnRef idx="0"/>
+          <a:fillRef idx="0"/>
+          <a:effectRef idx="0"/>
+          <a:fontRef idx="minor"/>
+        </p:style>
+        <p:txBody>
+          <a:bodyPr lIns="90000" rIns="90000" tIns="45000" bIns="45000" anchor="ctr">
             <a:normAutofit/>
           </a:bodyPr>
           <a:p>
@@ -7583,24 +7154,21 @@
               <a:t>History of Active Directory</a:t>
             </a:r>
             <a:endParaRPr b="0" lang="en-US" sz="3600" spc="-1" strike="noStrike">
-              <a:solidFill>
-                <a:srgbClr val="000000"/>
-              </a:solidFill>
-              <a:latin typeface="Calibri"/>
-            </a:endParaRPr>
-          </a:p>
-        </p:txBody>
-      </p:sp>
-      <p:sp>
-        <p:nvSpPr>
-          <p:cNvPr id="168" name="TextShape 2"/>
-          <p:cNvSpPr txBox="1"/>
+              <a:latin typeface="Arial"/>
+            </a:endParaRPr>
+          </a:p>
+        </p:txBody>
+      </p:sp>
+      <p:sp>
+        <p:nvSpPr>
+          <p:cNvPr id="159" name="CustomShape 2"/>
+          <p:cNvSpPr/>
           <p:nvPr/>
         </p:nvSpPr>
         <p:spPr>
           <a:xfrm>
             <a:off x="448920" y="1502640"/>
-            <a:ext cx="8245800" cy="3206520"/>
+            <a:ext cx="8245440" cy="3206160"/>
           </a:xfrm>
           <a:prstGeom prst="rect">
             <a:avLst/>
@@ -7610,12 +7178,18 @@
             <a:noFill/>
           </a:ln>
         </p:spPr>
-        <p:txBody>
-          <a:bodyPr>
+        <p:style>
+          <a:lnRef idx="0"/>
+          <a:fillRef idx="0"/>
+          <a:effectRef idx="0"/>
+          <a:fontRef idx="minor"/>
+        </p:style>
+        <p:txBody>
+          <a:bodyPr lIns="90000" rIns="90000" tIns="45000" bIns="45000">
             <a:noAutofit/>
           </a:bodyPr>
           <a:p>
-            <a:pPr marL="343080" indent="-342720">
+            <a:pPr marL="343080" indent="-342360">
               <a:lnSpc>
                 <a:spcPct val="100000"/>
               </a:lnSpc>
@@ -7638,14 +7212,11 @@
               <a:t>Microsoft previewed Active Directory in 1999, released it first with Windows 2000 Server.</a:t>
             </a:r>
             <a:endParaRPr b="0" lang="en-US" sz="2800" spc="-1" strike="noStrike">
-              <a:solidFill>
-                <a:srgbClr val="000000"/>
-              </a:solidFill>
-              <a:latin typeface="Calibri"/>
-            </a:endParaRPr>
-          </a:p>
-          <a:p>
-            <a:pPr marL="343080" indent="-342720">
+              <a:latin typeface="Arial"/>
+            </a:endParaRPr>
+          </a:p>
+          <a:p>
+            <a:pPr marL="343080" indent="-342360">
               <a:lnSpc>
                 <a:spcPct val="100000"/>
               </a:lnSpc>
@@ -7731,10 +7302,7 @@
               <a:t>unsupported.</a:t>
             </a:r>
             <a:endParaRPr b="0" lang="en-US" sz="2800" spc="-1" strike="noStrike">
-              <a:solidFill>
-                <a:srgbClr val="000000"/>
-              </a:solidFill>
-              <a:latin typeface="Calibri"/>
+              <a:latin typeface="Arial"/>
             </a:endParaRPr>
           </a:p>
         </p:txBody>
@@ -7771,14 +7339,14 @@
       </p:grpSpPr>
       <p:sp>
         <p:nvSpPr>
-          <p:cNvPr id="169" name="TextShape 1"/>
-          <p:cNvSpPr txBox="1"/>
+          <p:cNvPr id="160" name="CustomShape 1"/>
+          <p:cNvSpPr/>
           <p:nvPr/>
         </p:nvSpPr>
         <p:spPr>
           <a:xfrm>
             <a:off x="448920" y="586440"/>
-            <a:ext cx="8245800" cy="763200"/>
+            <a:ext cx="8245440" cy="762840"/>
           </a:xfrm>
           <a:prstGeom prst="rect">
             <a:avLst/>
@@ -7788,8 +7356,14 @@
             <a:noFill/>
           </a:ln>
         </p:spPr>
-        <p:txBody>
-          <a:bodyPr anchor="ctr">
+        <p:style>
+          <a:lnRef idx="0"/>
+          <a:fillRef idx="0"/>
+          <a:effectRef idx="0"/>
+          <a:fontRef idx="minor"/>
+        </p:style>
+        <p:txBody>
+          <a:bodyPr lIns="90000" rIns="90000" tIns="45000" bIns="45000" anchor="ctr">
             <a:noAutofit/>
           </a:bodyPr>
           <a:p>
@@ -7808,24 +7382,21 @@
               <a:t>Active Directory (AD)</a:t>
             </a:r>
             <a:endParaRPr b="0" lang="en-US" sz="3600" spc="-1" strike="noStrike">
-              <a:solidFill>
-                <a:srgbClr val="000000"/>
-              </a:solidFill>
-              <a:latin typeface="Calibri"/>
-            </a:endParaRPr>
-          </a:p>
-        </p:txBody>
-      </p:sp>
-      <p:sp>
-        <p:nvSpPr>
-          <p:cNvPr id="170" name="TextShape 2"/>
-          <p:cNvSpPr txBox="1"/>
+              <a:latin typeface="Arial"/>
+            </a:endParaRPr>
+          </a:p>
+        </p:txBody>
+      </p:sp>
+      <p:sp>
+        <p:nvSpPr>
+          <p:cNvPr id="161" name="CustomShape 2"/>
+          <p:cNvSpPr/>
           <p:nvPr/>
         </p:nvSpPr>
         <p:spPr>
           <a:xfrm>
             <a:off x="448920" y="1502640"/>
-            <a:ext cx="8245800" cy="3206520"/>
+            <a:ext cx="8245440" cy="3206160"/>
           </a:xfrm>
           <a:prstGeom prst="rect">
             <a:avLst/>
@@ -7835,12 +7406,18 @@
             <a:noFill/>
           </a:ln>
         </p:spPr>
-        <p:txBody>
-          <a:bodyPr>
+        <p:style>
+          <a:lnRef idx="0"/>
+          <a:fillRef idx="0"/>
+          <a:effectRef idx="0"/>
+          <a:fontRef idx="minor"/>
+        </p:style>
+        <p:txBody>
+          <a:bodyPr lIns="90000" rIns="90000" tIns="45000" bIns="45000">
             <a:noAutofit/>
           </a:bodyPr>
           <a:p>
-            <a:pPr marL="343080" indent="-342720">
+            <a:pPr marL="343080" indent="-342360">
               <a:lnSpc>
                 <a:spcPct val="100000"/>
               </a:lnSpc>
@@ -7863,14 +7440,11 @@
               <a:t>AD is a directory service that runs on MS Windows Server</a:t>
             </a:r>
             <a:endParaRPr b="0" lang="en-US" sz="2800" spc="-1" strike="noStrike">
-              <a:solidFill>
-                <a:srgbClr val="000000"/>
-              </a:solidFill>
-              <a:latin typeface="Calibri"/>
-            </a:endParaRPr>
-          </a:p>
-          <a:p>
-            <a:pPr marL="343080" indent="-342720">
+              <a:latin typeface="Arial"/>
+            </a:endParaRPr>
+          </a:p>
+          <a:p>
+            <a:pPr marL="343080" indent="-342360">
               <a:lnSpc>
                 <a:spcPct val="100000"/>
               </a:lnSpc>
@@ -7893,14 +7467,11 @@
               <a:t>It enables administrators to manage permissions and control access to network resources</a:t>
             </a:r>
             <a:endParaRPr b="0" lang="en-US" sz="2800" spc="-1" strike="noStrike">
-              <a:solidFill>
-                <a:srgbClr val="000000"/>
-              </a:solidFill>
-              <a:latin typeface="Calibri"/>
-            </a:endParaRPr>
-          </a:p>
-          <a:p>
-            <a:pPr marL="343080" indent="-342720">
+              <a:latin typeface="Arial"/>
+            </a:endParaRPr>
+          </a:p>
+          <a:p>
+            <a:pPr marL="343080" indent="-342360">
               <a:lnSpc>
                 <a:spcPct val="100000"/>
               </a:lnSpc>
@@ -7923,10 +7494,7 @@
               <a:t>In AD data is stored in objects</a:t>
             </a:r>
             <a:endParaRPr b="0" lang="en-US" sz="2800" spc="-1" strike="noStrike">
-              <a:solidFill>
-                <a:srgbClr val="000000"/>
-              </a:solidFill>
-              <a:latin typeface="Calibri"/>
+              <a:latin typeface="Arial"/>
             </a:endParaRPr>
           </a:p>
           <a:p>
@@ -7939,10 +7507,7 @@
               </a:spcBef>
             </a:pPr>
             <a:endParaRPr b="0" lang="en-US" sz="2800" spc="-1" strike="noStrike">
-              <a:solidFill>
-                <a:srgbClr val="000000"/>
-              </a:solidFill>
-              <a:latin typeface="Calibri"/>
+              <a:latin typeface="Arial"/>
             </a:endParaRPr>
           </a:p>
         </p:txBody>
@@ -7979,14 +7544,14 @@
       </p:grpSpPr>
       <p:sp>
         <p:nvSpPr>
-          <p:cNvPr id="171" name="CustomShape 1"/>
+          <p:cNvPr id="162" name="CustomShape 1"/>
           <p:cNvSpPr/>
           <p:nvPr/>
         </p:nvSpPr>
         <p:spPr>
           <a:xfrm>
             <a:off x="448920" y="586440"/>
-            <a:ext cx="8245440" cy="915480"/>
+            <a:ext cx="8245080" cy="915120"/>
           </a:xfrm>
           <a:prstGeom prst="rect">
             <a:avLst/>
@@ -8018,6 +7583,7 @@
                   <a:srgbClr val="7030a0"/>
                 </a:solidFill>
                 <a:latin typeface="Calibri"/>
+                <a:ea typeface="DejaVu Sans"/>
               </a:rPr>
               <a:t>Objects includes</a:t>
             </a:r>
@@ -8029,14 +7595,14 @@
       </p:sp>
       <p:sp>
         <p:nvSpPr>
-          <p:cNvPr id="172" name="CustomShape 2"/>
+          <p:cNvPr id="163" name="CustomShape 2"/>
           <p:cNvSpPr/>
           <p:nvPr/>
         </p:nvSpPr>
         <p:spPr>
           <a:xfrm>
             <a:off x="444240" y="1655640"/>
-            <a:ext cx="8245440" cy="3206160"/>
+            <a:ext cx="8245080" cy="3205800"/>
           </a:xfrm>
           <a:prstGeom prst="rect">
             <a:avLst/>
@@ -8057,7 +7623,7 @@
             <a:noAutofit/>
           </a:bodyPr>
           <a:p>
-            <a:pPr marL="343080" indent="-342360">
+            <a:pPr marL="343080" indent="-342000">
               <a:lnSpc>
                 <a:spcPct val="100000"/>
               </a:lnSpc>
@@ -8076,6 +7642,7 @@
                   <a:srgbClr val="002060"/>
                 </a:solidFill>
                 <a:latin typeface="Calibri"/>
+                <a:ea typeface="DejaVu Sans"/>
               </a:rPr>
               <a:t>Users</a:t>
             </a:r>
@@ -8084,7 +7651,7 @@
             </a:endParaRPr>
           </a:p>
           <a:p>
-            <a:pPr marL="343080" indent="-342360">
+            <a:pPr marL="343080" indent="-342000">
               <a:lnSpc>
                 <a:spcPct val="100000"/>
               </a:lnSpc>
@@ -8103,15 +7670,16 @@
                   <a:srgbClr val="002060"/>
                 </a:solidFill>
                 <a:latin typeface="Calibri"/>
+                <a:ea typeface="DejaVu Sans"/>
               </a:rPr>
-              <a:t>Groups</a:t>
+              <a:t>Applications</a:t>
             </a:r>
             <a:endParaRPr b="0" lang="en-US" sz="2800" spc="-1" strike="noStrike">
               <a:latin typeface="Arial"/>
             </a:endParaRPr>
           </a:p>
           <a:p>
-            <a:pPr marL="343080" indent="-342360">
+            <a:pPr marL="343080" indent="-342000">
               <a:lnSpc>
                 <a:spcPct val="100000"/>
               </a:lnSpc>
@@ -8130,15 +7698,16 @@
                   <a:srgbClr val="002060"/>
                 </a:solidFill>
                 <a:latin typeface="Calibri"/>
+                <a:ea typeface="DejaVu Sans"/>
               </a:rPr>
-              <a:t>Applications</a:t>
+              <a:t>Devices</a:t>
             </a:r>
             <a:endParaRPr b="0" lang="en-US" sz="2800" spc="-1" strike="noStrike">
               <a:latin typeface="Arial"/>
             </a:endParaRPr>
           </a:p>
           <a:p>
-            <a:pPr marL="343080" indent="-342360">
+            <a:pPr marL="343080" indent="-342000">
               <a:lnSpc>
                 <a:spcPct val="100000"/>
               </a:lnSpc>
@@ -8157,33 +7726,7 @@
                   <a:srgbClr val="002060"/>
                 </a:solidFill>
                 <a:latin typeface="Calibri"/>
-              </a:rPr>
-              <a:t>Devices</a:t>
-            </a:r>
-            <a:endParaRPr b="0" lang="en-US" sz="2800" spc="-1" strike="noStrike">
-              <a:latin typeface="Arial"/>
-            </a:endParaRPr>
-          </a:p>
-          <a:p>
-            <a:pPr marL="343080" indent="-342360">
-              <a:lnSpc>
-                <a:spcPct val="100000"/>
-              </a:lnSpc>
-              <a:spcBef>
-                <a:spcPts val="561"/>
-              </a:spcBef>
-              <a:buClr>
-                <a:srgbClr val="002060"/>
-              </a:buClr>
-              <a:buFont typeface="Arial"/>
-              <a:buChar char="•"/>
-            </a:pPr>
-            <a:r>
-              <a:rPr b="0" lang="en-US" sz="2800" spc="-1" strike="noStrike">
-                <a:solidFill>
-                  <a:srgbClr val="002060"/>
-                </a:solidFill>
-                <a:latin typeface="Calibri"/>
+                <a:ea typeface="DejaVu Sans"/>
               </a:rPr>
               <a:t>Which categorized according to their name add attributes</a:t>
             </a:r>
@@ -8225,14 +7768,14 @@
       </p:grpSpPr>
       <p:sp>
         <p:nvSpPr>
-          <p:cNvPr id="173" name="CustomShape 1"/>
+          <p:cNvPr id="164" name="CustomShape 1"/>
           <p:cNvSpPr/>
           <p:nvPr/>
         </p:nvSpPr>
         <p:spPr>
           <a:xfrm>
             <a:off x="448920" y="586440"/>
-            <a:ext cx="8245440" cy="762840"/>
+            <a:ext cx="8245080" cy="762480"/>
           </a:xfrm>
           <a:prstGeom prst="rect">
             <a:avLst/>
@@ -8264,6 +7807,7 @@
                   <a:srgbClr val="7030a0"/>
                 </a:solidFill>
                 <a:latin typeface="Calibri"/>
+                <a:ea typeface="DejaVu Sans"/>
               </a:rPr>
               <a:t>Domain Controller</a:t>
             </a:r>
@@ -8275,14 +7819,14 @@
       </p:sp>
       <p:sp>
         <p:nvSpPr>
-          <p:cNvPr id="174" name="CustomShape 2"/>
+          <p:cNvPr id="165" name="CustomShape 2"/>
           <p:cNvSpPr/>
           <p:nvPr/>
         </p:nvSpPr>
         <p:spPr>
           <a:xfrm>
             <a:off x="448920" y="1502640"/>
-            <a:ext cx="8245440" cy="3206160"/>
+            <a:ext cx="8245080" cy="3205800"/>
           </a:xfrm>
           <a:prstGeom prst="rect">
             <a:avLst/>
@@ -8303,7 +7847,7 @@
             <a:normAutofit fontScale="70000"/>
           </a:bodyPr>
           <a:p>
-            <a:pPr marL="343080" indent="-342360">
+            <a:pPr marL="343080" indent="-342000">
               <a:lnSpc>
                 <a:spcPct val="100000"/>
               </a:lnSpc>
@@ -8322,6 +7866,7 @@
                   <a:srgbClr val="002060"/>
                 </a:solidFill>
                 <a:latin typeface="Calibri"/>
+                <a:ea typeface="DejaVu Sans"/>
               </a:rPr>
               <a:t>A server running the AD </a:t>
             </a:r>
@@ -8331,6 +7876,7 @@
                   <a:srgbClr val="002060"/>
                 </a:solidFill>
                 <a:latin typeface="Calibri"/>
+                <a:ea typeface="DejaVu Sans"/>
               </a:rPr>
               <a:t>Domain Service</a:t>
             </a:r>
@@ -8340,6 +7886,7 @@
                   <a:srgbClr val="002060"/>
                 </a:solidFill>
                 <a:latin typeface="Calibri"/>
+                <a:ea typeface="DejaVu Sans"/>
               </a:rPr>
               <a:t> (</a:t>
             </a:r>
@@ -8349,6 +7896,7 @@
                   <a:srgbClr val="002060"/>
                 </a:solidFill>
                 <a:latin typeface="Calibri"/>
+                <a:ea typeface="DejaVu Sans"/>
               </a:rPr>
               <a:t>AD DS</a:t>
             </a:r>
@@ -8358,6 +7906,7 @@
                   <a:srgbClr val="002060"/>
                 </a:solidFill>
                 <a:latin typeface="Calibri"/>
+                <a:ea typeface="DejaVu Sans"/>
               </a:rPr>
               <a:t>) role is called a </a:t>
             </a:r>
@@ -8367,6 +7916,7 @@
                   <a:srgbClr val="002060"/>
                 </a:solidFill>
                 <a:latin typeface="Calibri"/>
+                <a:ea typeface="DejaVu Sans"/>
               </a:rPr>
               <a:t>domain controller</a:t>
             </a:r>
@@ -8376,6 +7926,7 @@
                   <a:srgbClr val="002060"/>
                 </a:solidFill>
                 <a:latin typeface="Calibri"/>
+                <a:ea typeface="DejaVu Sans"/>
               </a:rPr>
               <a:t>.</a:t>
             </a:r>
@@ -8384,7 +7935,7 @@
             </a:endParaRPr>
           </a:p>
           <a:p>
-            <a:pPr marL="343080" indent="-342360">
+            <a:pPr marL="343080" indent="-342000">
               <a:lnSpc>
                 <a:spcPct val="100000"/>
               </a:lnSpc>
@@ -8403,6 +7954,7 @@
                   <a:srgbClr val="002060"/>
                 </a:solidFill>
                 <a:latin typeface="Calibri"/>
+                <a:ea typeface="DejaVu Sans"/>
               </a:rPr>
               <a:t>It authenticates and authorizes all users and computers.</a:t>
             </a:r>
@@ -8411,7 +7963,7 @@
             </a:endParaRPr>
           </a:p>
           <a:p>
-            <a:pPr marL="343080" indent="-342360">
+            <a:pPr marL="343080" indent="-342000">
               <a:lnSpc>
                 <a:spcPct val="100000"/>
               </a:lnSpc>
@@ -8430,6 +7982,7 @@
                   <a:srgbClr val="002060"/>
                 </a:solidFill>
                 <a:latin typeface="Calibri"/>
+                <a:ea typeface="DejaVu Sans"/>
               </a:rPr>
               <a:t>A domain controller is contacted when a user logs into a device.</a:t>
             </a:r>
@@ -8438,7 +7991,7 @@
             </a:endParaRPr>
           </a:p>
           <a:p>
-            <a:pPr marL="343080" indent="-342360">
+            <a:pPr marL="343080" indent="-342000">
               <a:lnSpc>
                 <a:spcPct val="100000"/>
               </a:lnSpc>
@@ -8457,6 +8010,7 @@
                   <a:srgbClr val="002060"/>
                 </a:solidFill>
                 <a:latin typeface="Calibri"/>
+                <a:ea typeface="DejaVu Sans"/>
               </a:rPr>
               <a:t>OR accesses another device across the network.</a:t>
             </a:r>
@@ -8511,14 +8065,14 @@
       </p:grpSpPr>
       <p:sp>
         <p:nvSpPr>
-          <p:cNvPr id="175" name="CustomShape 1"/>
+          <p:cNvPr id="166" name="CustomShape 1"/>
           <p:cNvSpPr/>
           <p:nvPr/>
         </p:nvSpPr>
         <p:spPr>
           <a:xfrm>
             <a:off x="448920" y="586440"/>
-            <a:ext cx="8245440" cy="762840"/>
+            <a:ext cx="8245080" cy="762480"/>
           </a:xfrm>
           <a:prstGeom prst="rect">
             <a:avLst/>
@@ -8550,6 +8104,7 @@
                   <a:srgbClr val="7030a0"/>
                 </a:solidFill>
                 <a:latin typeface="Calibri"/>
+                <a:ea typeface="DejaVu Sans"/>
               </a:rPr>
               <a:t>Domain Services</a:t>
             </a:r>
@@ -8561,14 +8116,14 @@
       </p:sp>
       <p:sp>
         <p:nvSpPr>
-          <p:cNvPr id="176" name="CustomShape 2"/>
+          <p:cNvPr id="167" name="CustomShape 2"/>
           <p:cNvSpPr/>
           <p:nvPr/>
         </p:nvSpPr>
         <p:spPr>
           <a:xfrm>
             <a:off x="448920" y="1502640"/>
-            <a:ext cx="8245440" cy="3206160"/>
+            <a:ext cx="8245080" cy="3205800"/>
           </a:xfrm>
           <a:prstGeom prst="rect">
             <a:avLst/>
@@ -8589,7 +8144,7 @@
             <a:noAutofit/>
           </a:bodyPr>
           <a:p>
-            <a:pPr marL="343080" indent="-342360">
+            <a:pPr marL="343080" indent="-342000">
               <a:lnSpc>
                 <a:spcPct val="100000"/>
               </a:lnSpc>
@@ -8608,6 +8163,7 @@
                   <a:srgbClr val="002060"/>
                 </a:solidFill>
                 <a:latin typeface="Calibri"/>
+                <a:ea typeface="DejaVu Sans"/>
               </a:rPr>
               <a:t>Active Directory Domain Services (AD DS) is the foundation stone of every Windows domain network.</a:t>
             </a:r>
@@ -8616,7 +8172,7 @@
             </a:endParaRPr>
           </a:p>
           <a:p>
-            <a:pPr marL="343080" indent="-342360">
+            <a:pPr marL="343080" indent="-342000">
               <a:lnSpc>
                 <a:spcPct val="100000"/>
               </a:lnSpc>
@@ -8635,6 +8191,7 @@
                   <a:srgbClr val="002060"/>
                 </a:solidFill>
                 <a:latin typeface="Calibri"/>
+                <a:ea typeface="DejaVu Sans"/>
               </a:rPr>
               <a:t>It stores information about members of the domain.</a:t>
             </a:r>
@@ -8643,7 +8200,7 @@
             </a:endParaRPr>
           </a:p>
           <a:p>
-            <a:pPr marL="343080" indent="-342360">
+            <a:pPr marL="343080" indent="-342000">
               <a:lnSpc>
                 <a:spcPct val="100000"/>
               </a:lnSpc>
@@ -8662,6 +8219,7 @@
                   <a:srgbClr val="002060"/>
                 </a:solidFill>
                 <a:latin typeface="Calibri"/>
+                <a:ea typeface="DejaVu Sans"/>
               </a:rPr>
               <a:t>Defines their access rights.</a:t>
             </a:r>
@@ -8670,7 +8228,7 @@
             </a:endParaRPr>
           </a:p>
           <a:p>
-            <a:pPr marL="343080" indent="-342360">
+            <a:pPr marL="343080" indent="-342000">
               <a:lnSpc>
                 <a:spcPct val="100000"/>
               </a:lnSpc>
@@ -8689,6 +8247,7 @@
                   <a:srgbClr val="002060"/>
                 </a:solidFill>
                 <a:latin typeface="Calibri"/>
+                <a:ea typeface="DejaVu Sans"/>
               </a:rPr>
               <a:t>The server running this service is called a </a:t>
             </a:r>
@@ -8698,6 +8257,7 @@
                   <a:srgbClr val="002060"/>
                 </a:solidFill>
                 <a:latin typeface="Calibri"/>
+                <a:ea typeface="DejaVu Sans"/>
               </a:rPr>
               <a:t>domain controller</a:t>
             </a:r>
@@ -8707,6 +8267,7 @@
                   <a:srgbClr val="002060"/>
                 </a:solidFill>
                 <a:latin typeface="Calibri"/>
+                <a:ea typeface="DejaVu Sans"/>
               </a:rPr>
               <a:t>. </a:t>
             </a:r>
@@ -8761,14 +8322,14 @@
       </p:grpSpPr>
       <p:sp>
         <p:nvSpPr>
-          <p:cNvPr id="177" name="CustomShape 1"/>
+          <p:cNvPr id="168" name="CustomShape 1"/>
           <p:cNvSpPr/>
           <p:nvPr/>
         </p:nvSpPr>
         <p:spPr>
           <a:xfrm>
             <a:off x="448920" y="586440"/>
-            <a:ext cx="8245440" cy="762840"/>
+            <a:ext cx="8245080" cy="762480"/>
           </a:xfrm>
           <a:prstGeom prst="rect">
             <a:avLst/>
@@ -8800,6 +8361,7 @@
                   <a:srgbClr val="7030a0"/>
                 </a:solidFill>
                 <a:latin typeface="Calibri"/>
+                <a:ea typeface="DejaVu Sans"/>
               </a:rPr>
               <a:t>Domain Services Examples</a:t>
             </a:r>
@@ -8811,14 +8373,14 @@
       </p:sp>
       <p:sp>
         <p:nvSpPr>
-          <p:cNvPr id="178" name="CustomShape 2"/>
+          <p:cNvPr id="169" name="CustomShape 2"/>
           <p:cNvSpPr/>
           <p:nvPr/>
         </p:nvSpPr>
         <p:spPr>
           <a:xfrm>
             <a:off x="448920" y="1502640"/>
-            <a:ext cx="8245440" cy="3206160"/>
+            <a:ext cx="8245080" cy="3205800"/>
           </a:xfrm>
           <a:prstGeom prst="rect">
             <a:avLst/>
@@ -8839,7 +8401,7 @@
             <a:noAutofit/>
           </a:bodyPr>
           <a:p>
-            <a:pPr marL="343080" indent="-342360">
+            <a:pPr marL="343080" indent="-342000">
               <a:lnSpc>
                 <a:spcPct val="100000"/>
               </a:lnSpc>
@@ -8858,6 +8420,7 @@
                   <a:srgbClr val="002060"/>
                 </a:solidFill>
                 <a:latin typeface="Calibri"/>
+                <a:ea typeface="DejaVu Sans"/>
               </a:rPr>
               <a:t>Group Policy</a:t>
             </a:r>
@@ -8866,7 +8429,7 @@
             </a:endParaRPr>
           </a:p>
           <a:p>
-            <a:pPr marL="343080" indent="-342360">
+            <a:pPr marL="343080" indent="-342000">
               <a:lnSpc>
                 <a:spcPct val="100000"/>
               </a:lnSpc>
@@ -8885,6 +8448,7 @@
                   <a:srgbClr val="002060"/>
                 </a:solidFill>
                 <a:latin typeface="Calibri"/>
+                <a:ea typeface="DejaVu Sans"/>
               </a:rPr>
               <a:t>Encrypting File System</a:t>
             </a:r>
@@ -8893,7 +8457,7 @@
             </a:endParaRPr>
           </a:p>
           <a:p>
-            <a:pPr marL="343080" indent="-342360">
+            <a:pPr marL="343080" indent="-342000">
               <a:lnSpc>
                 <a:spcPct val="100000"/>
               </a:lnSpc>
@@ -8912,6 +8476,7 @@
                   <a:srgbClr val="002060"/>
                 </a:solidFill>
                 <a:latin typeface="Calibri"/>
+                <a:ea typeface="DejaVu Sans"/>
               </a:rPr>
               <a:t>BitLocker</a:t>
             </a:r>
@@ -8920,7 +8485,7 @@
             </a:endParaRPr>
           </a:p>
           <a:p>
-            <a:pPr marL="343080" indent="-342360">
+            <a:pPr marL="343080" indent="-342000">
               <a:lnSpc>
                 <a:spcPct val="100000"/>
               </a:lnSpc>
@@ -8939,6 +8504,7 @@
                   <a:srgbClr val="002060"/>
                 </a:solidFill>
                 <a:latin typeface="Calibri"/>
+                <a:ea typeface="DejaVu Sans"/>
               </a:rPr>
               <a:t>Domain Name Services</a:t>
             </a:r>
@@ -8947,7 +8513,7 @@
             </a:endParaRPr>
           </a:p>
           <a:p>
-            <a:pPr marL="343080" indent="-342360">
+            <a:pPr marL="343080" indent="-342000">
               <a:lnSpc>
                 <a:spcPct val="100000"/>
               </a:lnSpc>
@@ -8966,6 +8532,7 @@
                   <a:srgbClr val="002060"/>
                 </a:solidFill>
                 <a:latin typeface="Calibri"/>
+                <a:ea typeface="DejaVu Sans"/>
               </a:rPr>
               <a:t>Remote Desktop Services</a:t>
             </a:r>

</xml_diff>

<commit_message>
i add object to file
</commit_message>
<xml_diff>
--- a/active.pptx
+++ b/active.pptx
@@ -7645,6 +7645,34 @@
                 <a:ea typeface="DejaVu Sans"/>
               </a:rPr>
               <a:t>Users</a:t>
+            </a:r>
+            <a:endParaRPr b="0" lang="en-US" sz="2800" spc="-1" strike="noStrike">
+              <a:latin typeface="Arial"/>
+            </a:endParaRPr>
+          </a:p>
+          <a:p>
+            <a:pPr marL="343080" indent="-342000">
+              <a:lnSpc>
+                <a:spcPct val="100000"/>
+              </a:lnSpc>
+              <a:spcBef>
+                <a:spcPts val="561"/>
+              </a:spcBef>
+              <a:buClr>
+                <a:srgbClr val="002060"/>
+              </a:buClr>
+              <a:buFont typeface="Arial"/>
+              <a:buChar char="•"/>
+            </a:pPr>
+            <a:r>
+              <a:rPr b="0" lang="en-US" sz="2800" spc="-1" strike="noStrike">
+                <a:solidFill>
+                  <a:srgbClr val="002060"/>
+                </a:solidFill>
+                <a:latin typeface="Calibri"/>
+                <a:ea typeface="DejaVu Sans"/>
+              </a:rPr>
+              <a:t>Groups </a:t>
             </a:r>
             <a:endParaRPr b="0" lang="en-US" sz="2800" spc="-1" strike="noStrike">
               <a:latin typeface="Arial"/>

</xml_diff>

<commit_message>
i add my second slide
</commit_message>
<xml_diff>
--- a/active.pptx
+++ b/active.pptx
@@ -17,6 +17,7 @@
     <p:sldId id="262" r:id="rId11"/>
     <p:sldId id="263" r:id="rId12"/>
     <p:sldId id="264" r:id="rId13"/>
+    <p:sldId id="265" r:id="rId14"/>
   </p:sldIdLst>
   <p:sldSz cx="9144000" cy="5143500" type="screen16x9"/>
   <p:notesSz cx="7772400" cy="10058400"/>
@@ -8258,6 +8259,143 @@
       <p:transition spd="slow"/>
     </mc:Fallback>
   </mc:AlternateContent>
+</p:sld>
+</file>
+
+<file path=ppt/slides/slide10.xml><?xml version="1.0" encoding="utf-8"?>
+<p:sld xmlns:a="http://schemas.openxmlformats.org/drawingml/2006/main" xmlns:r="http://schemas.openxmlformats.org/officeDocument/2006/relationships" xmlns:p="http://schemas.openxmlformats.org/presentationml/2006/main">
+  <p:cSld>
+    <p:spTree>
+      <p:nvGrpSpPr>
+        <p:cNvPr id="1" name=""/>
+        <p:cNvGrpSpPr/>
+        <p:nvPr/>
+      </p:nvGrpSpPr>
+      <p:grpSpPr>
+        <a:xfrm>
+          <a:off x="0" y="0"/>
+          <a:ext cx="0" cy="0"/>
+          <a:chOff x="0" y="0"/>
+          <a:chExt cx="0" cy="0"/>
+        </a:xfrm>
+      </p:grpSpPr>
+      <p:sp>
+        <p:nvSpPr>
+          <p:cNvPr id="2" name="Title 1"/>
+          <p:cNvSpPr>
+            <a:spLocks noGrp="1"/>
+          </p:cNvSpPr>
+          <p:nvPr>
+            <p:ph type="title"/>
+          </p:nvPr>
+        </p:nvSpPr>
+        <p:spPr/>
+        <p:txBody>
+          <a:bodyPr>
+            <a:normAutofit/>
+          </a:bodyPr>
+          <a:lstStyle/>
+          <a:p>
+            <a:r>
+              <a:rPr lang="en-US" dirty="0"/>
+              <a:t>Certificate </a:t>
+            </a:r>
+            <a:r>
+              <a:rPr lang="en-US" dirty="0" smtClean="0"/>
+              <a:t>Services</a:t>
+            </a:r>
+            <a:endParaRPr lang="en-US" dirty="0"/>
+          </a:p>
+        </p:txBody>
+      </p:sp>
+      <p:sp>
+        <p:nvSpPr>
+          <p:cNvPr id="3" name="Content Placeholder 2"/>
+          <p:cNvSpPr>
+            <a:spLocks noGrp="1"/>
+          </p:cNvSpPr>
+          <p:nvPr>
+            <p:ph idx="4294967295"/>
+          </p:nvPr>
+        </p:nvSpPr>
+        <p:spPr/>
+        <p:txBody>
+          <a:bodyPr/>
+          <a:lstStyle/>
+          <a:p>
+            <a:r>
+              <a:rPr lang="en-US" dirty="0"/>
+              <a:t> It can create, validate and revoke public key certificates for internal uses of an </a:t>
+            </a:r>
+            <a:r>
+              <a:rPr lang="en-US" dirty="0" smtClean="0"/>
+              <a:t>organization.</a:t>
+            </a:r>
+          </a:p>
+          <a:p>
+            <a:r>
+              <a:rPr lang="en-US" dirty="0" smtClean="0"/>
+              <a:t>These </a:t>
+            </a:r>
+            <a:r>
+              <a:rPr lang="en-US" dirty="0"/>
+              <a:t>certificates can be used to </a:t>
+            </a:r>
+            <a:r>
+              <a:rPr lang="en-US" dirty="0" smtClean="0"/>
+              <a:t>encrypt:</a:t>
+            </a:r>
+          </a:p>
+          <a:p>
+            <a:pPr lvl="1">
+              <a:buFont typeface="Wingdings" panose="05000000000000000000" pitchFamily="2" charset="2"/>
+              <a:buChar char="Ø"/>
+            </a:pPr>
+            <a:r>
+              <a:rPr lang="en-US" dirty="0" smtClean="0"/>
+              <a:t>Files</a:t>
+            </a:r>
+          </a:p>
+          <a:p>
+            <a:pPr lvl="1">
+              <a:buFont typeface="Wingdings" panose="05000000000000000000" pitchFamily="2" charset="2"/>
+              <a:buChar char="Ø"/>
+            </a:pPr>
+            <a:r>
+              <a:rPr lang="en-US" dirty="0" smtClean="0"/>
+              <a:t>Emails</a:t>
+            </a:r>
+          </a:p>
+          <a:p>
+            <a:pPr lvl="1">
+              <a:buFont typeface="Wingdings" panose="05000000000000000000" pitchFamily="2" charset="2"/>
+              <a:buChar char="Ø"/>
+            </a:pPr>
+            <a:r>
+              <a:rPr lang="en-US" dirty="0" smtClean="0"/>
+              <a:t>Network traffic</a:t>
+            </a:r>
+            <a:endParaRPr lang="en-US" dirty="0"/>
+          </a:p>
+        </p:txBody>
+      </p:sp>
+    </p:spTree>
+    <p:extLst>
+      <p:ext uri="{BB962C8B-B14F-4D97-AF65-F5344CB8AC3E}">
+        <p14:creationId xmlns:p14="http://schemas.microsoft.com/office/powerpoint/2010/main" val="3964479366"/>
+      </p:ext>
+    </p:extLst>
+  </p:cSld>
+  <p:clrMapOvr>
+    <a:masterClrMapping/>
+  </p:clrMapOvr>
+  <p:timing>
+    <p:tnLst>
+      <p:par>
+        <p:cTn id="1" dur="indefinite" restart="never" nodeType="tmRoot"/>
+      </p:par>
+    </p:tnLst>
+  </p:timing>
 </p:sld>
 </file>
 

</xml_diff>

<commit_message>
i add my third slide
</commit_message>
<xml_diff>
--- a/active.pptx
+++ b/active.pptx
@@ -18,6 +18,7 @@
     <p:sldId id="263" r:id="rId12"/>
     <p:sldId id="264" r:id="rId13"/>
     <p:sldId id="265" r:id="rId14"/>
+    <p:sldId id="266" r:id="rId15"/>
   </p:sldIdLst>
   <p:sldSz cx="9144000" cy="5143500" type="screen16x9"/>
   <p:notesSz cx="7772400" cy="10058400"/>
@@ -8383,6 +8384,111 @@
     <p:extLst>
       <p:ext uri="{BB962C8B-B14F-4D97-AF65-F5344CB8AC3E}">
         <p14:creationId xmlns:p14="http://schemas.microsoft.com/office/powerpoint/2010/main" val="3964479366"/>
+      </p:ext>
+    </p:extLst>
+  </p:cSld>
+  <p:clrMapOvr>
+    <a:masterClrMapping/>
+  </p:clrMapOvr>
+  <p:timing>
+    <p:tnLst>
+      <p:par>
+        <p:cTn id="1" dur="indefinite" restart="never" nodeType="tmRoot"/>
+      </p:par>
+    </p:tnLst>
+  </p:timing>
+</p:sld>
+</file>
+
+<file path=ppt/slides/slide11.xml><?xml version="1.0" encoding="utf-8"?>
+<p:sld xmlns:a="http://schemas.openxmlformats.org/drawingml/2006/main" xmlns:r="http://schemas.openxmlformats.org/officeDocument/2006/relationships" xmlns:p="http://schemas.openxmlformats.org/presentationml/2006/main">
+  <p:cSld>
+    <p:spTree>
+      <p:nvGrpSpPr>
+        <p:cNvPr id="1" name=""/>
+        <p:cNvGrpSpPr/>
+        <p:nvPr/>
+      </p:nvGrpSpPr>
+      <p:grpSpPr>
+        <a:xfrm>
+          <a:off x="0" y="0"/>
+          <a:ext cx="0" cy="0"/>
+          <a:chOff x="0" y="0"/>
+          <a:chExt cx="0" cy="0"/>
+        </a:xfrm>
+      </p:grpSpPr>
+      <p:sp>
+        <p:nvSpPr>
+          <p:cNvPr id="2" name="Title 1"/>
+          <p:cNvSpPr>
+            <a:spLocks noGrp="1"/>
+          </p:cNvSpPr>
+          <p:nvPr>
+            <p:ph type="title"/>
+          </p:nvPr>
+        </p:nvSpPr>
+        <p:spPr/>
+        <p:txBody>
+          <a:bodyPr>
+            <a:normAutofit/>
+          </a:bodyPr>
+          <a:lstStyle/>
+          <a:p>
+            <a:r>
+              <a:rPr lang="en-US" dirty="0"/>
+              <a:t>Federation </a:t>
+            </a:r>
+            <a:r>
+              <a:rPr lang="en-US" dirty="0" smtClean="0"/>
+              <a:t>Services</a:t>
+            </a:r>
+            <a:endParaRPr lang="en-US" dirty="0"/>
+          </a:p>
+        </p:txBody>
+      </p:sp>
+      <p:sp>
+        <p:nvSpPr>
+          <p:cNvPr id="3" name="Content Placeholder 2"/>
+          <p:cNvSpPr>
+            <a:spLocks noGrp="1"/>
+          </p:cNvSpPr>
+          <p:nvPr>
+            <p:ph idx="4294967295"/>
+          </p:nvPr>
+        </p:nvSpPr>
+        <p:spPr/>
+        <p:txBody>
+          <a:bodyPr/>
+          <a:lstStyle/>
+          <a:p>
+            <a:r>
+              <a:rPr lang="en-US" dirty="0" smtClean="0"/>
+              <a:t>The </a:t>
+            </a:r>
+            <a:r>
+              <a:rPr lang="en-US" dirty="0"/>
+              <a:t>part of the directory </a:t>
+            </a:r>
+            <a:r>
+              <a:rPr lang="en-US" dirty="0" smtClean="0"/>
+              <a:t>which is working for management </a:t>
+            </a:r>
+            <a:r>
+              <a:rPr lang="en-US" dirty="0"/>
+              <a:t>of </a:t>
+            </a:r>
+            <a:r>
+              <a:rPr lang="en-US" dirty="0" smtClean="0"/>
+              <a:t>domains.</a:t>
+            </a:r>
+            <a:endParaRPr lang="en-US" dirty="0"/>
+          </a:p>
+        </p:txBody>
+      </p:sp>
+    </p:spTree>
+    <p:extLst>
+      <p:ext uri="{BB962C8B-B14F-4D97-AF65-F5344CB8AC3E}">
+        <p14:creationId xmlns:p14="http://schemas.microsoft.com/office/powerpoint/2010/main" val="492071843"/>
       </p:ext>
     </p:extLst>
   </p:cSld>

</xml_diff>

<commit_message>
i add my fourt slide
</commit_message>
<xml_diff>
--- a/active.pptx
+++ b/active.pptx
@@ -19,6 +19,7 @@
     <p:sldId id="264" r:id="rId13"/>
     <p:sldId id="265" r:id="rId14"/>
     <p:sldId id="266" r:id="rId15"/>
+    <p:sldId id="267" r:id="rId16"/>
   </p:sldIdLst>
   <p:sldSz cx="9144000" cy="5143500" type="screen16x9"/>
   <p:notesSz cx="7772400" cy="10058400"/>
@@ -8489,6 +8490,168 @@
     <p:extLst>
       <p:ext uri="{BB962C8B-B14F-4D97-AF65-F5344CB8AC3E}">
         <p14:creationId xmlns:p14="http://schemas.microsoft.com/office/powerpoint/2010/main" val="492071843"/>
+      </p:ext>
+    </p:extLst>
+  </p:cSld>
+  <p:clrMapOvr>
+    <a:masterClrMapping/>
+  </p:clrMapOvr>
+  <p:timing>
+    <p:tnLst>
+      <p:par>
+        <p:cTn id="1" dur="indefinite" restart="never" nodeType="tmRoot"/>
+      </p:par>
+    </p:tnLst>
+  </p:timing>
+</p:sld>
+</file>
+
+<file path=ppt/slides/slide12.xml><?xml version="1.0" encoding="utf-8"?>
+<p:sld xmlns:a="http://schemas.openxmlformats.org/drawingml/2006/main" xmlns:r="http://schemas.openxmlformats.org/officeDocument/2006/relationships" xmlns:p="http://schemas.openxmlformats.org/presentationml/2006/main">
+  <p:cSld>
+    <p:spTree>
+      <p:nvGrpSpPr>
+        <p:cNvPr id="1" name=""/>
+        <p:cNvGrpSpPr/>
+        <p:nvPr/>
+      </p:nvGrpSpPr>
+      <p:grpSpPr>
+        <a:xfrm>
+          <a:off x="0" y="0"/>
+          <a:ext cx="0" cy="0"/>
+          <a:chOff x="0" y="0"/>
+          <a:chExt cx="0" cy="0"/>
+        </a:xfrm>
+      </p:grpSpPr>
+      <p:sp>
+        <p:nvSpPr>
+          <p:cNvPr id="2" name="Title 1"/>
+          <p:cNvSpPr>
+            <a:spLocks noGrp="1"/>
+          </p:cNvSpPr>
+          <p:nvPr>
+            <p:ph type="title"/>
+          </p:nvPr>
+        </p:nvSpPr>
+        <p:spPr/>
+        <p:txBody>
+          <a:bodyPr>
+            <a:normAutofit fontScale="90000"/>
+          </a:bodyPr>
+          <a:lstStyle/>
+          <a:p>
+            <a:r>
+              <a:rPr lang="en-US" dirty="0">
+                <a:effectLst/>
+              </a:rPr>
+              <a:t>Levels of Active Directory </a:t>
+            </a:r>
+            <a:r>
+              <a:rPr lang="en-US" dirty="0" smtClean="0">
+                <a:effectLst/>
+              </a:rPr>
+              <a:t>framework</a:t>
+            </a:r>
+            <a:endParaRPr lang="en-US" dirty="0"/>
+          </a:p>
+        </p:txBody>
+      </p:sp>
+      <p:sp>
+        <p:nvSpPr>
+          <p:cNvPr id="3" name="Content Placeholder 2"/>
+          <p:cNvSpPr>
+            <a:spLocks noGrp="1"/>
+          </p:cNvSpPr>
+          <p:nvPr>
+            <p:ph idx="4294967295"/>
+          </p:nvPr>
+        </p:nvSpPr>
+        <p:spPr/>
+        <p:txBody>
+          <a:bodyPr/>
+          <a:lstStyle/>
+          <a:p>
+            <a:r>
+              <a:rPr lang="en-US" dirty="0"/>
+              <a:t>A </a:t>
+            </a:r>
+            <a:r>
+              <a:rPr lang="en-US" b="1" dirty="0"/>
+              <a:t>domain</a:t>
+            </a:r>
+            <a:r>
+              <a:rPr lang="en-US" dirty="0"/>
+              <a:t> </a:t>
+            </a:r>
+            <a:r>
+              <a:rPr lang="en-US" dirty="0" smtClean="0"/>
+              <a:t>that shares </a:t>
+            </a:r>
+            <a:r>
+              <a:rPr lang="en-US" dirty="0"/>
+              <a:t>the same Active Directory database</a:t>
+            </a:r>
+            <a:r>
+              <a:rPr lang="en-US" dirty="0" smtClean="0"/>
+              <a:t>.</a:t>
+            </a:r>
+          </a:p>
+          <a:p>
+            <a:r>
+              <a:rPr lang="en-US" dirty="0"/>
+              <a:t>A </a:t>
+            </a:r>
+            <a:r>
+              <a:rPr lang="en-US" b="1" dirty="0"/>
+              <a:t>tree</a:t>
+            </a:r>
+            <a:r>
+              <a:rPr lang="en-US" dirty="0"/>
+              <a:t> is a collection of one or more </a:t>
+            </a:r>
+            <a:r>
+              <a:rPr lang="en-US" dirty="0" smtClean="0"/>
+              <a:t>domains.</a:t>
+            </a:r>
+          </a:p>
+          <a:p>
+            <a:r>
+              <a:rPr lang="en-US" dirty="0" smtClean="0"/>
+              <a:t>A </a:t>
+            </a:r>
+            <a:r>
+              <a:rPr lang="en-US" b="1" dirty="0"/>
+              <a:t>forest</a:t>
+            </a:r>
+            <a:r>
+              <a:rPr lang="en-US" dirty="0"/>
+              <a:t> is a collection of </a:t>
+            </a:r>
+            <a:r>
+              <a:rPr lang="en-US" dirty="0" smtClean="0"/>
+              <a:t>trees</a:t>
+            </a:r>
+          </a:p>
+          <a:p>
+            <a:r>
+              <a:rPr lang="en-US" dirty="0"/>
+              <a:t>At the top of the structure is the forest</a:t>
+            </a:r>
+            <a:r>
+              <a:rPr lang="en-US" i="1" dirty="0"/>
+              <a:t>.</a:t>
+            </a:r>
+            <a:r>
+              <a:rPr lang="en-US" dirty="0"/>
+              <a:t> </a:t>
+            </a:r>
+          </a:p>
+        </p:txBody>
+      </p:sp>
+    </p:spTree>
+    <p:extLst>
+      <p:ext uri="{BB962C8B-B14F-4D97-AF65-F5344CB8AC3E}">
+        <p14:creationId xmlns:p14="http://schemas.microsoft.com/office/powerpoint/2010/main" val="2063894695"/>
       </p:ext>
     </p:extLst>
   </p:cSld>

</xml_diff>

<commit_message>
added my name and my lastname
</commit_message>
<xml_diff>
--- a/active.pptx
+++ b/active.pptx
@@ -10214,7 +10214,7 @@
         </p:nvSpPr>
         <p:spPr>
           <a:xfrm>
-            <a:off x="457380" y="879252"/>
+            <a:off x="358525" y="1678323"/>
             <a:ext cx="8229240" cy="3384996"/>
           </a:xfrm>
         </p:spPr>
@@ -10228,9 +10228,9 @@
             </a:r>
           </a:p>
           <a:p>
-            <a:endParaRPr lang="en-US" dirty="0" smtClean="0"/>
-          </a:p>
-          <a:p>
+            <a:pPr marL="0" indent="0">
+              <a:buNone/>
+            </a:pPr>
             <a:endParaRPr lang="en-US" dirty="0" smtClean="0"/>
           </a:p>
           <a:p>
@@ -10246,6 +10246,19 @@
               <a:rPr lang="en-US" sz="2400" dirty="0" smtClean="0"/>
               <a:t> for the storage of directory data.</a:t>
             </a:r>
+          </a:p>
+          <a:p>
+            <a:endParaRPr lang="en-US" sz="2400" dirty="0"/>
+          </a:p>
+          <a:p>
+            <a:endParaRPr lang="en-US" sz="2400" dirty="0" smtClean="0"/>
+          </a:p>
+          <a:p>
+            <a:r>
+              <a:rPr lang="en-US" sz="1100" dirty="0" smtClean="0"/>
+              <a:t>Mahdi Haidari</a:t>
+            </a:r>
+            <a:endParaRPr lang="en-US" sz="1100" dirty="0" smtClean="0"/>
           </a:p>
           <a:p>
             <a:endParaRPr lang="en-US" dirty="0"/>

</xml_diff>

<commit_message>
i add my file
</commit_message>
<xml_diff>
--- a/active.pptx
+++ b/active.pptx
@@ -118,6 +118,11 @@
       </a:defRPr>
     </a:lvl9pPr>
   </p:defaultTextStyle>
+  <p:extLst>
+    <p:ext uri="{EFAFB233-063F-42B5-8137-9DF3F51BA10A}">
+      <p15:sldGuideLst xmlns:p15="http://schemas.microsoft.com/office/powerpoint/2012/main"/>
+    </p:ext>
+  </p:extLst>
 </p:presentation>
 </file>
 
@@ -8257,7 +8262,7 @@
     <mc:Choice Requires="p14">
       <p:transition spd="slow" p14:dur="2000"/>
     </mc:Choice>
-    <mc:Fallback xmlns:p15="http://schemas.microsoft.com/office/powerpoint/2012/main" xmlns="">
+    <mc:Fallback xmlns="" xmlns:p15="http://schemas.microsoft.com/office/powerpoint/2012/main">
       <p:transition spd="slow"/>
     </mc:Fallback>
   </mc:AlternateContent>
@@ -8793,7 +8798,7 @@
               <a:buChar char="•"/>
             </a:pPr>
             <a:r>
-              <a:rPr lang="en-US" sz="2800" b="0" strike="noStrike" spc="-1">
+              <a:rPr lang="en-US" sz="2800" b="0" strike="noStrike" spc="-1" dirty="0">
                 <a:solidFill>
                   <a:srgbClr val="002060"/>
                 </a:solidFill>
@@ -8801,7 +8806,7 @@
               </a:rPr>
               <a:t>Mahdi </a:t>
             </a:r>
-            <a:endParaRPr lang="en-US" sz="2800" b="0" strike="noStrike" spc="-1">
+            <a:endParaRPr lang="en-US" sz="2800" b="0" strike="noStrike" spc="-1" dirty="0">
               <a:latin typeface="Arial"/>
             </a:endParaRPr>
           </a:p>
@@ -8820,15 +8825,33 @@
               <a:buChar char="•"/>
             </a:pPr>
             <a:r>
-              <a:rPr lang="en-US" sz="2800" b="0" strike="noStrike" spc="-1">
+              <a:rPr lang="en-US" sz="2800" b="0" strike="noStrike" spc="-1" dirty="0" err="1">
                 <a:solidFill>
                   <a:srgbClr val="002060"/>
                 </a:solidFill>
                 <a:latin typeface="Calibri"/>
               </a:rPr>
-              <a:t>Samiullah Wardak</a:t>
-            </a:r>
-            <a:endParaRPr lang="en-US" sz="2800" b="0" strike="noStrike" spc="-1">
+              <a:t>Samiullah</a:t>
+            </a:r>
+            <a:r>
+              <a:rPr lang="en-US" sz="2800" b="0" strike="noStrike" spc="-1" dirty="0">
+                <a:solidFill>
+                  <a:srgbClr val="002060"/>
+                </a:solidFill>
+                <a:latin typeface="Calibri"/>
+              </a:rPr>
+              <a:t> </a:t>
+            </a:r>
+            <a:r>
+              <a:rPr lang="en-US" sz="2800" b="0" strike="noStrike" spc="-1" dirty="0" err="1">
+                <a:solidFill>
+                  <a:srgbClr val="002060"/>
+                </a:solidFill>
+                <a:latin typeface="Calibri"/>
+              </a:rPr>
+              <a:t>Wardak</a:t>
+            </a:r>
+            <a:endParaRPr lang="en-US" sz="2800" b="0" strike="noStrike" spc="-1" dirty="0">
               <a:latin typeface="Arial"/>
             </a:endParaRPr>
           </a:p>
@@ -8847,15 +8870,33 @@
               <a:buChar char="•"/>
             </a:pPr>
             <a:r>
-              <a:rPr lang="en-US" sz="2800" b="0" strike="noStrike" spc="-1">
+              <a:rPr lang="en-US" sz="2800" b="0" strike="noStrike" spc="-1" dirty="0" err="1">
                 <a:solidFill>
                   <a:srgbClr val="002060"/>
                 </a:solidFill>
                 <a:latin typeface="Calibri"/>
               </a:rPr>
-              <a:t>Atiqullah Hamraz</a:t>
-            </a:r>
-            <a:endParaRPr lang="en-US" sz="2800" b="0" strike="noStrike" spc="-1">
+              <a:t>Atiqullah</a:t>
+            </a:r>
+            <a:r>
+              <a:rPr lang="en-US" sz="2800" b="0" strike="noStrike" spc="-1" dirty="0">
+                <a:solidFill>
+                  <a:srgbClr val="002060"/>
+                </a:solidFill>
+                <a:latin typeface="Calibri"/>
+              </a:rPr>
+              <a:t> </a:t>
+            </a:r>
+            <a:r>
+              <a:rPr lang="en-US" sz="2800" b="0" strike="noStrike" spc="-1" dirty="0" err="1">
+                <a:solidFill>
+                  <a:srgbClr val="002060"/>
+                </a:solidFill>
+                <a:latin typeface="Calibri"/>
+              </a:rPr>
+              <a:t>Hamraz</a:t>
+            </a:r>
+            <a:endParaRPr lang="en-US" sz="2800" b="0" strike="noStrike" spc="-1" dirty="0">
               <a:latin typeface="Arial"/>
             </a:endParaRPr>
           </a:p>
@@ -8874,15 +8915,60 @@
               <a:buChar char="•"/>
             </a:pPr>
             <a:r>
-              <a:rPr lang="en-US" sz="2800" b="0" strike="noStrike" spc="-1">
+              <a:rPr lang="en-US" sz="2800" b="0" strike="noStrike" spc="-1" dirty="0">
                 <a:solidFill>
                   <a:srgbClr val="002060"/>
                 </a:solidFill>
                 <a:latin typeface="Calibri"/>
               </a:rPr>
-              <a:t>Baha-ul-haq Sharifi</a:t>
-            </a:r>
-            <a:endParaRPr lang="en-US" sz="2800" b="0" strike="noStrike" spc="-1">
+              <a:t>Baha-</a:t>
+            </a:r>
+            <a:r>
+              <a:rPr lang="en-US" sz="2800" b="0" strike="noStrike" spc="-1" dirty="0" err="1">
+                <a:solidFill>
+                  <a:srgbClr val="002060"/>
+                </a:solidFill>
+                <a:latin typeface="Calibri"/>
+              </a:rPr>
+              <a:t>ul</a:t>
+            </a:r>
+            <a:r>
+              <a:rPr lang="en-US" sz="2800" b="0" strike="noStrike" spc="-1" dirty="0">
+                <a:solidFill>
+                  <a:srgbClr val="002060"/>
+                </a:solidFill>
+                <a:latin typeface="Calibri"/>
+              </a:rPr>
+              <a:t>-</a:t>
+            </a:r>
+            <a:r>
+              <a:rPr lang="en-US" sz="2800" b="0" strike="noStrike" spc="-1" dirty="0" err="1">
+                <a:solidFill>
+                  <a:srgbClr val="002060"/>
+                </a:solidFill>
+                <a:latin typeface="Calibri"/>
+              </a:rPr>
+              <a:t>haq</a:t>
+            </a:r>
+            <a:r>
+              <a:rPr lang="en-US" sz="2800" b="0" strike="noStrike" spc="-1" dirty="0">
+                <a:solidFill>
+                  <a:srgbClr val="002060"/>
+                </a:solidFill>
+                <a:latin typeface="Calibri"/>
+              </a:rPr>
+              <a:t> </a:t>
+            </a:r>
+            <a:r>
+              <a:rPr lang="en-US" sz="2800" b="0" strike="noStrike" spc="-1" dirty="0" err="1">
+                <a:solidFill>
+                  <a:srgbClr val="002060"/>
+                </a:solidFill>
+                <a:latin typeface="Calibri"/>
+              </a:rPr>
+              <a:t>Sharifi</a:t>
+            </a:r>
+            <a:endParaRPr lang="en-US" sz="2800" b="0" strike="noStrike" spc="-1" dirty="0">
               <a:latin typeface="Arial"/>
             </a:endParaRPr>
           </a:p>
@@ -8901,15 +8987,33 @@
               <a:buChar char="•"/>
             </a:pPr>
             <a:r>
-              <a:rPr lang="en-US" sz="2800" b="0" strike="noStrike" spc="-1">
+              <a:rPr lang="en-US" sz="2800" b="0" strike="noStrike" spc="-1" dirty="0" err="1">
                 <a:solidFill>
                   <a:srgbClr val="002060"/>
                 </a:solidFill>
                 <a:latin typeface="Calibri"/>
               </a:rPr>
-              <a:t>Hedayatullah Nekzad</a:t>
-            </a:r>
-            <a:endParaRPr lang="en-US" sz="2800" b="0" strike="noStrike" spc="-1">
+              <a:t>Hedayatullah</a:t>
+            </a:r>
+            <a:r>
+              <a:rPr lang="en-US" sz="2800" b="0" strike="noStrike" spc="-1" dirty="0">
+                <a:solidFill>
+                  <a:srgbClr val="002060"/>
+                </a:solidFill>
+                <a:latin typeface="Calibri"/>
+              </a:rPr>
+              <a:t> </a:t>
+            </a:r>
+            <a:r>
+              <a:rPr lang="en-US" sz="2800" b="0" strike="noStrike" spc="-1" smtClean="0">
+                <a:solidFill>
+                  <a:srgbClr val="002060"/>
+                </a:solidFill>
+                <a:latin typeface="Calibri"/>
+              </a:rPr>
+              <a:t>Nikzad</a:t>
+            </a:r>
+            <a:endParaRPr lang="en-US" sz="2800" b="0" strike="noStrike" spc="-1" dirty="0">
               <a:latin typeface="Arial"/>
             </a:endParaRPr>
           </a:p>
@@ -8922,7 +9026,7 @@
                 <a:spcPts val="561"/>
               </a:spcBef>
             </a:pPr>
-            <a:endParaRPr lang="en-US" sz="2800" b="0" strike="noStrike" spc="-1">
+            <a:endParaRPr lang="en-US" sz="2800" b="0" strike="noStrike" spc="-1" dirty="0">
               <a:latin typeface="Arial"/>
             </a:endParaRPr>
           </a:p>
@@ -8935,7 +9039,7 @@
                 <a:spcPts val="561"/>
               </a:spcBef>
             </a:pPr>
-            <a:endParaRPr lang="en-US" sz="2800" b="0" strike="noStrike" spc="-1">
+            <a:endParaRPr lang="en-US" sz="2800" b="0" strike="noStrike" spc="-1" dirty="0">
               <a:latin typeface="Arial"/>
             </a:endParaRPr>
           </a:p>
@@ -8948,7 +9052,7 @@
                 <a:spcPts val="561"/>
               </a:spcBef>
             </a:pPr>
-            <a:endParaRPr lang="en-US" sz="2800" b="0" strike="noStrike" spc="-1">
+            <a:endParaRPr lang="en-US" sz="2800" b="0" strike="noStrike" spc="-1" dirty="0">
               <a:latin typeface="Arial"/>
             </a:endParaRPr>
           </a:p>
@@ -8963,7 +9067,7 @@
     <mc:Choice Requires="p14">
       <p:transition spd="slow" p14:dur="2000"/>
     </mc:Choice>
-    <mc:Fallback xmlns:p15="http://schemas.microsoft.com/office/powerpoint/2012/main" xmlns="">
+    <mc:Fallback xmlns="" xmlns:p15="http://schemas.microsoft.com/office/powerpoint/2012/main">
       <p:transition spd="slow"/>
     </mc:Fallback>
   </mc:AlternateContent>
@@ -9208,7 +9312,7 @@
     <mc:Choice Requires="p14">
       <p:transition spd="slow" p14:dur="2000"/>
     </mc:Choice>
-    <mc:Fallback xmlns:p15="http://schemas.microsoft.com/office/powerpoint/2012/main" xmlns="">
+    <mc:Fallback xmlns="" xmlns:p15="http://schemas.microsoft.com/office/powerpoint/2012/main">
       <p:transition spd="slow"/>
     </mc:Fallback>
   </mc:AlternateContent>
@@ -9430,7 +9534,7 @@
     <mc:Choice Requires="p14">
       <p:transition spd="slow" p14:dur="2000"/>
     </mc:Choice>
-    <mc:Fallback xmlns:p15="http://schemas.microsoft.com/office/powerpoint/2012/main" xmlns="">
+    <mc:Fallback xmlns="" xmlns:p15="http://schemas.microsoft.com/office/powerpoint/2012/main">
       <p:transition spd="slow"/>
     </mc:Fallback>
   </mc:AlternateContent>
@@ -9699,7 +9803,7 @@
     <mc:Choice Requires="p14">
       <p:transition spd="slow" p14:dur="2000"/>
     </mc:Choice>
-    <mc:Fallback xmlns:p15="http://schemas.microsoft.com/office/powerpoint/2012/main" xmlns="">
+    <mc:Fallback xmlns="" xmlns:p15="http://schemas.microsoft.com/office/powerpoint/2012/main">
       <p:transition spd="slow"/>
     </mc:Fallback>
   </mc:AlternateContent>
@@ -10013,7 +10117,7 @@
     <mc:Choice Requires="p14">
       <p:transition spd="slow" p14:dur="2000"/>
     </mc:Choice>
-    <mc:Fallback xmlns:p15="http://schemas.microsoft.com/office/powerpoint/2012/main" xmlns="">
+    <mc:Fallback xmlns="" xmlns:p15="http://schemas.microsoft.com/office/powerpoint/2012/main">
       <p:transition spd="slow"/>
     </mc:Fallback>
   </mc:AlternateContent>
@@ -10287,7 +10391,7 @@
     <mc:Choice Requires="p14">
       <p:transition spd="slow" p14:dur="2000"/>
     </mc:Choice>
-    <mc:Fallback xmlns:p15="http://schemas.microsoft.com/office/powerpoint/2012/main" xmlns="">
+    <mc:Fallback xmlns="" xmlns:p15="http://schemas.microsoft.com/office/powerpoint/2012/main">
       <p:transition spd="slow"/>
     </mc:Fallback>
   </mc:AlternateContent>
@@ -10569,7 +10673,7 @@
     <mc:Choice Requires="p14">
       <p:transition spd="slow" p14:dur="2000"/>
     </mc:Choice>
-    <mc:Fallback xmlns:p15="http://schemas.microsoft.com/office/powerpoint/2012/main" xmlns="">
+    <mc:Fallback xmlns="" xmlns:p15="http://schemas.microsoft.com/office/powerpoint/2012/main">
       <p:transition spd="slow"/>
     </mc:Fallback>
   </mc:AlternateContent>

</xml_diff>